<commit_message>
Work in progress: moving from grpc to Windows named-pipes to simplify dependencies.
</commit_message>
<xml_diff>
--- a/AVXSearch/AVX-Search.pptx
+++ b/AVXSearch/AVX-Search.pptx
@@ -262,7 +262,7 @@
           <a:p>
             <a:fld id="{00872148-4BA6-4738-8A8B-AEF1C14E9646}" type="datetimeFigureOut">
               <a:rPr lang="en-US" smtClean="0"/>
-              <a:t>4/29/2023</a:t>
+              <a:t>5/1/2023</a:t>
             </a:fld>
             <a:endParaRPr lang="en-US"/>
           </a:p>
@@ -460,7 +460,7 @@
           <a:p>
             <a:fld id="{00872148-4BA6-4738-8A8B-AEF1C14E9646}" type="datetimeFigureOut">
               <a:rPr lang="en-US" smtClean="0"/>
-              <a:t>4/29/2023</a:t>
+              <a:t>5/1/2023</a:t>
             </a:fld>
             <a:endParaRPr lang="en-US"/>
           </a:p>
@@ -668,7 +668,7 @@
           <a:p>
             <a:fld id="{00872148-4BA6-4738-8A8B-AEF1C14E9646}" type="datetimeFigureOut">
               <a:rPr lang="en-US" smtClean="0"/>
-              <a:t>4/29/2023</a:t>
+              <a:t>5/1/2023</a:t>
             </a:fld>
             <a:endParaRPr lang="en-US"/>
           </a:p>
@@ -866,7 +866,7 @@
           <a:p>
             <a:fld id="{00872148-4BA6-4738-8A8B-AEF1C14E9646}" type="datetimeFigureOut">
               <a:rPr lang="en-US" smtClean="0"/>
-              <a:t>4/29/2023</a:t>
+              <a:t>5/1/2023</a:t>
             </a:fld>
             <a:endParaRPr lang="en-US"/>
           </a:p>
@@ -1141,7 +1141,7 @@
           <a:p>
             <a:fld id="{00872148-4BA6-4738-8A8B-AEF1C14E9646}" type="datetimeFigureOut">
               <a:rPr lang="en-US" smtClean="0"/>
-              <a:t>4/29/2023</a:t>
+              <a:t>5/1/2023</a:t>
             </a:fld>
             <a:endParaRPr lang="en-US"/>
           </a:p>
@@ -1406,7 +1406,7 @@
           <a:p>
             <a:fld id="{00872148-4BA6-4738-8A8B-AEF1C14E9646}" type="datetimeFigureOut">
               <a:rPr lang="en-US" smtClean="0"/>
-              <a:t>4/29/2023</a:t>
+              <a:t>5/1/2023</a:t>
             </a:fld>
             <a:endParaRPr lang="en-US"/>
           </a:p>
@@ -1818,7 +1818,7 @@
           <a:p>
             <a:fld id="{00872148-4BA6-4738-8A8B-AEF1C14E9646}" type="datetimeFigureOut">
               <a:rPr lang="en-US" smtClean="0"/>
-              <a:t>4/29/2023</a:t>
+              <a:t>5/1/2023</a:t>
             </a:fld>
             <a:endParaRPr lang="en-US"/>
           </a:p>
@@ -1959,7 +1959,7 @@
           <a:p>
             <a:fld id="{00872148-4BA6-4738-8A8B-AEF1C14E9646}" type="datetimeFigureOut">
               <a:rPr lang="en-US" smtClean="0"/>
-              <a:t>4/29/2023</a:t>
+              <a:t>5/1/2023</a:t>
             </a:fld>
             <a:endParaRPr lang="en-US"/>
           </a:p>
@@ -2072,7 +2072,7 @@
           <a:p>
             <a:fld id="{00872148-4BA6-4738-8A8B-AEF1C14E9646}" type="datetimeFigureOut">
               <a:rPr lang="en-US" smtClean="0"/>
-              <a:t>4/29/2023</a:t>
+              <a:t>5/1/2023</a:t>
             </a:fld>
             <a:endParaRPr lang="en-US"/>
           </a:p>
@@ -2383,7 +2383,7 @@
           <a:p>
             <a:fld id="{00872148-4BA6-4738-8A8B-AEF1C14E9646}" type="datetimeFigureOut">
               <a:rPr lang="en-US" smtClean="0"/>
-              <a:t>4/29/2023</a:t>
+              <a:t>5/1/2023</a:t>
             </a:fld>
             <a:endParaRPr lang="en-US"/>
           </a:p>
@@ -2671,7 +2671,7 @@
           <a:p>
             <a:fld id="{00872148-4BA6-4738-8A8B-AEF1C14E9646}" type="datetimeFigureOut">
               <a:rPr lang="en-US" smtClean="0"/>
-              <a:t>4/29/2023</a:t>
+              <a:t>5/1/2023</a:t>
             </a:fld>
             <a:endParaRPr lang="en-US"/>
           </a:p>
@@ -2912,7 +2912,7 @@
           <a:p>
             <a:fld id="{00872148-4BA6-4738-8A8B-AEF1C14E9646}" type="datetimeFigureOut">
               <a:rPr lang="en-US" smtClean="0"/>
-              <a:t>4/29/2023</a:t>
+              <a:t>5/1/2023</a:t>
             </a:fld>
             <a:endParaRPr lang="en-US"/>
           </a:p>
@@ -4599,8 +4599,8 @@
         </p:nvSpPr>
         <p:spPr>
           <a:xfrm>
-            <a:off x="6342591" y="2619792"/>
-            <a:ext cx="559426" cy="276999"/>
+            <a:off x="6339069" y="2530741"/>
+            <a:ext cx="559426" cy="430887"/>
           </a:xfrm>
           <a:prstGeom prst="rect">
             <a:avLst/>
@@ -4615,18 +4615,24 @@
           <a:p>
             <a:pPr algn="ctr"/>
             <a:r>
-              <a:rPr lang="en-US" sz="1200" dirty="0" err="1">
+              <a:rPr lang="en-US" sz="1000" dirty="0">
                 <a:solidFill>
                   <a:schemeClr val="accent1"/>
                 </a:solidFill>
               </a:rPr>
-              <a:t>gRPC</a:t>
-            </a:r>
-            <a:endParaRPr lang="en-US" sz="1200" dirty="0">
-              <a:solidFill>
-                <a:schemeClr val="accent1"/>
-              </a:solidFill>
-            </a:endParaRPr>
+              <a:t>named</a:t>
+            </a:r>
+          </a:p>
+          <a:p>
+            <a:pPr algn="ctr"/>
+            <a:r>
+              <a:rPr lang="en-US" sz="1200" dirty="0">
+                <a:solidFill>
+                  <a:schemeClr val="accent1"/>
+                </a:solidFill>
+              </a:rPr>
+              <a:t>PIPE</a:t>
+            </a:r>
           </a:p>
         </p:txBody>
       </p:sp>
@@ -5226,7 +5232,7 @@
         </p:nvGrpSpPr>
         <p:grpSpPr>
           <a:xfrm>
-            <a:off x="6608990" y="2217289"/>
+            <a:off x="6425641" y="3043504"/>
             <a:ext cx="1004590" cy="791166"/>
             <a:chOff x="6481755" y="3590179"/>
             <a:chExt cx="1482551" cy="1164364"/>
@@ -6969,540 +6975,6 @@
       </p:cxnSp>
       <p:grpSp>
         <p:nvGrpSpPr>
-          <p:cNvPr id="177" name="Group 176">
-            <a:extLst>
-              <a:ext uri="{FF2B5EF4-FFF2-40B4-BE49-F238E27FC236}">
-                <a16:creationId xmlns:a16="http://schemas.microsoft.com/office/drawing/2014/main" id="{3C2C4211-A8F5-2896-7515-C882DF87AE58}"/>
-              </a:ext>
-            </a:extLst>
-          </p:cNvPr>
-          <p:cNvGrpSpPr/>
-          <p:nvPr/>
-        </p:nvGrpSpPr>
-        <p:grpSpPr>
-          <a:xfrm>
-            <a:off x="6589734" y="3065548"/>
-            <a:ext cx="1004590" cy="997177"/>
-            <a:chOff x="6481755" y="3590179"/>
-            <a:chExt cx="1482551" cy="1467551"/>
-          </a:xfrm>
-        </p:grpSpPr>
-        <p:grpSp>
-          <p:nvGrpSpPr>
-            <p:cNvPr id="178" name="Group 177">
-              <a:extLst>
-                <a:ext uri="{FF2B5EF4-FFF2-40B4-BE49-F238E27FC236}">
-                  <a16:creationId xmlns:a16="http://schemas.microsoft.com/office/drawing/2014/main" id="{C4FFF1AF-BACD-79BC-4B9C-3D9FDD05F6FE}"/>
-                </a:ext>
-              </a:extLst>
-            </p:cNvPr>
-            <p:cNvGrpSpPr/>
-            <p:nvPr/>
-          </p:nvGrpSpPr>
-          <p:grpSpPr>
-            <a:xfrm>
-              <a:off x="6931608" y="3590179"/>
-              <a:ext cx="489768" cy="1467551"/>
-              <a:chOff x="1271616" y="2721801"/>
-              <a:chExt cx="489768" cy="1467551"/>
-            </a:xfrm>
-          </p:grpSpPr>
-          <p:grpSp>
-            <p:nvGrpSpPr>
-              <p:cNvPr id="180" name="Group 179">
-                <a:extLst>
-                  <a:ext uri="{FF2B5EF4-FFF2-40B4-BE49-F238E27FC236}">
-                    <a16:creationId xmlns:a16="http://schemas.microsoft.com/office/drawing/2014/main" id="{114F93F4-FD63-E30B-ED03-FD211DD0686A}"/>
-                  </a:ext>
-                </a:extLst>
-              </p:cNvPr>
-              <p:cNvGrpSpPr/>
-              <p:nvPr/>
-            </p:nvGrpSpPr>
-            <p:grpSpPr>
-              <a:xfrm>
-                <a:off x="1272930" y="2721801"/>
-                <a:ext cx="488454" cy="707199"/>
-                <a:chOff x="2082555" y="2721801"/>
-                <a:chExt cx="488454" cy="707199"/>
-              </a:xfrm>
-            </p:grpSpPr>
-            <p:sp>
-              <p:nvSpPr>
-                <p:cNvPr id="187" name="Rectangle 186">
-                  <a:extLst>
-                    <a:ext uri="{FF2B5EF4-FFF2-40B4-BE49-F238E27FC236}">
-                      <a16:creationId xmlns:a16="http://schemas.microsoft.com/office/drawing/2014/main" id="{D1FE1C95-AA99-2A12-0380-9772B0C8B27B}"/>
-                    </a:ext>
-                  </a:extLst>
-                </p:cNvPr>
-                <p:cNvSpPr/>
-                <p:nvPr/>
-              </p:nvSpPr>
-              <p:spPr>
-                <a:xfrm>
-                  <a:off x="2107871" y="2796639"/>
-                  <a:ext cx="463138" cy="632361"/>
-                </a:xfrm>
-                <a:prstGeom prst="rect">
-                  <a:avLst/>
-                </a:prstGeom>
-              </p:spPr>
-              <p:style>
-                <a:lnRef idx="2">
-                  <a:schemeClr val="accent1">
-                    <a:shade val="50000"/>
-                  </a:schemeClr>
-                </a:lnRef>
-                <a:fillRef idx="1">
-                  <a:schemeClr val="accent1"/>
-                </a:fillRef>
-                <a:effectRef idx="0">
-                  <a:schemeClr val="accent1"/>
-                </a:effectRef>
-                <a:fontRef idx="minor">
-                  <a:schemeClr val="lt1"/>
-                </a:fontRef>
-              </p:style>
-              <p:txBody>
-                <a:bodyPr rtlCol="0" anchor="ctr"/>
-                <a:lstStyle/>
-                <a:p>
-                  <a:pPr algn="ctr"/>
-                  <a:endParaRPr lang="en-US"/>
-                </a:p>
-              </p:txBody>
-            </p:sp>
-            <p:sp>
-              <p:nvSpPr>
-                <p:cNvPr id="188" name="Isosceles Triangle 187">
-                  <a:extLst>
-                    <a:ext uri="{FF2B5EF4-FFF2-40B4-BE49-F238E27FC236}">
-                      <a16:creationId xmlns:a16="http://schemas.microsoft.com/office/drawing/2014/main" id="{51A80702-88DB-E9EF-DC4C-EE53F3ECE0FF}"/>
-                    </a:ext>
-                  </a:extLst>
-                </p:cNvPr>
-                <p:cNvSpPr/>
-                <p:nvPr/>
-              </p:nvSpPr>
-              <p:spPr>
-                <a:xfrm rot="7947381" flipV="1">
-                  <a:off x="2035459" y="2768897"/>
-                  <a:ext cx="201880" cy="107688"/>
-                </a:xfrm>
-                <a:prstGeom prst="triangle">
-                  <a:avLst>
-                    <a:gd name="adj" fmla="val 50415"/>
-                  </a:avLst>
-                </a:prstGeom>
-                <a:solidFill>
-                  <a:schemeClr val="bg1"/>
-                </a:solidFill>
-                <a:ln>
-                  <a:solidFill>
-                    <a:schemeClr val="bg1"/>
-                  </a:solidFill>
-                </a:ln>
-              </p:spPr>
-              <p:style>
-                <a:lnRef idx="2">
-                  <a:schemeClr val="accent1">
-                    <a:shade val="50000"/>
-                  </a:schemeClr>
-                </a:lnRef>
-                <a:fillRef idx="1">
-                  <a:schemeClr val="accent1"/>
-                </a:fillRef>
-                <a:effectRef idx="0">
-                  <a:schemeClr val="accent1"/>
-                </a:effectRef>
-                <a:fontRef idx="minor">
-                  <a:schemeClr val="lt1"/>
-                </a:fontRef>
-              </p:style>
-              <p:txBody>
-                <a:bodyPr rtlCol="0" anchor="ctr"/>
-                <a:lstStyle/>
-                <a:p>
-                  <a:pPr algn="ctr"/>
-                  <a:endParaRPr lang="en-US"/>
-                </a:p>
-              </p:txBody>
-            </p:sp>
-            <p:sp>
-              <p:nvSpPr>
-                <p:cNvPr id="189" name="Isosceles Triangle 188">
-                  <a:extLst>
-                    <a:ext uri="{FF2B5EF4-FFF2-40B4-BE49-F238E27FC236}">
-                      <a16:creationId xmlns:a16="http://schemas.microsoft.com/office/drawing/2014/main" id="{35828348-2CAB-3C48-D3B5-DECAF7AB30DF}"/>
-                    </a:ext>
-                  </a:extLst>
-                </p:cNvPr>
-                <p:cNvSpPr/>
-                <p:nvPr/>
-              </p:nvSpPr>
-              <p:spPr>
-                <a:xfrm rot="18762502" flipV="1">
-                  <a:off x="2123370" y="2859537"/>
-                  <a:ext cx="201880" cy="107688"/>
-                </a:xfrm>
-                <a:prstGeom prst="triangle">
-                  <a:avLst>
-                    <a:gd name="adj" fmla="val 50415"/>
-                  </a:avLst>
-                </a:prstGeom>
-                <a:solidFill>
-                  <a:schemeClr val="bg1"/>
-                </a:solidFill>
-                <a:ln>
-                  <a:solidFill>
-                    <a:schemeClr val="accent1"/>
-                  </a:solidFill>
-                </a:ln>
-              </p:spPr>
-              <p:style>
-                <a:lnRef idx="2">
-                  <a:schemeClr val="accent1">
-                    <a:shade val="50000"/>
-                  </a:schemeClr>
-                </a:lnRef>
-                <a:fillRef idx="1">
-                  <a:schemeClr val="accent1"/>
-                </a:fillRef>
-                <a:effectRef idx="0">
-                  <a:schemeClr val="accent1"/>
-                </a:effectRef>
-                <a:fontRef idx="minor">
-                  <a:schemeClr val="lt1"/>
-                </a:fontRef>
-              </p:style>
-              <p:txBody>
-                <a:bodyPr rtlCol="0" anchor="ctr"/>
-                <a:lstStyle/>
-                <a:p>
-                  <a:pPr algn="ctr"/>
-                  <a:endParaRPr lang="en-US"/>
-                </a:p>
-              </p:txBody>
-            </p:sp>
-          </p:grpSp>
-          <p:grpSp>
-            <p:nvGrpSpPr>
-              <p:cNvPr id="181" name="Group 180">
-                <a:extLst>
-                  <a:ext uri="{FF2B5EF4-FFF2-40B4-BE49-F238E27FC236}">
-                    <a16:creationId xmlns:a16="http://schemas.microsoft.com/office/drawing/2014/main" id="{92999FE0-C930-9DBE-43A9-67E7CF7581B7}"/>
-                  </a:ext>
-                </a:extLst>
-              </p:cNvPr>
-              <p:cNvGrpSpPr/>
-              <p:nvPr/>
-            </p:nvGrpSpPr>
-            <p:grpSpPr>
-              <a:xfrm>
-                <a:off x="1271616" y="3105551"/>
-                <a:ext cx="426217" cy="1083801"/>
-                <a:chOff x="1266576" y="3105551"/>
-                <a:chExt cx="447735" cy="1083801"/>
-              </a:xfrm>
-            </p:grpSpPr>
-            <p:cxnSp>
-              <p:nvCxnSpPr>
-                <p:cNvPr id="182" name="Straight Connector 181">
-                  <a:extLst>
-                    <a:ext uri="{FF2B5EF4-FFF2-40B4-BE49-F238E27FC236}">
-                      <a16:creationId xmlns:a16="http://schemas.microsoft.com/office/drawing/2014/main" id="{23F571C9-7F1D-80D2-8901-7BCC5028CEE2}"/>
-                    </a:ext>
-                  </a:extLst>
-                </p:cNvPr>
-                <p:cNvCxnSpPr>
-                  <a:cxnSpLocks/>
-                </p:cNvCxnSpPr>
-                <p:nvPr/>
-              </p:nvCxnSpPr>
-              <p:spPr>
-                <a:xfrm>
-                  <a:off x="1266576" y="4189352"/>
-                  <a:ext cx="342900" cy="0"/>
-                </a:xfrm>
-                <a:prstGeom prst="line">
-                  <a:avLst/>
-                </a:prstGeom>
-                <a:ln>
-                  <a:solidFill>
-                    <a:schemeClr val="bg1">
-                      <a:lumMod val="95000"/>
-                    </a:schemeClr>
-                  </a:solidFill>
-                </a:ln>
-              </p:spPr>
-              <p:style>
-                <a:lnRef idx="1">
-                  <a:schemeClr val="accent1"/>
-                </a:lnRef>
-                <a:fillRef idx="0">
-                  <a:schemeClr val="accent1"/>
-                </a:fillRef>
-                <a:effectRef idx="0">
-                  <a:schemeClr val="accent1"/>
-                </a:effectRef>
-                <a:fontRef idx="minor">
-                  <a:schemeClr val="tx1"/>
-                </a:fontRef>
-              </p:style>
-            </p:cxnSp>
-            <p:cxnSp>
-              <p:nvCxnSpPr>
-                <p:cNvPr id="183" name="Straight Connector 182">
-                  <a:extLst>
-                    <a:ext uri="{FF2B5EF4-FFF2-40B4-BE49-F238E27FC236}">
-                      <a16:creationId xmlns:a16="http://schemas.microsoft.com/office/drawing/2014/main" id="{4E648D47-5938-7516-035B-E0DADB320081}"/>
-                    </a:ext>
-                  </a:extLst>
-                </p:cNvPr>
-                <p:cNvCxnSpPr>
-                  <a:cxnSpLocks/>
-                </p:cNvCxnSpPr>
-                <p:nvPr/>
-              </p:nvCxnSpPr>
-              <p:spPr>
-                <a:xfrm>
-                  <a:off x="1371411" y="3105551"/>
-                  <a:ext cx="342900" cy="0"/>
-                </a:xfrm>
-                <a:prstGeom prst="line">
-                  <a:avLst/>
-                </a:prstGeom>
-                <a:ln>
-                  <a:solidFill>
-                    <a:schemeClr val="bg1">
-                      <a:lumMod val="95000"/>
-                    </a:schemeClr>
-                  </a:solidFill>
-                </a:ln>
-              </p:spPr>
-              <p:style>
-                <a:lnRef idx="1">
-                  <a:schemeClr val="accent1"/>
-                </a:lnRef>
-                <a:fillRef idx="0">
-                  <a:schemeClr val="accent1"/>
-                </a:fillRef>
-                <a:effectRef idx="0">
-                  <a:schemeClr val="accent1"/>
-                </a:effectRef>
-                <a:fontRef idx="minor">
-                  <a:schemeClr val="tx1"/>
-                </a:fontRef>
-              </p:style>
-            </p:cxnSp>
-            <p:cxnSp>
-              <p:nvCxnSpPr>
-                <p:cNvPr id="184" name="Straight Connector 183">
-                  <a:extLst>
-                    <a:ext uri="{FF2B5EF4-FFF2-40B4-BE49-F238E27FC236}">
-                      <a16:creationId xmlns:a16="http://schemas.microsoft.com/office/drawing/2014/main" id="{CA7ED45F-8FAA-3F5F-E284-76B1D213420C}"/>
-                    </a:ext>
-                  </a:extLst>
-                </p:cNvPr>
-                <p:cNvCxnSpPr>
-                  <a:cxnSpLocks/>
-                </p:cNvCxnSpPr>
-                <p:nvPr/>
-              </p:nvCxnSpPr>
-              <p:spPr>
-                <a:xfrm>
-                  <a:off x="1371411" y="3187028"/>
-                  <a:ext cx="342900" cy="0"/>
-                </a:xfrm>
-                <a:prstGeom prst="line">
-                  <a:avLst/>
-                </a:prstGeom>
-                <a:ln>
-                  <a:solidFill>
-                    <a:schemeClr val="bg1">
-                      <a:lumMod val="95000"/>
-                    </a:schemeClr>
-                  </a:solidFill>
-                </a:ln>
-              </p:spPr>
-              <p:style>
-                <a:lnRef idx="1">
-                  <a:schemeClr val="accent1"/>
-                </a:lnRef>
-                <a:fillRef idx="0">
-                  <a:schemeClr val="accent1"/>
-                </a:fillRef>
-                <a:effectRef idx="0">
-                  <a:schemeClr val="accent1"/>
-                </a:effectRef>
-                <a:fontRef idx="minor">
-                  <a:schemeClr val="tx1"/>
-                </a:fontRef>
-              </p:style>
-            </p:cxnSp>
-            <p:cxnSp>
-              <p:nvCxnSpPr>
-                <p:cNvPr id="185" name="Straight Connector 184">
-                  <a:extLst>
-                    <a:ext uri="{FF2B5EF4-FFF2-40B4-BE49-F238E27FC236}">
-                      <a16:creationId xmlns:a16="http://schemas.microsoft.com/office/drawing/2014/main" id="{37BF1A07-D8E2-098C-1623-5939B6C98B94}"/>
-                    </a:ext>
-                  </a:extLst>
-                </p:cNvPr>
-                <p:cNvCxnSpPr>
-                  <a:cxnSpLocks/>
-                </p:cNvCxnSpPr>
-                <p:nvPr/>
-              </p:nvCxnSpPr>
-              <p:spPr>
-                <a:xfrm>
-                  <a:off x="1371411" y="3268505"/>
-                  <a:ext cx="342900" cy="0"/>
-                </a:xfrm>
-                <a:prstGeom prst="line">
-                  <a:avLst/>
-                </a:prstGeom>
-                <a:ln>
-                  <a:solidFill>
-                    <a:schemeClr val="bg1">
-                      <a:lumMod val="95000"/>
-                    </a:schemeClr>
-                  </a:solidFill>
-                </a:ln>
-              </p:spPr>
-              <p:style>
-                <a:lnRef idx="1">
-                  <a:schemeClr val="accent1"/>
-                </a:lnRef>
-                <a:fillRef idx="0">
-                  <a:schemeClr val="accent1"/>
-                </a:fillRef>
-                <a:effectRef idx="0">
-                  <a:schemeClr val="accent1"/>
-                </a:effectRef>
-                <a:fontRef idx="minor">
-                  <a:schemeClr val="tx1"/>
-                </a:fontRef>
-              </p:style>
-            </p:cxnSp>
-            <p:cxnSp>
-              <p:nvCxnSpPr>
-                <p:cNvPr id="186" name="Straight Connector 185">
-                  <a:extLst>
-                    <a:ext uri="{FF2B5EF4-FFF2-40B4-BE49-F238E27FC236}">
-                      <a16:creationId xmlns:a16="http://schemas.microsoft.com/office/drawing/2014/main" id="{1D619632-A183-A798-1058-41283F278AD7}"/>
-                    </a:ext>
-                  </a:extLst>
-                </p:cNvPr>
-                <p:cNvCxnSpPr>
-                  <a:cxnSpLocks/>
-                </p:cNvCxnSpPr>
-                <p:nvPr/>
-              </p:nvCxnSpPr>
-              <p:spPr>
-                <a:xfrm>
-                  <a:off x="1371411" y="3349983"/>
-                  <a:ext cx="342900" cy="0"/>
-                </a:xfrm>
-                <a:prstGeom prst="line">
-                  <a:avLst/>
-                </a:prstGeom>
-                <a:ln>
-                  <a:solidFill>
-                    <a:schemeClr val="bg1">
-                      <a:lumMod val="95000"/>
-                    </a:schemeClr>
-                  </a:solidFill>
-                </a:ln>
-              </p:spPr>
-              <p:style>
-                <a:lnRef idx="1">
-                  <a:schemeClr val="accent1"/>
-                </a:lnRef>
-                <a:fillRef idx="0">
-                  <a:schemeClr val="accent1"/>
-                </a:fillRef>
-                <a:effectRef idx="0">
-                  <a:schemeClr val="accent1"/>
-                </a:effectRef>
-                <a:fontRef idx="minor">
-                  <a:schemeClr val="tx1"/>
-                </a:fontRef>
-              </p:style>
-            </p:cxnSp>
-          </p:grpSp>
-        </p:grpSp>
-        <p:sp>
-          <p:nvSpPr>
-            <p:cNvPr id="179" name="TextBox 178">
-              <a:extLst>
-                <a:ext uri="{FF2B5EF4-FFF2-40B4-BE49-F238E27FC236}">
-                  <a16:creationId xmlns:a16="http://schemas.microsoft.com/office/drawing/2014/main" id="{811CEC84-CFD4-0440-41EF-9388CCBE700C}"/>
-                </a:ext>
-              </a:extLst>
-            </p:cNvPr>
-            <p:cNvSpPr txBox="1"/>
-            <p:nvPr/>
-          </p:nvSpPr>
-          <p:spPr>
-            <a:xfrm>
-              <a:off x="6481755" y="4256291"/>
-              <a:ext cx="1482551" cy="679435"/>
-            </a:xfrm>
-            <a:prstGeom prst="rect">
-              <a:avLst/>
-            </a:prstGeom>
-            <a:noFill/>
-          </p:spPr>
-          <p:txBody>
-            <a:bodyPr wrap="square" rtlCol="0">
-              <a:spAutoFit/>
-            </a:bodyPr>
-            <a:lstStyle/>
-            <a:p>
-              <a:pPr algn="ctr"/>
-              <a:r>
-                <a:rPr lang="en-US" sz="800" dirty="0">
-                  <a:solidFill>
-                    <a:schemeClr val="accent1"/>
-                  </a:solidFill>
-                </a:rPr>
-                <a:t>Quelle</a:t>
-              </a:r>
-            </a:p>
-            <a:p>
-              <a:pPr algn="ctr"/>
-              <a:r>
-                <a:rPr lang="en-US" sz="800" dirty="0">
-                  <a:solidFill>
-                    <a:schemeClr val="accent1"/>
-                  </a:solidFill>
-                </a:rPr>
-                <a:t>user-data &lt;&lt;</a:t>
-              </a:r>
-              <a:r>
-                <a:rPr lang="en-US" sz="800" dirty="0" err="1">
-                  <a:solidFill>
-                    <a:schemeClr val="accent1"/>
-                  </a:solidFill>
-                </a:rPr>
-                <a:t>flatbuffers</a:t>
-              </a:r>
-              <a:r>
-                <a:rPr lang="en-US" sz="800" dirty="0">
-                  <a:solidFill>
-                    <a:schemeClr val="accent1"/>
-                  </a:solidFill>
-                </a:rPr>
-                <a:t>&gt;&gt;</a:t>
-              </a:r>
-            </a:p>
-          </p:txBody>
-        </p:sp>
-      </p:grpSp>
-      <p:grpSp>
-        <p:nvGrpSpPr>
           <p:cNvPr id="209" name="Group 208">
             <a:extLst>
               <a:ext uri="{FF2B5EF4-FFF2-40B4-BE49-F238E27FC236}">
@@ -8551,61 +8023,7 @@
         </p:nvSpPr>
         <p:spPr>
           <a:xfrm>
-            <a:off x="7471727" y="2849460"/>
-            <a:ext cx="82583" cy="77170"/>
-          </a:xfrm>
-          <a:prstGeom prst="rightArrow">
-            <a:avLst/>
-          </a:prstGeom>
-          <a:solidFill>
-            <a:schemeClr val="bg2"/>
-          </a:solidFill>
-          <a:ln>
-            <a:solidFill>
-              <a:schemeClr val="accent1"/>
-            </a:solidFill>
-          </a:ln>
-        </p:spPr>
-        <p:style>
-          <a:lnRef idx="2">
-            <a:schemeClr val="accent1">
-              <a:shade val="50000"/>
-            </a:schemeClr>
-          </a:lnRef>
-          <a:fillRef idx="1">
-            <a:schemeClr val="accent1"/>
-          </a:fillRef>
-          <a:effectRef idx="0">
-            <a:schemeClr val="accent1"/>
-          </a:effectRef>
-          <a:fontRef idx="minor">
-            <a:schemeClr val="lt1"/>
-          </a:fontRef>
-        </p:style>
-        <p:txBody>
-          <a:bodyPr rtlCol="0" anchor="ctr"/>
-          <a:lstStyle/>
-          <a:p>
-            <a:pPr algn="ctr"/>
-            <a:endParaRPr lang="en-US"/>
-          </a:p>
-        </p:txBody>
-      </p:sp>
-      <p:sp>
-        <p:nvSpPr>
-          <p:cNvPr id="271" name="Arrow: Right 270">
-            <a:extLst>
-              <a:ext uri="{FF2B5EF4-FFF2-40B4-BE49-F238E27FC236}">
-                <a16:creationId xmlns:a16="http://schemas.microsoft.com/office/drawing/2014/main" id="{38924893-120A-D880-7BB2-EAD251B1683F}"/>
-              </a:ext>
-            </a:extLst>
-          </p:cNvPr>
-          <p:cNvSpPr/>
-          <p:nvPr/>
-        </p:nvSpPr>
-        <p:spPr>
-          <a:xfrm>
-            <a:off x="7296860" y="3115666"/>
+            <a:off x="7124062" y="3117378"/>
             <a:ext cx="82583" cy="77170"/>
           </a:xfrm>
           <a:prstGeom prst="rightArrow">
@@ -9687,6 +9105,99 @@
           </a:fontRef>
         </p:style>
       </p:cxnSp>
+      <p:sp>
+        <p:nvSpPr>
+          <p:cNvPr id="68" name="Arrow: Right 67">
+            <a:extLst>
+              <a:ext uri="{FF2B5EF4-FFF2-40B4-BE49-F238E27FC236}">
+                <a16:creationId xmlns:a16="http://schemas.microsoft.com/office/drawing/2014/main" id="{884A0F8F-99DB-EB0E-E3E8-E1BE560854DA}"/>
+              </a:ext>
+            </a:extLst>
+          </p:cNvPr>
+          <p:cNvSpPr/>
+          <p:nvPr/>
+        </p:nvSpPr>
+        <p:spPr>
+          <a:xfrm rot="10800000">
+            <a:off x="6776143" y="2887776"/>
+            <a:ext cx="82583" cy="77170"/>
+          </a:xfrm>
+          <a:prstGeom prst="rightArrow">
+            <a:avLst/>
+          </a:prstGeom>
+          <a:solidFill>
+            <a:schemeClr val="bg2"/>
+          </a:solidFill>
+          <a:ln>
+            <a:solidFill>
+              <a:schemeClr val="accent1"/>
+            </a:solidFill>
+          </a:ln>
+        </p:spPr>
+        <p:style>
+          <a:lnRef idx="2">
+            <a:schemeClr val="accent1">
+              <a:shade val="50000"/>
+            </a:schemeClr>
+          </a:lnRef>
+          <a:fillRef idx="1">
+            <a:schemeClr val="accent1"/>
+          </a:fillRef>
+          <a:effectRef idx="0">
+            <a:schemeClr val="accent1"/>
+          </a:effectRef>
+          <a:fontRef idx="minor">
+            <a:schemeClr val="lt1"/>
+          </a:fontRef>
+        </p:style>
+        <p:txBody>
+          <a:bodyPr rtlCol="0" anchor="ctr"/>
+          <a:lstStyle/>
+          <a:p>
+            <a:pPr algn="ctr"/>
+            <a:endParaRPr lang="en-US" sz="800"/>
+          </a:p>
+        </p:txBody>
+      </p:sp>
+      <p:sp>
+        <p:nvSpPr>
+          <p:cNvPr id="69" name="TextBox 68">
+            <a:extLst>
+              <a:ext uri="{FF2B5EF4-FFF2-40B4-BE49-F238E27FC236}">
+                <a16:creationId xmlns:a16="http://schemas.microsoft.com/office/drawing/2014/main" id="{7D80C2C8-DB3A-27E1-0E24-8A1AB42FF807}"/>
+              </a:ext>
+            </a:extLst>
+          </p:cNvPr>
+          <p:cNvSpPr txBox="1"/>
+          <p:nvPr/>
+        </p:nvSpPr>
+        <p:spPr>
+          <a:xfrm>
+            <a:off x="6808125" y="2811234"/>
+            <a:ext cx="1179259" cy="215444"/>
+          </a:xfrm>
+          <a:prstGeom prst="rect">
+            <a:avLst/>
+          </a:prstGeom>
+          <a:noFill/>
+        </p:spPr>
+        <p:txBody>
+          <a:bodyPr wrap="square" rtlCol="0">
+            <a:spAutoFit/>
+          </a:bodyPr>
+          <a:lstStyle/>
+          <a:p>
+            <a:r>
+              <a:rPr lang="en-US" sz="800" dirty="0">
+                <a:solidFill>
+                  <a:schemeClr val="accent1"/>
+                </a:solidFill>
+              </a:rPr>
+              <a:t>Quelle command string</a:t>
+            </a:r>
+          </a:p>
+        </p:txBody>
+      </p:sp>
     </p:spTree>
     <p:extLst>
       <p:ext uri="{BB962C8B-B14F-4D97-AF65-F5344CB8AC3E}">

</xml_diff>

<commit_message>
Tweak diagram (remove win32; use only x64 C++)
</commit_message>
<xml_diff>
--- a/AVXSearch/AVX-Search.pptx
+++ b/AVXSearch/AVX-Search.pptx
@@ -262,7 +262,7 @@
           <a:p>
             <a:fld id="{00872148-4BA6-4738-8A8B-AEF1C14E9646}" type="datetimeFigureOut">
               <a:rPr lang="en-US" smtClean="0"/>
-              <a:t>5/1/2023</a:t>
+              <a:t>5/2/2023</a:t>
             </a:fld>
             <a:endParaRPr lang="en-US"/>
           </a:p>
@@ -460,7 +460,7 @@
           <a:p>
             <a:fld id="{00872148-4BA6-4738-8A8B-AEF1C14E9646}" type="datetimeFigureOut">
               <a:rPr lang="en-US" smtClean="0"/>
-              <a:t>5/1/2023</a:t>
+              <a:t>5/2/2023</a:t>
             </a:fld>
             <a:endParaRPr lang="en-US"/>
           </a:p>
@@ -668,7 +668,7 @@
           <a:p>
             <a:fld id="{00872148-4BA6-4738-8A8B-AEF1C14E9646}" type="datetimeFigureOut">
               <a:rPr lang="en-US" smtClean="0"/>
-              <a:t>5/1/2023</a:t>
+              <a:t>5/2/2023</a:t>
             </a:fld>
             <a:endParaRPr lang="en-US"/>
           </a:p>
@@ -866,7 +866,7 @@
           <a:p>
             <a:fld id="{00872148-4BA6-4738-8A8B-AEF1C14E9646}" type="datetimeFigureOut">
               <a:rPr lang="en-US" smtClean="0"/>
-              <a:t>5/1/2023</a:t>
+              <a:t>5/2/2023</a:t>
             </a:fld>
             <a:endParaRPr lang="en-US"/>
           </a:p>
@@ -1141,7 +1141,7 @@
           <a:p>
             <a:fld id="{00872148-4BA6-4738-8A8B-AEF1C14E9646}" type="datetimeFigureOut">
               <a:rPr lang="en-US" smtClean="0"/>
-              <a:t>5/1/2023</a:t>
+              <a:t>5/2/2023</a:t>
             </a:fld>
             <a:endParaRPr lang="en-US"/>
           </a:p>
@@ -1406,7 +1406,7 @@
           <a:p>
             <a:fld id="{00872148-4BA6-4738-8A8B-AEF1C14E9646}" type="datetimeFigureOut">
               <a:rPr lang="en-US" smtClean="0"/>
-              <a:t>5/1/2023</a:t>
+              <a:t>5/2/2023</a:t>
             </a:fld>
             <a:endParaRPr lang="en-US"/>
           </a:p>
@@ -1818,7 +1818,7 @@
           <a:p>
             <a:fld id="{00872148-4BA6-4738-8A8B-AEF1C14E9646}" type="datetimeFigureOut">
               <a:rPr lang="en-US" smtClean="0"/>
-              <a:t>5/1/2023</a:t>
+              <a:t>5/2/2023</a:t>
             </a:fld>
             <a:endParaRPr lang="en-US"/>
           </a:p>
@@ -1959,7 +1959,7 @@
           <a:p>
             <a:fld id="{00872148-4BA6-4738-8A8B-AEF1C14E9646}" type="datetimeFigureOut">
               <a:rPr lang="en-US" smtClean="0"/>
-              <a:t>5/1/2023</a:t>
+              <a:t>5/2/2023</a:t>
             </a:fld>
             <a:endParaRPr lang="en-US"/>
           </a:p>
@@ -2072,7 +2072,7 @@
           <a:p>
             <a:fld id="{00872148-4BA6-4738-8A8B-AEF1C14E9646}" type="datetimeFigureOut">
               <a:rPr lang="en-US" smtClean="0"/>
-              <a:t>5/1/2023</a:t>
+              <a:t>5/2/2023</a:t>
             </a:fld>
             <a:endParaRPr lang="en-US"/>
           </a:p>
@@ -2383,7 +2383,7 @@
           <a:p>
             <a:fld id="{00872148-4BA6-4738-8A8B-AEF1C14E9646}" type="datetimeFigureOut">
               <a:rPr lang="en-US" smtClean="0"/>
-              <a:t>5/1/2023</a:t>
+              <a:t>5/2/2023</a:t>
             </a:fld>
             <a:endParaRPr lang="en-US"/>
           </a:p>
@@ -2671,7 +2671,7 @@
           <a:p>
             <a:fld id="{00872148-4BA6-4738-8A8B-AEF1C14E9646}" type="datetimeFigureOut">
               <a:rPr lang="en-US" smtClean="0"/>
-              <a:t>5/1/2023</a:t>
+              <a:t>5/2/2023</a:t>
             </a:fld>
             <a:endParaRPr lang="en-US"/>
           </a:p>
@@ -2912,7 +2912,7 @@
           <a:p>
             <a:fld id="{00872148-4BA6-4738-8A8B-AEF1C14E9646}" type="datetimeFigureOut">
               <a:rPr lang="en-US" smtClean="0"/>
-              <a:t>5/1/2023</a:t>
+              <a:t>5/2/2023</a:t>
             </a:fld>
             <a:endParaRPr lang="en-US"/>
           </a:p>
@@ -5975,7 +5975,7 @@
             <a:pPr algn="ctr"/>
             <a:r>
               <a:rPr lang="en-US" sz="800" dirty="0"/>
-              <a:t>&lt;&lt; C++ / x64 or Win32 &gt;&gt;</a:t>
+              <a:t>&lt;&lt; C++ / x64 &gt;&gt;</a:t>
             </a:r>
           </a:p>
           <a:p>
@@ -6046,7 +6046,7 @@
             <a:pPr algn="ctr"/>
             <a:r>
               <a:rPr lang="en-US" sz="800" dirty="0"/>
-              <a:t>&lt;&lt; C++ / x64 or Win32 &gt;&gt;</a:t>
+              <a:t>&lt;&lt; C++ / x64 &gt;&gt;</a:t>
             </a:r>
           </a:p>
           <a:p>
@@ -6674,17 +6674,19 @@
           </p:cNvPr>
           <p:cNvCxnSpPr>
             <a:cxnSpLocks/>
+            <a:stCxn id="120" idx="1"/>
+            <a:endCxn id="89" idx="3"/>
           </p:cNvCxnSpPr>
           <p:nvPr/>
         </p:nvCxnSpPr>
         <p:spPr>
           <a:xfrm rot="10800000">
-            <a:off x="9484890" y="3447606"/>
+            <a:off x="9484890" y="3257106"/>
             <a:ext cx="488256" cy="2538"/>
           </a:xfrm>
           <a:prstGeom prst="bentConnector3">
             <a:avLst>
-              <a:gd name="adj1" fmla="val 1717"/>
+              <a:gd name="adj1" fmla="val 50000"/>
             </a:avLst>
           </a:prstGeom>
           <a:ln>
@@ -8391,7 +8393,7 @@
             <a:pPr algn="ctr"/>
             <a:r>
               <a:rPr lang="en-US" sz="800" dirty="0"/>
-              <a:t>&lt;&lt; C# / win32 &gt;&gt;</a:t>
+              <a:t>&lt;&lt; C# &gt;&gt;</a:t>
             </a:r>
           </a:p>
           <a:p>
@@ -8429,13 +8431,15 @@
           </p:cNvPr>
           <p:cNvCxnSpPr>
             <a:cxnSpLocks/>
+            <a:stCxn id="327" idx="2"/>
+            <a:endCxn id="120" idx="0"/>
           </p:cNvCxnSpPr>
           <p:nvPr/>
         </p:nvCxnSpPr>
         <p:spPr>
-          <a:xfrm rot="10800000" flipV="1">
-            <a:off x="9484890" y="1804177"/>
-            <a:ext cx="488255" cy="1439808"/>
+          <a:xfrm rot="16200000" flipH="1">
+            <a:off x="10529559" y="2538470"/>
+            <a:ext cx="462632" cy="1"/>
           </a:xfrm>
           <a:prstGeom prst="bentConnector3">
             <a:avLst>

</xml_diff>

<commit_message>
Add dllexport to AVXBlueprint class; update diagram for AVXSearch
</commit_message>
<xml_diff>
--- a/AVXSearch/AVX-Search.pptx
+++ b/AVXSearch/AVX-Search.pptx
@@ -6084,20 +6084,16 @@
           </p:cNvPr>
           <p:cNvCxnSpPr>
             <a:cxnSpLocks/>
-            <a:stCxn id="107" idx="0"/>
-            <a:endCxn id="89" idx="2"/>
           </p:cNvCxnSpPr>
           <p:nvPr/>
         </p:nvCxnSpPr>
         <p:spPr>
-          <a:xfrm rot="16200000" flipV="1">
-            <a:off x="8473160" y="3970965"/>
-            <a:ext cx="448005" cy="1"/>
+          <a:xfrm flipV="1">
+            <a:off x="9480581" y="3767463"/>
+            <a:ext cx="501185" cy="444670"/>
           </a:xfrm>
-          <a:prstGeom prst="bentConnector3">
-            <a:avLst>
-              <a:gd name="adj1" fmla="val 50000"/>
-            </a:avLst>
+          <a:prstGeom prst="straightConnector1">
+            <a:avLst/>
           </a:prstGeom>
           <a:ln>
             <a:tailEnd type="triangle"/>
@@ -6204,7 +6200,7 @@
             <a:pPr algn="ctr"/>
             <a:r>
               <a:rPr lang="en-US" sz="800" dirty="0"/>
-              <a:t>&lt;&lt; C++ or Delphi / x64 &gt;&gt;</a:t>
+              <a:t>&lt;&lt; Delphi / x64 &gt;&gt;</a:t>
             </a:r>
           </a:p>
           <a:p>
@@ -6217,17 +6213,10 @@
           <a:p>
             <a:pPr algn="ctr"/>
             <a:r>
-              <a:rPr lang="en-US" sz="800" dirty="0"/>
-              <a:t>[</a:t>
-            </a:r>
-            <a:r>
-              <a:rPr lang="en-US" sz="800" dirty="0" err="1"/>
-              <a:t>FireMonkey</a:t>
-            </a:r>
-            <a:r>
-              <a:rPr lang="en-US" sz="800" dirty="0"/>
-              <a:t> UI]</a:t>
-            </a:r>
+              <a:rPr lang="en-US" sz="800"/>
+              <a:t>[Windows]</a:t>
+            </a:r>
+            <a:endParaRPr lang="en-US" sz="800" dirty="0"/>
           </a:p>
         </p:txBody>
       </p:sp>
@@ -6252,10 +6241,7 @@
             <a:avLst/>
           </a:prstGeom>
           <a:solidFill>
-            <a:schemeClr val="tx1">
-              <a:lumMod val="50000"/>
-              <a:lumOff val="50000"/>
-            </a:schemeClr>
+            <a:schemeClr val="accent1"/>
           </a:solidFill>
         </p:spPr>
         <p:style>
@@ -6288,7 +6274,7 @@
             <a:pPr algn="ctr"/>
             <a:r>
               <a:rPr lang="en-US" dirty="0"/>
-              <a:t>AV-Word-Web</a:t>
+              <a:t>AVX-Web</a:t>
             </a:r>
           </a:p>
           <a:p>
@@ -7977,20 +7963,16 @@
           </p:cNvPr>
           <p:cNvCxnSpPr>
             <a:cxnSpLocks/>
-            <a:stCxn id="251" idx="3"/>
-            <a:endCxn id="89" idx="1"/>
           </p:cNvCxnSpPr>
           <p:nvPr/>
         </p:nvCxnSpPr>
         <p:spPr>
           <a:xfrm flipV="1">
-            <a:off x="7430232" y="3257106"/>
-            <a:ext cx="479199" cy="1423375"/>
+            <a:off x="7425705" y="3746963"/>
+            <a:ext cx="479417" cy="423161"/>
           </a:xfrm>
-          <a:prstGeom prst="bentConnector3">
-            <a:avLst>
-              <a:gd name="adj1" fmla="val 50000"/>
-            </a:avLst>
+          <a:prstGeom prst="straightConnector1">
+            <a:avLst/>
           </a:prstGeom>
           <a:ln>
             <a:tailEnd type="triangle"/>

</xml_diff>

<commit_message>
refactored to use Omega.data SDK file instead of foundations/cpp; Creation of a new AVXLib
</commit_message>
<xml_diff>
--- a/AVXSearch/AVX-Search.pptx
+++ b/AVXSearch/AVX-Search.pptx
@@ -262,7 +262,7 @@
           <a:p>
             <a:fld id="{00872148-4BA6-4738-8A8B-AEF1C14E9646}" type="datetimeFigureOut">
               <a:rPr lang="en-US" smtClean="0"/>
-              <a:t>5/2/2023</a:t>
+              <a:t>5/3/2023</a:t>
             </a:fld>
             <a:endParaRPr lang="en-US"/>
           </a:p>
@@ -460,7 +460,7 @@
           <a:p>
             <a:fld id="{00872148-4BA6-4738-8A8B-AEF1C14E9646}" type="datetimeFigureOut">
               <a:rPr lang="en-US" smtClean="0"/>
-              <a:t>5/2/2023</a:t>
+              <a:t>5/3/2023</a:t>
             </a:fld>
             <a:endParaRPr lang="en-US"/>
           </a:p>
@@ -668,7 +668,7 @@
           <a:p>
             <a:fld id="{00872148-4BA6-4738-8A8B-AEF1C14E9646}" type="datetimeFigureOut">
               <a:rPr lang="en-US" smtClean="0"/>
-              <a:t>5/2/2023</a:t>
+              <a:t>5/3/2023</a:t>
             </a:fld>
             <a:endParaRPr lang="en-US"/>
           </a:p>
@@ -866,7 +866,7 @@
           <a:p>
             <a:fld id="{00872148-4BA6-4738-8A8B-AEF1C14E9646}" type="datetimeFigureOut">
               <a:rPr lang="en-US" smtClean="0"/>
-              <a:t>5/2/2023</a:t>
+              <a:t>5/3/2023</a:t>
             </a:fld>
             <a:endParaRPr lang="en-US"/>
           </a:p>
@@ -1141,7 +1141,7 @@
           <a:p>
             <a:fld id="{00872148-4BA6-4738-8A8B-AEF1C14E9646}" type="datetimeFigureOut">
               <a:rPr lang="en-US" smtClean="0"/>
-              <a:t>5/2/2023</a:t>
+              <a:t>5/3/2023</a:t>
             </a:fld>
             <a:endParaRPr lang="en-US"/>
           </a:p>
@@ -1406,7 +1406,7 @@
           <a:p>
             <a:fld id="{00872148-4BA6-4738-8A8B-AEF1C14E9646}" type="datetimeFigureOut">
               <a:rPr lang="en-US" smtClean="0"/>
-              <a:t>5/2/2023</a:t>
+              <a:t>5/3/2023</a:t>
             </a:fld>
             <a:endParaRPr lang="en-US"/>
           </a:p>
@@ -1818,7 +1818,7 @@
           <a:p>
             <a:fld id="{00872148-4BA6-4738-8A8B-AEF1C14E9646}" type="datetimeFigureOut">
               <a:rPr lang="en-US" smtClean="0"/>
-              <a:t>5/2/2023</a:t>
+              <a:t>5/3/2023</a:t>
             </a:fld>
             <a:endParaRPr lang="en-US"/>
           </a:p>
@@ -1959,7 +1959,7 @@
           <a:p>
             <a:fld id="{00872148-4BA6-4738-8A8B-AEF1C14E9646}" type="datetimeFigureOut">
               <a:rPr lang="en-US" smtClean="0"/>
-              <a:t>5/2/2023</a:t>
+              <a:t>5/3/2023</a:t>
             </a:fld>
             <a:endParaRPr lang="en-US"/>
           </a:p>
@@ -2072,7 +2072,7 @@
           <a:p>
             <a:fld id="{00872148-4BA6-4738-8A8B-AEF1C14E9646}" type="datetimeFigureOut">
               <a:rPr lang="en-US" smtClean="0"/>
-              <a:t>5/2/2023</a:t>
+              <a:t>5/3/2023</a:t>
             </a:fld>
             <a:endParaRPr lang="en-US"/>
           </a:p>
@@ -2383,7 +2383,7 @@
           <a:p>
             <a:fld id="{00872148-4BA6-4738-8A8B-AEF1C14E9646}" type="datetimeFigureOut">
               <a:rPr lang="en-US" smtClean="0"/>
-              <a:t>5/2/2023</a:t>
+              <a:t>5/3/2023</a:t>
             </a:fld>
             <a:endParaRPr lang="en-US"/>
           </a:p>
@@ -2671,7 +2671,7 @@
           <a:p>
             <a:fld id="{00872148-4BA6-4738-8A8B-AEF1C14E9646}" type="datetimeFigureOut">
               <a:rPr lang="en-US" smtClean="0"/>
-              <a:t>5/2/2023</a:t>
+              <a:t>5/3/2023</a:t>
             </a:fld>
             <a:endParaRPr lang="en-US"/>
           </a:p>
@@ -2912,7 +2912,7 @@
           <a:p>
             <a:fld id="{00872148-4BA6-4738-8A8B-AEF1C14E9646}" type="datetimeFigureOut">
               <a:rPr lang="en-US" smtClean="0"/>
-              <a:t>5/2/2023</a:t>
+              <a:t>5/3/2023</a:t>
             </a:fld>
             <a:endParaRPr lang="en-US"/>
           </a:p>
@@ -5991,16 +5991,23 @@
           <a:p>
             <a:pPr algn="ctr"/>
             <a:r>
-              <a:rPr lang="en-US" dirty="0" err="1"/>
-              <a:t>XVMem</a:t>
+              <a:rPr lang="en-US" dirty="0"/>
+              <a:t>AVX-Lib</a:t>
             </a:r>
-            <a:endParaRPr lang="en-US" dirty="0"/>
           </a:p>
           <a:p>
             <a:pPr algn="ctr"/>
             <a:r>
               <a:rPr lang="en-US" sz="800" dirty="0"/>
-              <a:t>[library]</a:t>
+              <a:t>[depends also on </a:t>
+            </a:r>
+            <a:r>
+              <a:rPr lang="en-US" sz="800" dirty="0" err="1"/>
+              <a:t>XVMem</a:t>
+            </a:r>
+            <a:r>
+              <a:rPr lang="en-US" sz="800" dirty="0"/>
+              <a:t>]</a:t>
             </a:r>
           </a:p>
         </p:txBody>
@@ -6217,7 +6224,7 @@
             <a:pPr algn="ctr"/>
             <a:r>
               <a:rPr lang="en-US" sz="800"/>
-              <a:t>[Windows]</a:t>
+              <a:t>[initially Windows only]</a:t>
             </a:r>
             <a:endParaRPr lang="en-US" sz="800" dirty="0"/>
           </a:p>

</xml_diff>

<commit_message>
Color-code the roadmap, with estimated completions
</commit_message>
<xml_diff>
--- a/AVXSearch/AVX-Search.pptx
+++ b/AVXSearch/AVX-Search.pptx
@@ -262,7 +262,7 @@
           <a:p>
             <a:fld id="{00872148-4BA6-4738-8A8B-AEF1C14E9646}" type="datetimeFigureOut">
               <a:rPr lang="en-US" smtClean="0"/>
-              <a:t>5/3/2023</a:t>
+              <a:t>5/4/2023</a:t>
             </a:fld>
             <a:endParaRPr lang="en-US"/>
           </a:p>
@@ -460,7 +460,7 @@
           <a:p>
             <a:fld id="{00872148-4BA6-4738-8A8B-AEF1C14E9646}" type="datetimeFigureOut">
               <a:rPr lang="en-US" smtClean="0"/>
-              <a:t>5/3/2023</a:t>
+              <a:t>5/4/2023</a:t>
             </a:fld>
             <a:endParaRPr lang="en-US"/>
           </a:p>
@@ -668,7 +668,7 @@
           <a:p>
             <a:fld id="{00872148-4BA6-4738-8A8B-AEF1C14E9646}" type="datetimeFigureOut">
               <a:rPr lang="en-US" smtClean="0"/>
-              <a:t>5/3/2023</a:t>
+              <a:t>5/4/2023</a:t>
             </a:fld>
             <a:endParaRPr lang="en-US"/>
           </a:p>
@@ -866,7 +866,7 @@
           <a:p>
             <a:fld id="{00872148-4BA6-4738-8A8B-AEF1C14E9646}" type="datetimeFigureOut">
               <a:rPr lang="en-US" smtClean="0"/>
-              <a:t>5/3/2023</a:t>
+              <a:t>5/4/2023</a:t>
             </a:fld>
             <a:endParaRPr lang="en-US"/>
           </a:p>
@@ -1141,7 +1141,7 @@
           <a:p>
             <a:fld id="{00872148-4BA6-4738-8A8B-AEF1C14E9646}" type="datetimeFigureOut">
               <a:rPr lang="en-US" smtClean="0"/>
-              <a:t>5/3/2023</a:t>
+              <a:t>5/4/2023</a:t>
             </a:fld>
             <a:endParaRPr lang="en-US"/>
           </a:p>
@@ -1406,7 +1406,7 @@
           <a:p>
             <a:fld id="{00872148-4BA6-4738-8A8B-AEF1C14E9646}" type="datetimeFigureOut">
               <a:rPr lang="en-US" smtClean="0"/>
-              <a:t>5/3/2023</a:t>
+              <a:t>5/4/2023</a:t>
             </a:fld>
             <a:endParaRPr lang="en-US"/>
           </a:p>
@@ -1818,7 +1818,7 @@
           <a:p>
             <a:fld id="{00872148-4BA6-4738-8A8B-AEF1C14E9646}" type="datetimeFigureOut">
               <a:rPr lang="en-US" smtClean="0"/>
-              <a:t>5/3/2023</a:t>
+              <a:t>5/4/2023</a:t>
             </a:fld>
             <a:endParaRPr lang="en-US"/>
           </a:p>
@@ -1959,7 +1959,7 @@
           <a:p>
             <a:fld id="{00872148-4BA6-4738-8A8B-AEF1C14E9646}" type="datetimeFigureOut">
               <a:rPr lang="en-US" smtClean="0"/>
-              <a:t>5/3/2023</a:t>
+              <a:t>5/4/2023</a:t>
             </a:fld>
             <a:endParaRPr lang="en-US"/>
           </a:p>
@@ -2072,7 +2072,7 @@
           <a:p>
             <a:fld id="{00872148-4BA6-4738-8A8B-AEF1C14E9646}" type="datetimeFigureOut">
               <a:rPr lang="en-US" smtClean="0"/>
-              <a:t>5/3/2023</a:t>
+              <a:t>5/4/2023</a:t>
             </a:fld>
             <a:endParaRPr lang="en-US"/>
           </a:p>
@@ -2383,7 +2383,7 @@
           <a:p>
             <a:fld id="{00872148-4BA6-4738-8A8B-AEF1C14E9646}" type="datetimeFigureOut">
               <a:rPr lang="en-US" smtClean="0"/>
-              <a:t>5/3/2023</a:t>
+              <a:t>5/4/2023</a:t>
             </a:fld>
             <a:endParaRPr lang="en-US"/>
           </a:p>
@@ -2671,7 +2671,7 @@
           <a:p>
             <a:fld id="{00872148-4BA6-4738-8A8B-AEF1C14E9646}" type="datetimeFigureOut">
               <a:rPr lang="en-US" smtClean="0"/>
-              <a:t>5/3/2023</a:t>
+              <a:t>5/4/2023</a:t>
             </a:fld>
             <a:endParaRPr lang="en-US"/>
           </a:p>
@@ -2912,7 +2912,7 @@
           <a:p>
             <a:fld id="{00872148-4BA6-4738-8A8B-AEF1C14E9646}" type="datetimeFigureOut">
               <a:rPr lang="en-US" smtClean="0"/>
-              <a:t>5/3/2023</a:t>
+              <a:t>5/4/2023</a:t>
             </a:fld>
             <a:endParaRPr lang="en-US"/>
           </a:p>
@@ -3441,6 +3441,9 @@
             </a:avLst>
           </a:prstGeom>
           <a:ln>
+            <a:solidFill>
+              <a:srgbClr val="7030A0"/>
+            </a:solidFill>
             <a:tailEnd type="triangle"/>
           </a:ln>
         </p:spPr>
@@ -3557,78 +3560,8 @@
           <a:prstGeom prst="rect">
             <a:avLst/>
           </a:prstGeom>
-        </p:spPr>
-        <p:style>
-          <a:lnRef idx="2">
-            <a:schemeClr val="accent1">
-              <a:shade val="50000"/>
-            </a:schemeClr>
-          </a:lnRef>
-          <a:fillRef idx="1">
-            <a:schemeClr val="accent1"/>
-          </a:fillRef>
-          <a:effectRef idx="0">
-            <a:schemeClr val="accent1"/>
-          </a:effectRef>
-          <a:fontRef idx="minor">
-            <a:schemeClr val="lt1"/>
-          </a:fontRef>
-        </p:style>
-        <p:txBody>
-          <a:bodyPr rtlCol="0" anchor="ctr"/>
-          <a:lstStyle/>
-          <a:p>
-            <a:pPr algn="ctr"/>
-            <a:r>
-              <a:rPr lang="en-US" sz="800" dirty="0"/>
-              <a:t>&lt;&lt; Rust x64 DLL &gt;&gt;</a:t>
-            </a:r>
-          </a:p>
-          <a:p>
-            <a:pPr algn="ctr"/>
-            <a:r>
-              <a:rPr lang="en-US" dirty="0" err="1"/>
-              <a:t>Pinshot</a:t>
-            </a:r>
-            <a:r>
-              <a:rPr lang="en-US" dirty="0"/>
-              <a:t>-Blue</a:t>
-            </a:r>
-          </a:p>
-          <a:p>
-            <a:pPr algn="ctr"/>
-            <a:r>
-              <a:rPr lang="en-US" sz="800" dirty="0"/>
-              <a:t>[formerly Pin-Shot-AVX]</a:t>
-            </a:r>
-          </a:p>
-        </p:txBody>
-      </p:sp>
-      <p:sp>
-        <p:nvSpPr>
-          <p:cNvPr id="9" name="Rectangle 8">
-            <a:extLst>
-              <a:ext uri="{FF2B5EF4-FFF2-40B4-BE49-F238E27FC236}">
-                <a16:creationId xmlns:a16="http://schemas.microsoft.com/office/drawing/2014/main" id="{52565C7E-5DB0-964E-982B-7D8F0BB3AE3A}"/>
-              </a:ext>
-            </a:extLst>
-          </p:cNvPr>
-          <p:cNvSpPr/>
-          <p:nvPr/>
-        </p:nvSpPr>
-        <p:spPr>
-          <a:xfrm>
-            <a:off x="2196373" y="4188052"/>
-            <a:ext cx="1575459" cy="979714"/>
-          </a:xfrm>
-          <a:prstGeom prst="rect">
-            <a:avLst/>
-          </a:prstGeom>
           <a:solidFill>
-            <a:schemeClr val="tx1">
-              <a:lumMod val="50000"/>
-              <a:lumOff val="50000"/>
-            </a:schemeClr>
+            <a:srgbClr val="7030A0"/>
           </a:solidFill>
         </p:spPr>
         <p:style>
@@ -3654,6 +3587,94 @@
             <a:pPr algn="ctr"/>
             <a:r>
               <a:rPr lang="en-US" sz="800" dirty="0"/>
+              <a:t>http://github.com/kwonus</a:t>
+            </a:r>
+          </a:p>
+          <a:p>
+            <a:pPr algn="ctr"/>
+            <a:r>
+              <a:rPr lang="en-US" sz="800" dirty="0"/>
+              <a:t>&lt;&lt; Rust x64 DLL &gt;&gt;</a:t>
+            </a:r>
+          </a:p>
+          <a:p>
+            <a:pPr algn="ctr"/>
+            <a:r>
+              <a:rPr lang="en-US" dirty="0" err="1"/>
+              <a:t>Pinshot</a:t>
+            </a:r>
+            <a:r>
+              <a:rPr lang="en-US" dirty="0"/>
+              <a:t>-Blue</a:t>
+            </a:r>
+          </a:p>
+          <a:p>
+            <a:pPr algn="ctr"/>
+            <a:endParaRPr lang="en-US" sz="800" dirty="0"/>
+          </a:p>
+          <a:p>
+            <a:pPr algn="ctr"/>
+            <a:r>
+              <a:rPr lang="en-US" sz="800" dirty="0"/>
+              <a:t>Q1/2023</a:t>
+            </a:r>
+          </a:p>
+        </p:txBody>
+      </p:sp>
+      <p:sp>
+        <p:nvSpPr>
+          <p:cNvPr id="9" name="Rectangle 8">
+            <a:extLst>
+              <a:ext uri="{FF2B5EF4-FFF2-40B4-BE49-F238E27FC236}">
+                <a16:creationId xmlns:a16="http://schemas.microsoft.com/office/drawing/2014/main" id="{52565C7E-5DB0-964E-982B-7D8F0BB3AE3A}"/>
+              </a:ext>
+            </a:extLst>
+          </p:cNvPr>
+          <p:cNvSpPr/>
+          <p:nvPr/>
+        </p:nvSpPr>
+        <p:spPr>
+          <a:xfrm>
+            <a:off x="2196373" y="4188052"/>
+            <a:ext cx="1575459" cy="979714"/>
+          </a:xfrm>
+          <a:prstGeom prst="rect">
+            <a:avLst/>
+          </a:prstGeom>
+          <a:solidFill>
+            <a:srgbClr val="7030A0"/>
+          </a:solidFill>
+        </p:spPr>
+        <p:style>
+          <a:lnRef idx="2">
+            <a:schemeClr val="accent1">
+              <a:shade val="50000"/>
+            </a:schemeClr>
+          </a:lnRef>
+          <a:fillRef idx="1">
+            <a:schemeClr val="accent1"/>
+          </a:fillRef>
+          <a:effectRef idx="0">
+            <a:schemeClr val="accent1"/>
+          </a:effectRef>
+          <a:fontRef idx="minor">
+            <a:schemeClr val="lt1"/>
+          </a:fontRef>
+        </p:style>
+        <p:txBody>
+          <a:bodyPr rtlCol="0" anchor="ctr"/>
+          <a:lstStyle/>
+          <a:p>
+            <a:pPr algn="ctr"/>
+            <a:r>
+              <a:rPr lang="en-US" sz="800" dirty="0"/>
+              <a:t>http://github.com/kwonus </a:t>
+            </a:r>
+          </a:p>
+          <a:p>
+            <a:pPr algn="ctr"/>
+            <a:r>
+              <a:rPr lang="en-US" sz="800" dirty="0"/>
               <a:t>&lt;&lt; Rust SVC &gt;&gt;</a:t>
             </a:r>
           </a:p>
@@ -3745,9 +3766,16 @@
               </a:rPr>
               <a:t>[formerly Pin-Shot-Blue]</a:t>
             </a:r>
+          </a:p>
+          <a:p>
+            <a:pPr algn="ctr"/>
+            <a:endParaRPr lang="en-US" sz="800" dirty="0"/>
+          </a:p>
+          <a:p>
+            <a:pPr algn="ctr"/>
             <a:r>
               <a:rPr lang="en-US" sz="800" dirty="0"/>
-              <a:t> </a:t>
+              <a:t>Q1/2023 </a:t>
             </a:r>
           </a:p>
         </p:txBody>
@@ -3832,6 +3860,9 @@
                 <a:prstGeom prst="rect">
                   <a:avLst/>
                 </a:prstGeom>
+                <a:solidFill>
+                  <a:srgbClr val="7030A0"/>
+                </a:solidFill>
               </p:spPr>
               <p:style>
                 <a:lnRef idx="2">
@@ -4250,7 +4281,7 @@
               <a:r>
                 <a:rPr lang="en-US" sz="800" dirty="0">
                   <a:solidFill>
-                    <a:schemeClr val="accent1"/>
+                    <a:srgbClr val="7030A0"/>
                   </a:solidFill>
                 </a:rPr>
                 <a:t>Quelle</a:t>
@@ -4261,7 +4292,7 @@
               <a:r>
                 <a:rPr lang="en-US" sz="800" dirty="0">
                   <a:solidFill>
-                    <a:schemeClr val="accent1"/>
+                    <a:srgbClr val="7030A0"/>
                   </a:solidFill>
                 </a:rPr>
                 <a:t>&lt;&lt;PEG Grammar&gt;&gt;</a:t>
@@ -4290,6 +4321,9 @@
           <a:prstGeom prst="rect">
             <a:avLst/>
           </a:prstGeom>
+          <a:solidFill>
+            <a:srgbClr val="7030A0"/>
+          </a:solidFill>
         </p:spPr>
         <p:style>
           <a:lnRef idx="2">
@@ -4314,6 +4348,13 @@
             <a:pPr algn="ctr"/>
             <a:r>
               <a:rPr lang="en-US" sz="800" dirty="0"/>
+              <a:t>http://github.com/kwonus</a:t>
+            </a:r>
+          </a:p>
+          <a:p>
+            <a:pPr algn="ctr"/>
+            <a:r>
+              <a:rPr lang="en-US" sz="800" dirty="0"/>
               <a:t>&lt;&lt; C# &gt;&gt;</a:t>
             </a:r>
           </a:p>
@@ -4337,6 +4378,17 @@
             <a:r>
               <a:rPr lang="en-US" sz="800" dirty="0"/>
               <a:t>]</a:t>
+            </a:r>
+          </a:p>
+          <a:p>
+            <a:pPr algn="ctr"/>
+            <a:endParaRPr lang="en-US" sz="800" dirty="0"/>
+          </a:p>
+          <a:p>
+            <a:pPr algn="ctr"/>
+            <a:r>
+              <a:rPr lang="en-US" sz="800" dirty="0"/>
+              <a:t>Q1/2023</a:t>
             </a:r>
           </a:p>
         </p:txBody>
@@ -4381,6 +4433,9 @@
             <a:prstGeom prst="ellipse">
               <a:avLst/>
             </a:prstGeom>
+            <a:solidFill>
+              <a:srgbClr val="7030A0"/>
+            </a:solidFill>
           </p:spPr>
           <p:style>
             <a:lnRef idx="2">
@@ -4431,7 +4486,7 @@
             </a:prstGeom>
             <a:ln w="31750">
               <a:solidFill>
-                <a:srgbClr val="4472C4"/>
+                <a:srgbClr val="7030A0"/>
               </a:solidFill>
             </a:ln>
           </p:spPr>
@@ -4497,7 +4552,14 @@
             <a:prstGeom prst="ellipse">
               <a:avLst/>
             </a:prstGeom>
-            <a:grpFill/>
+            <a:solidFill>
+              <a:srgbClr val="7030A0"/>
+            </a:solidFill>
+            <a:ln>
+              <a:solidFill>
+                <a:schemeClr val="accent1"/>
+              </a:solidFill>
+            </a:ln>
           </p:spPr>
           <p:style>
             <a:lnRef idx="2">
@@ -4549,10 +4611,7 @@
             <a:grpFill/>
             <a:ln w="31750">
               <a:solidFill>
-                <a:schemeClr val="tx1">
-                  <a:lumMod val="50000"/>
-                  <a:lumOff val="50000"/>
-                </a:schemeClr>
+                <a:srgbClr val="7030A0"/>
               </a:solidFill>
             </a:ln>
           </p:spPr>
@@ -4691,6 +4750,9 @@
             <a:avLst/>
           </a:prstGeom>
           <a:ln>
+            <a:solidFill>
+              <a:srgbClr val="7030A0"/>
+            </a:solidFill>
             <a:tailEnd type="triangle"/>
           </a:ln>
         </p:spPr>
@@ -4790,10 +4852,7 @@
                   <a:avLst/>
                 </a:prstGeom>
                 <a:solidFill>
-                  <a:schemeClr val="tx1">
-                    <a:lumMod val="50000"/>
-                    <a:lumOff val="50000"/>
-                  </a:schemeClr>
+                  <a:srgbClr val="7030A0"/>
                 </a:solidFill>
               </p:spPr>
               <p:style>
@@ -5213,20 +5272,14 @@
               <a:r>
                 <a:rPr lang="en-US" sz="800" dirty="0" err="1">
                   <a:solidFill>
-                    <a:schemeClr val="tx1">
-                      <a:lumMod val="50000"/>
-                      <a:lumOff val="50000"/>
-                    </a:schemeClr>
+                    <a:srgbClr val="7030A0"/>
                   </a:solidFill>
                 </a:rPr>
                 <a:t>Pinshot</a:t>
               </a:r>
               <a:endParaRPr lang="en-US" sz="800" dirty="0">
                 <a:solidFill>
-                  <a:schemeClr val="tx1">
-                    <a:lumMod val="50000"/>
-                    <a:lumOff val="50000"/>
-                  </a:schemeClr>
+                  <a:srgbClr val="7030A0"/>
                 </a:solidFill>
               </a:endParaRPr>
             </a:p>
@@ -5235,10 +5288,7 @@
               <a:r>
                 <a:rPr lang="en-US" sz="800" dirty="0">
                   <a:solidFill>
-                    <a:schemeClr val="tx1">
-                      <a:lumMod val="50000"/>
-                      <a:lumOff val="50000"/>
-                    </a:schemeClr>
+                    <a:srgbClr val="7030A0"/>
                   </a:solidFill>
                 </a:rPr>
                 <a:t>&lt;&lt;</a:t>
@@ -5246,10 +5296,7 @@
               <a:r>
                 <a:rPr lang="en-US" sz="800" dirty="0" err="1">
                   <a:solidFill>
-                    <a:schemeClr val="tx1">
-                      <a:lumMod val="50000"/>
-                      <a:lumOff val="50000"/>
-                    </a:schemeClr>
+                    <a:srgbClr val="7030A0"/>
                   </a:solidFill>
                 </a:rPr>
                 <a:t>json</a:t>
@@ -5257,10 +5304,7 @@
               <a:r>
                 <a:rPr lang="en-US" sz="800" dirty="0">
                   <a:solidFill>
-                    <a:schemeClr val="tx1">
-                      <a:lumMod val="50000"/>
-                      <a:lumOff val="50000"/>
-                    </a:schemeClr>
+                    <a:srgbClr val="7030A0"/>
                   </a:solidFill>
                 </a:rPr>
                 <a:t>&gt;&gt;</a:t>
@@ -5349,6 +5393,9 @@
                 <a:prstGeom prst="rect">
                   <a:avLst/>
                 </a:prstGeom>
+                <a:solidFill>
+                  <a:srgbClr val="7030A0"/>
+                </a:solidFill>
               </p:spPr>
               <p:style>
                 <a:lnRef idx="2">
@@ -5835,7 +5882,7 @@
             <a:r>
               <a:rPr lang="en-US" sz="1200" dirty="0">
                 <a:solidFill>
-                  <a:schemeClr val="accent1"/>
+                  <a:srgbClr val="7030A0"/>
                 </a:solidFill>
               </a:rPr>
               <a:t>Rust: FFI</a:t>
@@ -5874,7 +5921,7 @@
             <a:r>
               <a:rPr lang="en-US" sz="1200" dirty="0">
                 <a:solidFill>
-                  <a:schemeClr val="accent1"/>
+                  <a:srgbClr val="7030A0"/>
                 </a:solidFill>
               </a:rPr>
               <a:t>C#: P/Invoke [</a:t>
@@ -5882,7 +5929,7 @@
             <a:r>
               <a:rPr lang="en-US" sz="1200" dirty="0" err="1">
                 <a:solidFill>
-                  <a:schemeClr val="accent1"/>
+                  <a:srgbClr val="7030A0"/>
                 </a:solidFill>
               </a:rPr>
               <a:t>cdecl</a:t>
@@ -5890,7 +5937,7 @@
             <a:r>
               <a:rPr lang="en-US" sz="1200" dirty="0">
                 <a:solidFill>
-                  <a:schemeClr val="accent1"/>
+                  <a:srgbClr val="7030A0"/>
                 </a:solidFill>
               </a:rPr>
               <a:t>]</a:t>
@@ -5923,6 +5970,9 @@
             <a:avLst/>
           </a:prstGeom>
           <a:ln>
+            <a:solidFill>
+              <a:srgbClr val="7030A0"/>
+            </a:solidFill>
             <a:tailEnd type="triangle"/>
           </a:ln>
         </p:spPr>
@@ -5985,6 +6035,13 @@
             <a:pPr algn="ctr"/>
             <a:r>
               <a:rPr lang="en-US" sz="800" dirty="0"/>
+              <a:t>http://github.com/AV-Text</a:t>
+            </a:r>
+          </a:p>
+          <a:p>
+            <a:pPr algn="ctr"/>
+            <a:r>
+              <a:rPr lang="en-US" sz="800" dirty="0"/>
               <a:t>&lt;&lt; C++ / x64 &gt;&gt;</a:t>
             </a:r>
           </a:p>
@@ -5999,7 +6056,7 @@
             <a:pPr algn="ctr"/>
             <a:r>
               <a:rPr lang="en-US" sz="800" dirty="0"/>
-              <a:t>[depends also on </a:t>
+              <a:t>[depends includes </a:t>
             </a:r>
             <a:r>
               <a:rPr lang="en-US" sz="800" dirty="0" err="1"/>
@@ -6008,6 +6065,17 @@
             <a:r>
               <a:rPr lang="en-US" sz="800" dirty="0"/>
               <a:t>]</a:t>
+            </a:r>
+          </a:p>
+          <a:p>
+            <a:pPr algn="ctr"/>
+            <a:endParaRPr lang="en-US" sz="800" dirty="0"/>
+          </a:p>
+          <a:p>
+            <a:pPr algn="ctr"/>
+            <a:r>
+              <a:rPr lang="en-US" sz="800" dirty="0"/>
+              <a:t>Q2/2023</a:t>
             </a:r>
           </a:p>
         </p:txBody>
@@ -6056,6 +6124,13 @@
             <a:pPr algn="ctr"/>
             <a:r>
               <a:rPr lang="en-US" sz="800" dirty="0"/>
+              <a:t>http://github.com/AV-Text</a:t>
+            </a:r>
+          </a:p>
+          <a:p>
+            <a:pPr algn="ctr"/>
+            <a:r>
+              <a:rPr lang="en-US" sz="800" dirty="0"/>
               <a:t>&lt;&lt; C++ / x64 &gt;&gt;</a:t>
             </a:r>
           </a:p>
@@ -6079,6 +6154,17 @@
             <a:r>
               <a:rPr lang="en-US" sz="800" dirty="0"/>
               <a:t>]</a:t>
+            </a:r>
+          </a:p>
+          <a:p>
+            <a:pPr algn="ctr"/>
+            <a:endParaRPr lang="en-US" sz="800" dirty="0"/>
+          </a:p>
+          <a:p>
+            <a:pPr algn="ctr"/>
+            <a:r>
+              <a:rPr lang="en-US" sz="800" dirty="0"/>
+              <a:t>Q2/2023</a:t>
             </a:r>
           </a:p>
         </p:txBody>
@@ -6210,6 +6296,13 @@
             <a:pPr algn="ctr"/>
             <a:r>
               <a:rPr lang="en-US" sz="800" dirty="0"/>
+              <a:t>http://github.com/AV-Text</a:t>
+            </a:r>
+          </a:p>
+          <a:p>
+            <a:pPr algn="ctr"/>
+            <a:r>
+              <a:rPr lang="en-US" sz="800" dirty="0"/>
               <a:t>&lt;&lt; Delphi / x64 &gt;&gt;</a:t>
             </a:r>
           </a:p>
@@ -6223,10 +6316,20 @@
           <a:p>
             <a:pPr algn="ctr"/>
             <a:r>
-              <a:rPr lang="en-US" sz="800"/>
+              <a:rPr lang="en-US" sz="800" dirty="0"/>
               <a:t>[initially Windows only]</a:t>
             </a:r>
+          </a:p>
+          <a:p>
+            <a:pPr algn="ctr"/>
             <a:endParaRPr lang="en-US" sz="800" dirty="0"/>
+          </a:p>
+          <a:p>
+            <a:pPr algn="ctr"/>
+            <a:r>
+              <a:rPr lang="en-US" sz="800" dirty="0"/>
+              <a:t>Q3/2023</a:t>
+            </a:r>
           </a:p>
         </p:txBody>
       </p:sp>
@@ -6277,6 +6380,13 @@
             <a:pPr algn="ctr"/>
             <a:r>
               <a:rPr lang="en-US" sz="800" dirty="0"/>
+              <a:t>http://github.com/AV-Text</a:t>
+            </a:r>
+          </a:p>
+          <a:p>
+            <a:pPr algn="ctr"/>
+            <a:r>
+              <a:rPr lang="en-US" sz="800" dirty="0"/>
               <a:t>&lt;&lt; C++ / x64 &gt;&gt;</a:t>
             </a:r>
           </a:p>
@@ -6292,16 +6402,27 @@
             <a:r>
               <a:rPr lang="en-US" sz="800" dirty="0"/>
               <a:t>[Oat++]</a:t>
+            </a:r>
+          </a:p>
+          <a:p>
+            <a:pPr algn="ctr"/>
+            <a:endParaRPr lang="en-US" sz="800" dirty="0"/>
+          </a:p>
+          <a:p>
+            <a:pPr algn="ctr"/>
+            <a:r>
+              <a:rPr lang="en-US" sz="800" dirty="0"/>
+              <a:t>Q3/2023</a:t>
             </a:r>
           </a:p>
         </p:txBody>
       </p:sp>
       <p:grpSp>
         <p:nvGrpSpPr>
-          <p:cNvPr id="102" name="Group 101">
-            <a:extLst>
-              <a:ext uri="{FF2B5EF4-FFF2-40B4-BE49-F238E27FC236}">
-                <a16:creationId xmlns:a16="http://schemas.microsoft.com/office/drawing/2014/main" id="{AFDE641F-BBD6-38F9-6571-4CE87B6E7A0A}"/>
+          <p:cNvPr id="70" name="Group 69">
+            <a:extLst>
+              <a:ext uri="{FF2B5EF4-FFF2-40B4-BE49-F238E27FC236}">
+                <a16:creationId xmlns:a16="http://schemas.microsoft.com/office/drawing/2014/main" id="{F7DF39D7-F944-B81A-86D3-64CD68469B1B}"/>
               </a:ext>
             </a:extLst>
           </p:cNvPr>
@@ -6312,7 +6433,7 @@
           <a:xfrm>
             <a:off x="1801378" y="5817378"/>
             <a:ext cx="263702" cy="540628"/>
-            <a:chOff x="860439" y="2786572"/>
+            <a:chOff x="1801378" y="5817378"/>
             <a:chExt cx="263702" cy="540628"/>
           </a:xfrm>
         </p:grpSpPr>
@@ -6330,7 +6451,7 @@
           </p:nvSpPr>
           <p:spPr>
             <a:xfrm>
-              <a:off x="942835" y="2786572"/>
+              <a:off x="1883774" y="5817378"/>
               <a:ext cx="112655" cy="96829"/>
             </a:xfrm>
             <a:prstGeom prst="ellipse">
@@ -6344,10 +6465,7 @@
             </a:solidFill>
             <a:ln>
               <a:solidFill>
-                <a:schemeClr val="tx1">
-                  <a:lumMod val="50000"/>
-                  <a:lumOff val="50000"/>
-                </a:schemeClr>
+                <a:srgbClr val="7030A0"/>
               </a:solidFill>
             </a:ln>
           </p:spPr>
@@ -6392,7 +6510,7 @@
           </p:nvCxnSpPr>
           <p:spPr>
             <a:xfrm flipH="1">
-              <a:off x="995139" y="2786572"/>
+              <a:off x="1936078" y="5817378"/>
               <a:ext cx="4024" cy="283852"/>
             </a:xfrm>
             <a:prstGeom prst="line">
@@ -6400,10 +6518,7 @@
             </a:prstGeom>
             <a:ln w="31750">
               <a:solidFill>
-                <a:schemeClr val="tx1">
-                  <a:lumMod val="50000"/>
-                  <a:lumOff val="50000"/>
-                </a:schemeClr>
+                <a:srgbClr val="7030A0"/>
               </a:solidFill>
             </a:ln>
           </p:spPr>
@@ -6438,7 +6553,7 @@
           </p:nvCxnSpPr>
           <p:spPr>
             <a:xfrm>
-              <a:off x="994302" y="3047328"/>
+              <a:off x="1935241" y="6078134"/>
               <a:ext cx="117134" cy="279872"/>
             </a:xfrm>
             <a:prstGeom prst="line">
@@ -6446,10 +6561,7 @@
             </a:prstGeom>
             <a:ln w="31750">
               <a:solidFill>
-                <a:schemeClr val="tx1">
-                  <a:lumMod val="50000"/>
-                  <a:lumOff val="50000"/>
-                </a:schemeClr>
+                <a:srgbClr val="7030A0"/>
               </a:solidFill>
             </a:ln>
           </p:spPr>
@@ -6484,7 +6596,7 @@
           </p:nvCxnSpPr>
           <p:spPr>
             <a:xfrm flipH="1">
-              <a:off x="876479" y="3047328"/>
+              <a:off x="1817418" y="6078134"/>
               <a:ext cx="115812" cy="279872"/>
             </a:xfrm>
             <a:prstGeom prst="line">
@@ -6492,10 +6604,7 @@
             </a:prstGeom>
             <a:ln w="31750">
               <a:solidFill>
-                <a:schemeClr val="tx1">
-                  <a:lumMod val="50000"/>
-                  <a:lumOff val="50000"/>
-                </a:schemeClr>
+                <a:srgbClr val="7030A0"/>
               </a:solidFill>
             </a:ln>
           </p:spPr>
@@ -6530,7 +6639,7 @@
           </p:nvCxnSpPr>
           <p:spPr>
             <a:xfrm flipH="1">
-              <a:off x="860439" y="2933622"/>
+              <a:off x="1801378" y="5964428"/>
               <a:ext cx="263702" cy="0"/>
             </a:xfrm>
             <a:prstGeom prst="line">
@@ -6538,10 +6647,7 @@
             </a:prstGeom>
             <a:ln w="31750">
               <a:solidFill>
-                <a:schemeClr val="tx1">
-                  <a:lumMod val="50000"/>
-                  <a:lumOff val="50000"/>
-                </a:schemeClr>
+                <a:srgbClr val="7030A0"/>
               </a:solidFill>
             </a:ln>
           </p:spPr>
@@ -6586,10 +6692,7 @@
           </a:prstGeom>
           <a:ln>
             <a:solidFill>
-              <a:schemeClr val="tx1">
-                <a:lumMod val="50000"/>
-                <a:lumOff val="50000"/>
-              </a:schemeClr>
+              <a:srgbClr val="7030A0"/>
             </a:solidFill>
             <a:tailEnd type="triangle"/>
           </a:ln>
@@ -6630,10 +6733,7 @@
             <a:avLst/>
           </a:prstGeom>
           <a:solidFill>
-            <a:schemeClr val="tx1">
-              <a:lumMod val="50000"/>
-              <a:lumOff val="50000"/>
-            </a:schemeClr>
+            <a:schemeClr val="bg1"/>
           </a:solidFill>
         </p:spPr>
         <p:style>
@@ -6658,7 +6758,11 @@
           <a:p>
             <a:pPr algn="ctr"/>
             <a:r>
-              <a:rPr lang="en-US" dirty="0"/>
+              <a:rPr lang="en-US" dirty="0">
+                <a:solidFill>
+                  <a:schemeClr val="accent1"/>
+                </a:solidFill>
+              </a:rPr>
               <a:t>Microsoft Word</a:t>
             </a:r>
           </a:p>
@@ -7105,6 +7209,9 @@
                 <a:prstGeom prst="rect">
                   <a:avLst/>
                 </a:prstGeom>
+                <a:solidFill>
+                  <a:srgbClr val="7030A0"/>
+                </a:solidFill>
               </p:spPr>
               <p:style>
                 <a:lnRef idx="2">
@@ -7523,14 +7630,14 @@
               <a:r>
                 <a:rPr lang="en-US" sz="800" dirty="0" err="1">
                   <a:solidFill>
-                    <a:schemeClr val="accent1"/>
+                    <a:srgbClr val="7030A0"/>
                   </a:solidFill>
                 </a:rPr>
                 <a:t>Pinshot</a:t>
               </a:r>
               <a:endParaRPr lang="en-US" sz="800" dirty="0">
                 <a:solidFill>
-                  <a:schemeClr val="accent1"/>
+                  <a:srgbClr val="7030A0"/>
                 </a:solidFill>
               </a:endParaRPr>
             </a:p>
@@ -7538,7 +7645,7 @@
               <a:r>
                 <a:rPr lang="en-US" sz="800" dirty="0">
                   <a:solidFill>
-                    <a:schemeClr val="accent1"/>
+                    <a:srgbClr val="7030A0"/>
                   </a:solidFill>
                 </a:rPr>
                 <a:t>&lt;&lt;</a:t>
@@ -7546,7 +7653,7 @@
               <a:r>
                 <a:rPr lang="en-US" sz="800" dirty="0" err="1">
                   <a:solidFill>
-                    <a:schemeClr val="accent1"/>
+                    <a:srgbClr val="7030A0"/>
                   </a:solidFill>
                 </a:rPr>
                 <a:t>json</a:t>
@@ -7554,7 +7661,7 @@
               <a:r>
                 <a:rPr lang="en-US" sz="800" dirty="0">
                   <a:solidFill>
-                    <a:schemeClr val="accent1"/>
+                    <a:srgbClr val="7030A0"/>
                   </a:solidFill>
                 </a:rPr>
                 <a:t>&gt;&gt;</a:t>
@@ -7860,10 +7967,7 @@
             <a:r>
               <a:rPr lang="en-US" sz="1200" dirty="0">
                 <a:solidFill>
-                  <a:schemeClr val="tx1">
-                    <a:lumMod val="50000"/>
-                    <a:lumOff val="50000"/>
-                  </a:schemeClr>
+                  <a:srgbClr val="7030A0"/>
                 </a:solidFill>
               </a:rPr>
               <a:t>Developer</a:t>
@@ -7998,6 +8102,13 @@
             <a:pPr algn="ctr"/>
             <a:r>
               <a:rPr lang="en-US" sz="800" dirty="0"/>
+              <a:t>http://github.com/AV-Text</a:t>
+            </a:r>
+          </a:p>
+          <a:p>
+            <a:pPr algn="ctr"/>
+            <a:r>
+              <a:rPr lang="en-US" sz="800" dirty="0"/>
               <a:t>&lt;&lt; C++ / x64 &gt;&gt;</a:t>
             </a:r>
           </a:p>
@@ -8013,6 +8124,17 @@
             <a:r>
               <a:rPr lang="en-US" sz="800" dirty="0"/>
               <a:t>[console app]</a:t>
+            </a:r>
+          </a:p>
+          <a:p>
+            <a:pPr algn="ctr"/>
+            <a:endParaRPr lang="en-US" sz="800" dirty="0"/>
+          </a:p>
+          <a:p>
+            <a:pPr algn="ctr"/>
+            <a:r>
+              <a:rPr lang="en-US" sz="800" dirty="0"/>
+              <a:t>Q2/2023</a:t>
             </a:r>
           </a:p>
         </p:txBody>
@@ -8133,7 +8255,7 @@
           </a:solidFill>
           <a:ln>
             <a:solidFill>
-              <a:schemeClr val="accent1"/>
+              <a:srgbClr val="7030A0"/>
             </a:solidFill>
           </a:ln>
         </p:spPr>
@@ -8187,7 +8309,7 @@
           </a:solidFill>
           <a:ln>
             <a:solidFill>
-              <a:schemeClr val="accent1"/>
+              <a:srgbClr val="7030A0"/>
             </a:solidFill>
           </a:ln>
         </p:spPr>
@@ -8241,7 +8363,7 @@
           </a:solidFill>
           <a:ln>
             <a:solidFill>
-              <a:schemeClr val="accent1"/>
+              <a:srgbClr val="7030A0"/>
             </a:solidFill>
           </a:ln>
         </p:spPr>
@@ -8351,6 +8473,17 @@
             <a:r>
               <a:rPr lang="en-US" sz="800" dirty="0"/>
               <a:t>]</a:t>
+            </a:r>
+          </a:p>
+          <a:p>
+            <a:pPr algn="ctr"/>
+            <a:endParaRPr lang="en-US" sz="800" dirty="0"/>
+          </a:p>
+          <a:p>
+            <a:pPr algn="ctr"/>
+            <a:r>
+              <a:rPr lang="en-US" sz="800" dirty="0"/>
+              <a:t>2024</a:t>
             </a:r>
           </a:p>
         </p:txBody>
@@ -8519,6 +8652,17 @@
             <a:r>
               <a:rPr lang="en-US" sz="800" dirty="0"/>
               <a:t>]</a:t>
+            </a:r>
+          </a:p>
+          <a:p>
+            <a:pPr algn="ctr"/>
+            <a:endParaRPr lang="en-US" sz="800" dirty="0"/>
+          </a:p>
+          <a:p>
+            <a:pPr algn="ctr"/>
+            <a:r>
+              <a:rPr lang="en-US" sz="800" dirty="0"/>
+              <a:t>2024</a:t>
             </a:r>
           </a:p>
         </p:txBody>
@@ -8702,6 +8846,9 @@
                 <a:prstGeom prst="rect">
                   <a:avLst/>
                 </a:prstGeom>
+                <a:solidFill>
+                  <a:srgbClr val="7030A0"/>
+                </a:solidFill>
               </p:spPr>
               <p:style>
                 <a:lnRef idx="2">
@@ -9120,7 +9267,7 @@
               <a:r>
                 <a:rPr lang="en-US" sz="800" dirty="0">
                   <a:solidFill>
-                    <a:schemeClr val="accent1"/>
+                    <a:srgbClr val="7030A0"/>
                   </a:solidFill>
                 </a:rPr>
                 <a:t>AVX-Omega</a:t>
@@ -9131,7 +9278,7 @@
               <a:r>
                 <a:rPr lang="en-US" sz="800" dirty="0">
                   <a:solidFill>
-                    <a:schemeClr val="accent1"/>
+                    <a:srgbClr val="7030A0"/>
                   </a:solidFill>
                 </a:rPr>
                 <a:t>&lt;&lt;binary data&gt;&gt;</a:t>
@@ -9168,10 +9315,7 @@
           </a:prstGeom>
           <a:ln>
             <a:solidFill>
-              <a:schemeClr val="tx1">
-                <a:lumMod val="50000"/>
-                <a:lumOff val="50000"/>
-              </a:schemeClr>
+              <a:srgbClr val="7030A0"/>
             </a:solidFill>
             <a:tailEnd type="triangle"/>
           </a:ln>
@@ -9361,7 +9505,7 @@
             <a:r>
               <a:rPr lang="en-US" sz="1200" b="1" dirty="0">
                 <a:solidFill>
-                  <a:schemeClr val="accent1"/>
+                  <a:srgbClr val="7030A0"/>
                 </a:solidFill>
               </a:rPr>
               <a:t>Digital-AV SDK</a:t>

</xml_diff>

<commit_message>
Tweak dates on roadmap
</commit_message>
<xml_diff>
--- a/AVXSearch/AVX-Search.pptx
+++ b/AVXSearch/AVX-Search.pptx
@@ -262,7 +262,7 @@
           <a:p>
             <a:fld id="{00872148-4BA6-4738-8A8B-AEF1C14E9646}" type="datetimeFigureOut">
               <a:rPr lang="en-US" smtClean="0"/>
-              <a:t>5/4/2023</a:t>
+              <a:t>5/5/2023</a:t>
             </a:fld>
             <a:endParaRPr lang="en-US"/>
           </a:p>
@@ -460,7 +460,7 @@
           <a:p>
             <a:fld id="{00872148-4BA6-4738-8A8B-AEF1C14E9646}" type="datetimeFigureOut">
               <a:rPr lang="en-US" smtClean="0"/>
-              <a:t>5/4/2023</a:t>
+              <a:t>5/5/2023</a:t>
             </a:fld>
             <a:endParaRPr lang="en-US"/>
           </a:p>
@@ -668,7 +668,7 @@
           <a:p>
             <a:fld id="{00872148-4BA6-4738-8A8B-AEF1C14E9646}" type="datetimeFigureOut">
               <a:rPr lang="en-US" smtClean="0"/>
-              <a:t>5/4/2023</a:t>
+              <a:t>5/5/2023</a:t>
             </a:fld>
             <a:endParaRPr lang="en-US"/>
           </a:p>
@@ -866,7 +866,7 @@
           <a:p>
             <a:fld id="{00872148-4BA6-4738-8A8B-AEF1C14E9646}" type="datetimeFigureOut">
               <a:rPr lang="en-US" smtClean="0"/>
-              <a:t>5/4/2023</a:t>
+              <a:t>5/5/2023</a:t>
             </a:fld>
             <a:endParaRPr lang="en-US"/>
           </a:p>
@@ -1141,7 +1141,7 @@
           <a:p>
             <a:fld id="{00872148-4BA6-4738-8A8B-AEF1C14E9646}" type="datetimeFigureOut">
               <a:rPr lang="en-US" smtClean="0"/>
-              <a:t>5/4/2023</a:t>
+              <a:t>5/5/2023</a:t>
             </a:fld>
             <a:endParaRPr lang="en-US"/>
           </a:p>
@@ -1406,7 +1406,7 @@
           <a:p>
             <a:fld id="{00872148-4BA6-4738-8A8B-AEF1C14E9646}" type="datetimeFigureOut">
               <a:rPr lang="en-US" smtClean="0"/>
-              <a:t>5/4/2023</a:t>
+              <a:t>5/5/2023</a:t>
             </a:fld>
             <a:endParaRPr lang="en-US"/>
           </a:p>
@@ -1818,7 +1818,7 @@
           <a:p>
             <a:fld id="{00872148-4BA6-4738-8A8B-AEF1C14E9646}" type="datetimeFigureOut">
               <a:rPr lang="en-US" smtClean="0"/>
-              <a:t>5/4/2023</a:t>
+              <a:t>5/5/2023</a:t>
             </a:fld>
             <a:endParaRPr lang="en-US"/>
           </a:p>
@@ -1959,7 +1959,7 @@
           <a:p>
             <a:fld id="{00872148-4BA6-4738-8A8B-AEF1C14E9646}" type="datetimeFigureOut">
               <a:rPr lang="en-US" smtClean="0"/>
-              <a:t>5/4/2023</a:t>
+              <a:t>5/5/2023</a:t>
             </a:fld>
             <a:endParaRPr lang="en-US"/>
           </a:p>
@@ -2072,7 +2072,7 @@
           <a:p>
             <a:fld id="{00872148-4BA6-4738-8A8B-AEF1C14E9646}" type="datetimeFigureOut">
               <a:rPr lang="en-US" smtClean="0"/>
-              <a:t>5/4/2023</a:t>
+              <a:t>5/5/2023</a:t>
             </a:fld>
             <a:endParaRPr lang="en-US"/>
           </a:p>
@@ -2383,7 +2383,7 @@
           <a:p>
             <a:fld id="{00872148-4BA6-4738-8A8B-AEF1C14E9646}" type="datetimeFigureOut">
               <a:rPr lang="en-US" smtClean="0"/>
-              <a:t>5/4/2023</a:t>
+              <a:t>5/5/2023</a:t>
             </a:fld>
             <a:endParaRPr lang="en-US"/>
           </a:p>
@@ -2671,7 +2671,7 @@
           <a:p>
             <a:fld id="{00872148-4BA6-4738-8A8B-AEF1C14E9646}" type="datetimeFigureOut">
               <a:rPr lang="en-US" smtClean="0"/>
-              <a:t>5/4/2023</a:t>
+              <a:t>5/5/2023</a:t>
             </a:fld>
             <a:endParaRPr lang="en-US"/>
           </a:p>
@@ -2912,7 +2912,7 @@
           <a:p>
             <a:fld id="{00872148-4BA6-4738-8A8B-AEF1C14E9646}" type="datetimeFigureOut">
               <a:rPr lang="en-US" smtClean="0"/>
-              <a:t>5/4/2023</a:t>
+              <a:t>5/5/2023</a:t>
             </a:fld>
             <a:endParaRPr lang="en-US"/>
           </a:p>
@@ -6328,7 +6328,7 @@
             <a:pPr algn="ctr"/>
             <a:r>
               <a:rPr lang="en-US" sz="800" dirty="0"/>
-              <a:t>Q3/2023</a:t>
+              <a:t>Q4/2023</a:t>
             </a:r>
           </a:p>
         </p:txBody>
@@ -6411,9 +6411,10 @@
           <a:p>
             <a:pPr algn="ctr"/>
             <a:r>
-              <a:rPr lang="en-US" sz="800" dirty="0"/>
-              <a:t>Q3/2023</a:t>
-            </a:r>
+              <a:rPr lang="en-US" sz="800"/>
+              <a:t>Q4/2023</a:t>
+            </a:r>
+            <a:endParaRPr lang="en-US" sz="800" dirty="0"/>
           </a:p>
         </p:txBody>
       </p:sp>

</xml_diff>

<commit_message>
Inching closer to completion
</commit_message>
<xml_diff>
--- a/AVXSearch/AVX-Search.pptx
+++ b/AVXSearch/AVX-Search.pptx
@@ -262,7 +262,7 @@
           <a:p>
             <a:fld id="{00872148-4BA6-4738-8A8B-AEF1C14E9646}" type="datetimeFigureOut">
               <a:rPr lang="en-US" smtClean="0"/>
-              <a:t>5/5/2023</a:t>
+              <a:t>5/8/2023</a:t>
             </a:fld>
             <a:endParaRPr lang="en-US"/>
           </a:p>
@@ -460,7 +460,7 @@
           <a:p>
             <a:fld id="{00872148-4BA6-4738-8A8B-AEF1C14E9646}" type="datetimeFigureOut">
               <a:rPr lang="en-US" smtClean="0"/>
-              <a:t>5/5/2023</a:t>
+              <a:t>5/8/2023</a:t>
             </a:fld>
             <a:endParaRPr lang="en-US"/>
           </a:p>
@@ -668,7 +668,7 @@
           <a:p>
             <a:fld id="{00872148-4BA6-4738-8A8B-AEF1C14E9646}" type="datetimeFigureOut">
               <a:rPr lang="en-US" smtClean="0"/>
-              <a:t>5/5/2023</a:t>
+              <a:t>5/8/2023</a:t>
             </a:fld>
             <a:endParaRPr lang="en-US"/>
           </a:p>
@@ -866,7 +866,7 @@
           <a:p>
             <a:fld id="{00872148-4BA6-4738-8A8B-AEF1C14E9646}" type="datetimeFigureOut">
               <a:rPr lang="en-US" smtClean="0"/>
-              <a:t>5/5/2023</a:t>
+              <a:t>5/8/2023</a:t>
             </a:fld>
             <a:endParaRPr lang="en-US"/>
           </a:p>
@@ -1141,7 +1141,7 @@
           <a:p>
             <a:fld id="{00872148-4BA6-4738-8A8B-AEF1C14E9646}" type="datetimeFigureOut">
               <a:rPr lang="en-US" smtClean="0"/>
-              <a:t>5/5/2023</a:t>
+              <a:t>5/8/2023</a:t>
             </a:fld>
             <a:endParaRPr lang="en-US"/>
           </a:p>
@@ -1406,7 +1406,7 @@
           <a:p>
             <a:fld id="{00872148-4BA6-4738-8A8B-AEF1C14E9646}" type="datetimeFigureOut">
               <a:rPr lang="en-US" smtClean="0"/>
-              <a:t>5/5/2023</a:t>
+              <a:t>5/8/2023</a:t>
             </a:fld>
             <a:endParaRPr lang="en-US"/>
           </a:p>
@@ -1818,7 +1818,7 @@
           <a:p>
             <a:fld id="{00872148-4BA6-4738-8A8B-AEF1C14E9646}" type="datetimeFigureOut">
               <a:rPr lang="en-US" smtClean="0"/>
-              <a:t>5/5/2023</a:t>
+              <a:t>5/8/2023</a:t>
             </a:fld>
             <a:endParaRPr lang="en-US"/>
           </a:p>
@@ -1959,7 +1959,7 @@
           <a:p>
             <a:fld id="{00872148-4BA6-4738-8A8B-AEF1C14E9646}" type="datetimeFigureOut">
               <a:rPr lang="en-US" smtClean="0"/>
-              <a:t>5/5/2023</a:t>
+              <a:t>5/8/2023</a:t>
             </a:fld>
             <a:endParaRPr lang="en-US"/>
           </a:p>
@@ -2072,7 +2072,7 @@
           <a:p>
             <a:fld id="{00872148-4BA6-4738-8A8B-AEF1C14E9646}" type="datetimeFigureOut">
               <a:rPr lang="en-US" smtClean="0"/>
-              <a:t>5/5/2023</a:t>
+              <a:t>5/8/2023</a:t>
             </a:fld>
             <a:endParaRPr lang="en-US"/>
           </a:p>
@@ -2383,7 +2383,7 @@
           <a:p>
             <a:fld id="{00872148-4BA6-4738-8A8B-AEF1C14E9646}" type="datetimeFigureOut">
               <a:rPr lang="en-US" smtClean="0"/>
-              <a:t>5/5/2023</a:t>
+              <a:t>5/8/2023</a:t>
             </a:fld>
             <a:endParaRPr lang="en-US"/>
           </a:p>
@@ -2671,7 +2671,7 @@
           <a:p>
             <a:fld id="{00872148-4BA6-4738-8A8B-AEF1C14E9646}" type="datetimeFigureOut">
               <a:rPr lang="en-US" smtClean="0"/>
-              <a:t>5/5/2023</a:t>
+              <a:t>5/8/2023</a:t>
             </a:fld>
             <a:endParaRPr lang="en-US"/>
           </a:p>
@@ -2912,7 +2912,7 @@
           <a:p>
             <a:fld id="{00872148-4BA6-4738-8A8B-AEF1C14E9646}" type="datetimeFigureOut">
               <a:rPr lang="en-US" smtClean="0"/>
-              <a:t>5/5/2023</a:t>
+              <a:t>5/8/2023</a:t>
             </a:fld>
             <a:endParaRPr lang="en-US"/>
           </a:p>
@@ -6056,7 +6056,7 @@
             <a:pPr algn="ctr"/>
             <a:r>
               <a:rPr lang="en-US" sz="800" dirty="0"/>
-              <a:t>[depends includes </a:t>
+              <a:t>[includes a hijacked </a:t>
             </a:r>
             <a:r>
               <a:rPr lang="en-US" sz="800" dirty="0" err="1"/>

</xml_diff>

<commit_message>
Revise spec to 3901. Minor tweaks during vacation the US southwest
</commit_message>
<xml_diff>
--- a/AVXSearch/AVX-Search.pptx
+++ b/AVXSearch/AVX-Search.pptx
@@ -262,7 +262,7 @@
           <a:p>
             <a:fld id="{00872148-4BA6-4738-8A8B-AEF1C14E9646}" type="datetimeFigureOut">
               <a:rPr lang="en-US" smtClean="0"/>
-              <a:t>5/9/2023</a:t>
+              <a:t>8/30/2023</a:t>
             </a:fld>
             <a:endParaRPr lang="en-US"/>
           </a:p>
@@ -460,7 +460,7 @@
           <a:p>
             <a:fld id="{00872148-4BA6-4738-8A8B-AEF1C14E9646}" type="datetimeFigureOut">
               <a:rPr lang="en-US" smtClean="0"/>
-              <a:t>5/9/2023</a:t>
+              <a:t>8/30/2023</a:t>
             </a:fld>
             <a:endParaRPr lang="en-US"/>
           </a:p>
@@ -668,7 +668,7 @@
           <a:p>
             <a:fld id="{00872148-4BA6-4738-8A8B-AEF1C14E9646}" type="datetimeFigureOut">
               <a:rPr lang="en-US" smtClean="0"/>
-              <a:t>5/9/2023</a:t>
+              <a:t>8/30/2023</a:t>
             </a:fld>
             <a:endParaRPr lang="en-US"/>
           </a:p>
@@ -866,7 +866,7 @@
           <a:p>
             <a:fld id="{00872148-4BA6-4738-8A8B-AEF1C14E9646}" type="datetimeFigureOut">
               <a:rPr lang="en-US" smtClean="0"/>
-              <a:t>5/9/2023</a:t>
+              <a:t>8/30/2023</a:t>
             </a:fld>
             <a:endParaRPr lang="en-US"/>
           </a:p>
@@ -1141,7 +1141,7 @@
           <a:p>
             <a:fld id="{00872148-4BA6-4738-8A8B-AEF1C14E9646}" type="datetimeFigureOut">
               <a:rPr lang="en-US" smtClean="0"/>
-              <a:t>5/9/2023</a:t>
+              <a:t>8/30/2023</a:t>
             </a:fld>
             <a:endParaRPr lang="en-US"/>
           </a:p>
@@ -1406,7 +1406,7 @@
           <a:p>
             <a:fld id="{00872148-4BA6-4738-8A8B-AEF1C14E9646}" type="datetimeFigureOut">
               <a:rPr lang="en-US" smtClean="0"/>
-              <a:t>5/9/2023</a:t>
+              <a:t>8/30/2023</a:t>
             </a:fld>
             <a:endParaRPr lang="en-US"/>
           </a:p>
@@ -1818,7 +1818,7 @@
           <a:p>
             <a:fld id="{00872148-4BA6-4738-8A8B-AEF1C14E9646}" type="datetimeFigureOut">
               <a:rPr lang="en-US" smtClean="0"/>
-              <a:t>5/9/2023</a:t>
+              <a:t>8/30/2023</a:t>
             </a:fld>
             <a:endParaRPr lang="en-US"/>
           </a:p>
@@ -1959,7 +1959,7 @@
           <a:p>
             <a:fld id="{00872148-4BA6-4738-8A8B-AEF1C14E9646}" type="datetimeFigureOut">
               <a:rPr lang="en-US" smtClean="0"/>
-              <a:t>5/9/2023</a:t>
+              <a:t>8/30/2023</a:t>
             </a:fld>
             <a:endParaRPr lang="en-US"/>
           </a:p>
@@ -2072,7 +2072,7 @@
           <a:p>
             <a:fld id="{00872148-4BA6-4738-8A8B-AEF1C14E9646}" type="datetimeFigureOut">
               <a:rPr lang="en-US" smtClean="0"/>
-              <a:t>5/9/2023</a:t>
+              <a:t>8/30/2023</a:t>
             </a:fld>
             <a:endParaRPr lang="en-US"/>
           </a:p>
@@ -2383,7 +2383,7 @@
           <a:p>
             <a:fld id="{00872148-4BA6-4738-8A8B-AEF1C14E9646}" type="datetimeFigureOut">
               <a:rPr lang="en-US" smtClean="0"/>
-              <a:t>5/9/2023</a:t>
+              <a:t>8/30/2023</a:t>
             </a:fld>
             <a:endParaRPr lang="en-US"/>
           </a:p>
@@ -2671,7 +2671,7 @@
           <a:p>
             <a:fld id="{00872148-4BA6-4738-8A8B-AEF1C14E9646}" type="datetimeFigureOut">
               <a:rPr lang="en-US" smtClean="0"/>
-              <a:t>5/9/2023</a:t>
+              <a:t>8/30/2023</a:t>
             </a:fld>
             <a:endParaRPr lang="en-US"/>
           </a:p>
@@ -2912,7 +2912,7 @@
           <a:p>
             <a:fld id="{00872148-4BA6-4738-8A8B-AEF1C14E9646}" type="datetimeFigureOut">
               <a:rPr lang="en-US" smtClean="0"/>
-              <a:t>5/9/2023</a:t>
+              <a:t>8/30/2023</a:t>
             </a:fld>
             <a:endParaRPr lang="en-US"/>
           </a:p>
@@ -3383,6 +3383,13 @@
               <a:t>Roadmap to developing user-facing applications</a:t>
             </a:r>
           </a:p>
+          <a:p>
+            <a:r>
+              <a:rPr lang="en-US" sz="1800"/>
+              <a:t>8-30-2023</a:t>
+            </a:r>
+            <a:endParaRPr lang="en-US" sz="1800" dirty="0"/>
+          </a:p>
         </p:txBody>
       </p:sp>
     </p:spTree>
@@ -4355,7 +4362,7 @@
             <a:pPr algn="ctr"/>
             <a:r>
               <a:rPr lang="en-US" sz="800" dirty="0"/>
-              <a:t>&lt;&lt; C# &gt;&gt;</a:t>
+              <a:t>&lt;&lt; C# x64 &gt;&gt;</a:t>
             </a:r>
           </a:p>
           <a:p>
@@ -6042,7 +6049,7 @@
             <a:pPr algn="ctr"/>
             <a:r>
               <a:rPr lang="en-US" sz="800" dirty="0"/>
-              <a:t>&lt;&lt; C++ / x64 &gt;&gt;</a:t>
+              <a:t>&lt;&lt; C++  / x64 &gt;&gt;</a:t>
             </a:r>
           </a:p>
           <a:p>
@@ -6164,7 +6171,7 @@
             <a:pPr algn="ctr"/>
             <a:r>
               <a:rPr lang="en-US" sz="800" dirty="0"/>
-              <a:t>Q2/2023</a:t>
+              <a:t>Q4/2023</a:t>
             </a:r>
           </a:p>
         </p:txBody>
@@ -6180,13 +6187,15 @@
           </p:cNvPr>
           <p:cNvCxnSpPr>
             <a:cxnSpLocks/>
+            <a:stCxn id="107" idx="0"/>
+            <a:endCxn id="89" idx="2"/>
           </p:cNvCxnSpPr>
           <p:nvPr/>
         </p:nvCxnSpPr>
         <p:spPr>
-          <a:xfrm flipV="1">
-            <a:off x="7925445" y="3767463"/>
-            <a:ext cx="501185" cy="444670"/>
+          <a:xfrm flipH="1" flipV="1">
+            <a:off x="7142025" y="3746963"/>
+            <a:ext cx="1" cy="441089"/>
           </a:xfrm>
           <a:prstGeom prst="straightConnector1">
             <a:avLst/>
@@ -6303,7 +6312,7 @@
             <a:pPr algn="ctr"/>
             <a:r>
               <a:rPr lang="en-US" sz="800" dirty="0"/>
-              <a:t>&lt;&lt; Delphi / x64 &gt;&gt;</a:t>
+              <a:t>&lt;&lt; C# / x64 &gt;&gt;</a:t>
             </a:r>
           </a:p>
           <a:p>
@@ -6328,7 +6337,7 @@
             <a:pPr algn="ctr"/>
             <a:r>
               <a:rPr lang="en-US" sz="800" dirty="0"/>
-              <a:t>Q4/2023</a:t>
+              <a:t>Q1/2024</a:t>
             </a:r>
           </a:p>
         </p:txBody>
@@ -6354,7 +6363,7 @@
             <a:avLst/>
           </a:prstGeom>
           <a:solidFill>
-            <a:schemeClr val="accent1"/>
+            <a:srgbClr val="7F7F7F"/>
           </a:solidFill>
         </p:spPr>
         <p:style>
@@ -6411,10 +6420,9 @@
           <a:p>
             <a:pPr algn="ctr"/>
             <a:r>
-              <a:rPr lang="en-US" sz="800"/>
-              <a:t>Q4/2023</a:t>
-            </a:r>
-            <a:endParaRPr lang="en-US" sz="800" dirty="0"/>
+              <a:rPr lang="en-US" sz="800" dirty="0"/>
+              <a:t>Q2/2024</a:t>
+            </a:r>
           </a:p>
         </p:txBody>
       </p:sp>
@@ -8134,10 +8142,9 @@
           <a:p>
             <a:pPr algn="ctr"/>
             <a:r>
-              <a:rPr lang="en-US" sz="800"/>
-              <a:t>Q3/2023</a:t>
-            </a:r>
-            <a:endParaRPr lang="en-US" sz="800" dirty="0"/>
+              <a:rPr lang="en-US" sz="800" dirty="0"/>
+              <a:t>Q4/2023</a:t>
+            </a:r>
           </a:p>
         </p:txBody>
       </p:sp>
@@ -8479,13 +8486,9 @@
           </a:p>
           <a:p>
             <a:pPr algn="ctr"/>
-            <a:endParaRPr lang="en-US" sz="800" dirty="0"/>
-          </a:p>
-          <a:p>
-            <a:pPr algn="ctr"/>
             <a:r>
               <a:rPr lang="en-US" sz="800" dirty="0"/>
-              <a:t>2024</a:t>
+              <a:t>Q4/2024</a:t>
             </a:r>
           </a:p>
         </p:txBody>
@@ -8664,7 +8667,7 @@
             <a:pPr algn="ctr"/>
             <a:r>
               <a:rPr lang="en-US" sz="800" dirty="0"/>
-              <a:t>2024</a:t>
+              <a:t>Q3/2024</a:t>
             </a:r>
           </a:p>
         </p:txBody>

</xml_diff>

<commit_message>
Incorporate NUPhone into the revised roadmap
</commit_message>
<xml_diff>
--- a/AVXSearch/AVX-Search.pptx
+++ b/AVXSearch/AVX-Search.pptx
@@ -262,7 +262,7 @@
           <a:p>
             <a:fld id="{00872148-4BA6-4738-8A8B-AEF1C14E9646}" type="datetimeFigureOut">
               <a:rPr lang="en-US" smtClean="0"/>
-              <a:t>8/30/2023</a:t>
+              <a:t>9/3/2023</a:t>
             </a:fld>
             <a:endParaRPr lang="en-US"/>
           </a:p>
@@ -460,7 +460,7 @@
           <a:p>
             <a:fld id="{00872148-4BA6-4738-8A8B-AEF1C14E9646}" type="datetimeFigureOut">
               <a:rPr lang="en-US" smtClean="0"/>
-              <a:t>8/30/2023</a:t>
+              <a:t>9/3/2023</a:t>
             </a:fld>
             <a:endParaRPr lang="en-US"/>
           </a:p>
@@ -668,7 +668,7 @@
           <a:p>
             <a:fld id="{00872148-4BA6-4738-8A8B-AEF1C14E9646}" type="datetimeFigureOut">
               <a:rPr lang="en-US" smtClean="0"/>
-              <a:t>8/30/2023</a:t>
+              <a:t>9/3/2023</a:t>
             </a:fld>
             <a:endParaRPr lang="en-US"/>
           </a:p>
@@ -866,7 +866,7 @@
           <a:p>
             <a:fld id="{00872148-4BA6-4738-8A8B-AEF1C14E9646}" type="datetimeFigureOut">
               <a:rPr lang="en-US" smtClean="0"/>
-              <a:t>8/30/2023</a:t>
+              <a:t>9/3/2023</a:t>
             </a:fld>
             <a:endParaRPr lang="en-US"/>
           </a:p>
@@ -1141,7 +1141,7 @@
           <a:p>
             <a:fld id="{00872148-4BA6-4738-8A8B-AEF1C14E9646}" type="datetimeFigureOut">
               <a:rPr lang="en-US" smtClean="0"/>
-              <a:t>8/30/2023</a:t>
+              <a:t>9/3/2023</a:t>
             </a:fld>
             <a:endParaRPr lang="en-US"/>
           </a:p>
@@ -1406,7 +1406,7 @@
           <a:p>
             <a:fld id="{00872148-4BA6-4738-8A8B-AEF1C14E9646}" type="datetimeFigureOut">
               <a:rPr lang="en-US" smtClean="0"/>
-              <a:t>8/30/2023</a:t>
+              <a:t>9/3/2023</a:t>
             </a:fld>
             <a:endParaRPr lang="en-US"/>
           </a:p>
@@ -1818,7 +1818,7 @@
           <a:p>
             <a:fld id="{00872148-4BA6-4738-8A8B-AEF1C14E9646}" type="datetimeFigureOut">
               <a:rPr lang="en-US" smtClean="0"/>
-              <a:t>8/30/2023</a:t>
+              <a:t>9/3/2023</a:t>
             </a:fld>
             <a:endParaRPr lang="en-US"/>
           </a:p>
@@ -1959,7 +1959,7 @@
           <a:p>
             <a:fld id="{00872148-4BA6-4738-8A8B-AEF1C14E9646}" type="datetimeFigureOut">
               <a:rPr lang="en-US" smtClean="0"/>
-              <a:t>8/30/2023</a:t>
+              <a:t>9/3/2023</a:t>
             </a:fld>
             <a:endParaRPr lang="en-US"/>
           </a:p>
@@ -2072,7 +2072,7 @@
           <a:p>
             <a:fld id="{00872148-4BA6-4738-8A8B-AEF1C14E9646}" type="datetimeFigureOut">
               <a:rPr lang="en-US" smtClean="0"/>
-              <a:t>8/30/2023</a:t>
+              <a:t>9/3/2023</a:t>
             </a:fld>
             <a:endParaRPr lang="en-US"/>
           </a:p>
@@ -2383,7 +2383,7 @@
           <a:p>
             <a:fld id="{00872148-4BA6-4738-8A8B-AEF1C14E9646}" type="datetimeFigureOut">
               <a:rPr lang="en-US" smtClean="0"/>
-              <a:t>8/30/2023</a:t>
+              <a:t>9/3/2023</a:t>
             </a:fld>
             <a:endParaRPr lang="en-US"/>
           </a:p>
@@ -2671,7 +2671,7 @@
           <a:p>
             <a:fld id="{00872148-4BA6-4738-8A8B-AEF1C14E9646}" type="datetimeFigureOut">
               <a:rPr lang="en-US" smtClean="0"/>
-              <a:t>8/30/2023</a:t>
+              <a:t>9/3/2023</a:t>
             </a:fld>
             <a:endParaRPr lang="en-US"/>
           </a:p>
@@ -2912,7 +2912,7 @@
           <a:p>
             <a:fld id="{00872148-4BA6-4738-8A8B-AEF1C14E9646}" type="datetimeFigureOut">
               <a:rPr lang="en-US" smtClean="0"/>
-              <a:t>8/30/2023</a:t>
+              <a:t>9/3/2023</a:t>
             </a:fld>
             <a:endParaRPr lang="en-US"/>
           </a:p>
@@ -3386,7 +3386,7 @@
           <a:p>
             <a:r>
               <a:rPr lang="en-US" sz="1800"/>
-              <a:t>8-30-2023</a:t>
+              <a:t>9-03-2023</a:t>
             </a:r>
             <a:endParaRPr lang="en-US" sz="1800" dirty="0"/>
           </a:p>
@@ -3424,32 +3424,190 @@
       </p:grpSpPr>
       <p:cxnSp>
         <p:nvCxnSpPr>
-          <p:cNvPr id="67" name="Straight Arrow Connector 66">
-            <a:extLst>
-              <a:ext uri="{FF2B5EF4-FFF2-40B4-BE49-F238E27FC236}">
-                <a16:creationId xmlns:a16="http://schemas.microsoft.com/office/drawing/2014/main" id="{C8DFF099-41CD-3D34-A7D1-4C7DF901AB26}"/>
+          <p:cNvPr id="114" name="Straight Arrow Connector 66">
+            <a:extLst>
+              <a:ext uri="{FF2B5EF4-FFF2-40B4-BE49-F238E27FC236}">
+                <a16:creationId xmlns:a16="http://schemas.microsoft.com/office/drawing/2014/main" id="{303E3204-B099-F44F-1DBA-89421FE34F61}"/>
               </a:ext>
             </a:extLst>
           </p:cNvPr>
           <p:cNvCxnSpPr>
             <a:cxnSpLocks/>
+            <a:stCxn id="89" idx="3"/>
+            <a:endCxn id="99" idx="3"/>
+          </p:cNvCxnSpPr>
+          <p:nvPr/>
+        </p:nvCxnSpPr>
+        <p:spPr>
+          <a:xfrm flipH="1" flipV="1">
+            <a:off x="5666480" y="2463575"/>
+            <a:ext cx="2263274" cy="793531"/>
+          </a:xfrm>
+          <a:prstGeom prst="bentConnector3">
+            <a:avLst>
+              <a:gd name="adj1" fmla="val 47697"/>
+            </a:avLst>
+          </a:prstGeom>
+          <a:ln>
+            <a:solidFill>
+              <a:schemeClr val="tx1">
+                <a:lumMod val="50000"/>
+                <a:lumOff val="50000"/>
+              </a:schemeClr>
+            </a:solidFill>
+            <a:tailEnd type="triangle"/>
+          </a:ln>
+        </p:spPr>
+        <p:style>
+          <a:lnRef idx="1">
+            <a:schemeClr val="accent1"/>
+          </a:lnRef>
+          <a:fillRef idx="0">
+            <a:schemeClr val="accent1"/>
+          </a:fillRef>
+          <a:effectRef idx="0">
+            <a:schemeClr val="accent1"/>
+          </a:effectRef>
+          <a:fontRef idx="minor">
+            <a:schemeClr val="tx1"/>
+          </a:fontRef>
+        </p:style>
+      </p:cxnSp>
+      <p:cxnSp>
+        <p:nvCxnSpPr>
+          <p:cNvPr id="82" name="Straight Arrow Connector 66">
+            <a:extLst>
+              <a:ext uri="{FF2B5EF4-FFF2-40B4-BE49-F238E27FC236}">
+                <a16:creationId xmlns:a16="http://schemas.microsoft.com/office/drawing/2014/main" id="{8836989B-3F19-597F-3F5E-9C360EC741DF}"/>
+              </a:ext>
+            </a:extLst>
+          </p:cNvPr>
+          <p:cNvCxnSpPr>
+            <a:cxnSpLocks/>
+            <a:stCxn id="88" idx="3"/>
+            <a:endCxn id="38" idx="3"/>
+          </p:cNvCxnSpPr>
+          <p:nvPr/>
+        </p:nvCxnSpPr>
+        <p:spPr>
+          <a:xfrm flipH="1" flipV="1">
+            <a:off x="5660925" y="1554435"/>
+            <a:ext cx="2268830" cy="247817"/>
+          </a:xfrm>
+          <a:prstGeom prst="bentConnector5">
+            <a:avLst>
+              <a:gd name="adj1" fmla="val 18752"/>
+              <a:gd name="adj2" fmla="val 35508"/>
+              <a:gd name="adj3" fmla="val 49455"/>
+            </a:avLst>
+          </a:prstGeom>
+          <a:ln>
+            <a:solidFill>
+              <a:schemeClr val="tx1">
+                <a:lumMod val="50000"/>
+                <a:lumOff val="50000"/>
+              </a:schemeClr>
+            </a:solidFill>
+            <a:tailEnd type="triangle"/>
+          </a:ln>
+        </p:spPr>
+        <p:style>
+          <a:lnRef idx="1">
+            <a:schemeClr val="accent1"/>
+          </a:lnRef>
+          <a:fillRef idx="0">
+            <a:schemeClr val="accent1"/>
+          </a:fillRef>
+          <a:effectRef idx="0">
+            <a:schemeClr val="accent1"/>
+          </a:effectRef>
+          <a:fontRef idx="minor">
+            <a:schemeClr val="tx1"/>
+          </a:fontRef>
+        </p:style>
+      </p:cxnSp>
+      <p:cxnSp>
+        <p:nvCxnSpPr>
+          <p:cNvPr id="137" name="Straight Arrow Connector 66">
+            <a:extLst>
+              <a:ext uri="{FF2B5EF4-FFF2-40B4-BE49-F238E27FC236}">
+                <a16:creationId xmlns:a16="http://schemas.microsoft.com/office/drawing/2014/main" id="{C7E5AF9E-4517-0803-6524-A718B68FAD1A}"/>
+              </a:ext>
+            </a:extLst>
+          </p:cNvPr>
+          <p:cNvCxnSpPr>
+            <a:cxnSpLocks/>
+            <a:stCxn id="23" idx="2"/>
+            <a:endCxn id="99" idx="1"/>
+          </p:cNvCxnSpPr>
+          <p:nvPr/>
+        </p:nvCxnSpPr>
+        <p:spPr>
+          <a:xfrm rot="5400000" flipH="1" flipV="1">
+            <a:off x="4032530" y="2447340"/>
+            <a:ext cx="1303888" cy="1336358"/>
+          </a:xfrm>
+          <a:prstGeom prst="bentConnector4">
+            <a:avLst>
+              <a:gd name="adj1" fmla="val 35552"/>
+              <a:gd name="adj2" fmla="val 25779"/>
+            </a:avLst>
+          </a:prstGeom>
+          <a:ln>
+            <a:solidFill>
+              <a:schemeClr val="tx1">
+                <a:lumMod val="50000"/>
+                <a:lumOff val="50000"/>
+              </a:schemeClr>
+            </a:solidFill>
+            <a:tailEnd type="triangle"/>
+          </a:ln>
+        </p:spPr>
+        <p:style>
+          <a:lnRef idx="1">
+            <a:schemeClr val="accent1"/>
+          </a:lnRef>
+          <a:fillRef idx="0">
+            <a:schemeClr val="accent1"/>
+          </a:fillRef>
+          <a:effectRef idx="0">
+            <a:schemeClr val="accent1"/>
+          </a:effectRef>
+          <a:fontRef idx="minor">
+            <a:schemeClr val="tx1"/>
+          </a:fontRef>
+        </p:style>
+      </p:cxnSp>
+      <p:cxnSp>
+        <p:nvCxnSpPr>
+          <p:cNvPr id="67" name="Straight Arrow Connector 66">
+            <a:extLst>
+              <a:ext uri="{FF2B5EF4-FFF2-40B4-BE49-F238E27FC236}">
+                <a16:creationId xmlns:a16="http://schemas.microsoft.com/office/drawing/2014/main" id="{C8DFF099-41CD-3D34-A7D1-4C7DF901AB26}"/>
+              </a:ext>
+            </a:extLst>
+          </p:cNvPr>
+          <p:cNvCxnSpPr>
+            <a:cxnSpLocks/>
+            <a:stCxn id="23" idx="0"/>
             <a:endCxn id="38" idx="1"/>
           </p:cNvCxnSpPr>
           <p:nvPr/>
         </p:nvCxnSpPr>
         <p:spPr>
-          <a:xfrm flipV="1">
-            <a:off x="3423667" y="1807603"/>
-            <a:ext cx="1467439" cy="1122899"/>
+          <a:xfrm rot="5400000" flipH="1" flipV="1">
+            <a:off x="4065039" y="1505691"/>
+            <a:ext cx="1233314" cy="1330803"/>
           </a:xfrm>
-          <a:prstGeom prst="bentConnector3">
-            <a:avLst>
-              <a:gd name="adj1" fmla="val 50000"/>
-            </a:avLst>
+          <a:prstGeom prst="bentConnector2">
+            <a:avLst/>
           </a:prstGeom>
           <a:ln>
             <a:solidFill>
-              <a:srgbClr val="7030A0"/>
+              <a:schemeClr val="tx1">
+                <a:lumMod val="50000"/>
+                <a:lumOff val="50000"/>
+              </a:schemeClr>
             </a:solidFill>
             <a:tailEnd type="triangle"/>
           </a:ln>
@@ -3480,21 +3638,24 @@
           </p:cNvPr>
           <p:cNvCxnSpPr>
             <a:cxnSpLocks/>
-            <a:endCxn id="24" idx="6"/>
           </p:cNvCxnSpPr>
           <p:nvPr/>
         </p:nvCxnSpPr>
         <p:spPr>
-          <a:xfrm rot="10800000">
-            <a:off x="5175037" y="3034226"/>
-            <a:ext cx="1179259" cy="1"/>
+          <a:xfrm flipH="1">
+            <a:off x="4804024" y="3034226"/>
+            <a:ext cx="1550275" cy="2633"/>
           </a:xfrm>
-          <a:prstGeom prst="bentConnector3">
-            <a:avLst>
-              <a:gd name="adj1" fmla="val 50000"/>
-            </a:avLst>
+          <a:prstGeom prst="straightConnector1">
+            <a:avLst/>
           </a:prstGeom>
           <a:ln>
+            <a:solidFill>
+              <a:schemeClr val="tx1">
+                <a:lumMod val="50000"/>
+                <a:lumOff val="50000"/>
+              </a:schemeClr>
+            </a:solidFill>
             <a:tailEnd type="triangle"/>
           </a:ln>
         </p:spPr>
@@ -3605,7 +3766,23 @@
             </a:r>
           </a:p>
           <a:p>
-            <a:pPr algn="ctr"/>
+            <a:pPr marL="0" marR="0" lvl="0" indent="0" algn="ctr" defTabSz="914400" rtl="0" eaLnBrk="1" fontAlgn="auto" latinLnBrk="0" hangingPunct="1">
+              <a:lnSpc>
+                <a:spcPct val="100000"/>
+              </a:lnSpc>
+              <a:spcBef>
+                <a:spcPts val="0"/>
+              </a:spcBef>
+              <a:spcAft>
+                <a:spcPts val="0"/>
+              </a:spcAft>
+              <a:buClrTx/>
+              <a:buSzTx/>
+              <a:buFontTx/>
+              <a:buNone/>
+              <a:tabLst/>
+              <a:defRPr/>
+            </a:pPr>
             <a:r>
               <a:rPr lang="en-US" dirty="0" err="1"/>
               <a:t>Pinshot</a:t>
@@ -3614,10 +3791,53 @@
               <a:rPr lang="en-US" dirty="0"/>
               <a:t>-Blue</a:t>
             </a:r>
-          </a:p>
-          <a:p>
-            <a:pPr algn="ctr"/>
-            <a:endParaRPr lang="en-US" sz="800" dirty="0"/>
+            <a:endParaRPr kumimoji="0" lang="en-US" sz="1800" b="0" i="0" u="none" strike="noStrike" kern="1200" cap="none" spc="0" normalizeH="0" baseline="0" noProof="0" dirty="0">
+              <a:ln>
+                <a:noFill/>
+              </a:ln>
+              <a:solidFill>
+                <a:prstClr val="white"/>
+              </a:solidFill>
+              <a:effectLst/>
+              <a:uLnTx/>
+              <a:uFillTx/>
+              <a:latin typeface="Calibri" panose="020F0502020204030204"/>
+              <a:ea typeface="+mn-ea"/>
+              <a:cs typeface="+mn-cs"/>
+            </a:endParaRPr>
+          </a:p>
+          <a:p>
+            <a:pPr marL="0" marR="0" lvl="0" indent="0" algn="ctr" defTabSz="914400" rtl="0" eaLnBrk="1" fontAlgn="auto" latinLnBrk="0" hangingPunct="1">
+              <a:lnSpc>
+                <a:spcPct val="100000"/>
+              </a:lnSpc>
+              <a:spcBef>
+                <a:spcPts val="0"/>
+              </a:spcBef>
+              <a:spcAft>
+                <a:spcPts val="0"/>
+              </a:spcAft>
+              <a:buClrTx/>
+              <a:buSzTx/>
+              <a:buFontTx/>
+              <a:buNone/>
+              <a:tabLst/>
+              <a:defRPr/>
+            </a:pPr>
+            <a:endParaRPr kumimoji="0" lang="en-US" sz="800" b="0" i="0" u="none" strike="noStrike" kern="1200" cap="none" spc="0" normalizeH="0" baseline="0" noProof="0" dirty="0">
+              <a:ln>
+                <a:noFill/>
+              </a:ln>
+              <a:solidFill>
+                <a:prstClr val="white"/>
+              </a:solidFill>
+              <a:effectLst/>
+              <a:uLnTx/>
+              <a:uFillTx/>
+              <a:latin typeface="Calibri" panose="020F0502020204030204"/>
+              <a:ea typeface="+mn-ea"/>
+              <a:cs typeface="+mn-cs"/>
+            </a:endParaRPr>
           </a:p>
           <a:p>
             <a:pPr algn="ctr"/>
@@ -3682,7 +3902,7 @@
             <a:pPr algn="ctr"/>
             <a:r>
               <a:rPr lang="en-US" sz="800" dirty="0"/>
-              <a:t>&lt;&lt; Rust SVC &gt;&gt;</a:t>
+              <a:t>&lt;&lt; C# Assembly&gt;&gt;</a:t>
             </a:r>
           </a:p>
           <a:p>
@@ -3718,61 +3938,45 @@
                 <a:ea typeface="+mn-ea"/>
                 <a:cs typeface="+mn-cs"/>
               </a:rPr>
-              <a:t>Pinshot</a:t>
-            </a:r>
-            <a:r>
-              <a:rPr kumimoji="0" lang="en-US" sz="1800" b="0" i="0" u="none" strike="noStrike" kern="1200" cap="none" spc="0" normalizeH="0" baseline="0" noProof="0" dirty="0">
-                <a:ln>
-                  <a:noFill/>
-                </a:ln>
-                <a:solidFill>
-                  <a:prstClr val="white"/>
-                </a:solidFill>
-                <a:effectLst/>
-                <a:uLnTx/>
-                <a:uFillTx/>
-                <a:latin typeface="Calibri" panose="020F0502020204030204"/>
-                <a:ea typeface="+mn-ea"/>
-                <a:cs typeface="+mn-cs"/>
-              </a:rPr>
-              <a:t>-SVC</a:t>
-            </a:r>
-          </a:p>
-          <a:p>
-            <a:pPr marL="0" marR="0" lvl="0" indent="0" algn="ctr" defTabSz="914400" rtl="0" eaLnBrk="1" fontAlgn="auto" latinLnBrk="0" hangingPunct="1">
-              <a:lnSpc>
-                <a:spcPct val="100000"/>
-              </a:lnSpc>
-              <a:spcBef>
-                <a:spcPts val="0"/>
-              </a:spcBef>
-              <a:spcAft>
-                <a:spcPts val="0"/>
-              </a:spcAft>
-              <a:buClrTx/>
-              <a:buSzTx/>
-              <a:buFontTx/>
-              <a:buNone/>
-              <a:tabLst/>
+              <a:t>NUPhone</a:t>
+            </a:r>
+            <a:endParaRPr kumimoji="0" lang="en-US" sz="1800" b="0" i="0" u="none" strike="noStrike" kern="1200" cap="none" spc="0" normalizeH="0" baseline="0" noProof="0" dirty="0">
+              <a:ln>
+                <a:noFill/>
+              </a:ln>
+              <a:solidFill>
+                <a:prstClr val="white"/>
+              </a:solidFill>
+              <a:effectLst/>
+              <a:uLnTx/>
+              <a:uFillTx/>
+              <a:latin typeface="Calibri" panose="020F0502020204030204"/>
+              <a:ea typeface="+mn-ea"/>
+              <a:cs typeface="+mn-cs"/>
+            </a:endParaRPr>
+          </a:p>
+          <a:p>
+            <a:pPr algn="ctr">
               <a:defRPr/>
             </a:pPr>
             <a:r>
-              <a:rPr kumimoji="0" lang="en-US" sz="800" b="0" i="0" u="none" strike="noStrike" kern="1200" cap="none" spc="0" normalizeH="0" baseline="0" noProof="0" dirty="0">
-                <a:ln>
-                  <a:noFill/>
-                </a:ln>
-                <a:solidFill>
-                  <a:prstClr val="white"/>
-                </a:solidFill>
-                <a:effectLst/>
-                <a:uLnTx/>
-                <a:uFillTx/>
-                <a:latin typeface="Calibri" panose="020F0502020204030204"/>
-                <a:ea typeface="+mn-ea"/>
-                <a:cs typeface="+mn-cs"/>
-              </a:rPr>
-              <a:t>[formerly Pin-Shot-Blue]</a:t>
-            </a:r>
+              <a:rPr lang="en-US" sz="800" dirty="0"/>
+              <a:t>[dotnet 7.0]</a:t>
+            </a:r>
+            <a:endParaRPr kumimoji="0" lang="en-US" sz="800" b="0" i="0" u="none" strike="noStrike" kern="1200" cap="none" spc="0" normalizeH="0" baseline="0" noProof="0" dirty="0">
+              <a:ln>
+                <a:noFill/>
+              </a:ln>
+              <a:solidFill>
+                <a:prstClr val="white"/>
+              </a:solidFill>
+              <a:effectLst/>
+              <a:uLnTx/>
+              <a:uFillTx/>
+              <a:latin typeface="Calibri" panose="020F0502020204030204"/>
+              <a:ea typeface="+mn-ea"/>
+              <a:cs typeface="+mn-cs"/>
+            </a:endParaRPr>
           </a:p>
           <a:p>
             <a:pPr algn="ctr"/>
@@ -3782,7 +3986,7 @@
             <a:pPr algn="ctr"/>
             <a:r>
               <a:rPr lang="en-US" sz="800" dirty="0"/>
-              <a:t>Q1/2023 </a:t>
+              <a:t>Q3/2023 </a:t>
             </a:r>
           </a:p>
         </p:txBody>
@@ -3801,10 +4005,10 @@
         </p:nvGrpSpPr>
         <p:grpSpPr>
           <a:xfrm>
-            <a:off x="1240729" y="1535512"/>
-            <a:ext cx="1015341" cy="791165"/>
+            <a:off x="1240729" y="1535513"/>
+            <a:ext cx="1015341" cy="760388"/>
             <a:chOff x="3791378" y="3615014"/>
-            <a:chExt cx="1498417" cy="1164364"/>
+            <a:chExt cx="1498417" cy="1119069"/>
           </a:xfrm>
         </p:grpSpPr>
         <p:grpSp>
@@ -3868,7 +4072,10 @@
                   <a:avLst/>
                 </a:prstGeom>
                 <a:solidFill>
-                  <a:srgbClr val="7030A0"/>
+                  <a:schemeClr val="accent1">
+                    <a:lumMod val="60000"/>
+                    <a:lumOff val="40000"/>
+                  </a:schemeClr>
                 </a:solidFill>
               </p:spPr>
               <p:style>
@@ -4271,7 +4478,7 @@
           <p:spPr>
             <a:xfrm>
               <a:off x="3791378" y="4281125"/>
-              <a:ext cx="1498417" cy="498253"/>
+              <a:ext cx="1498417" cy="452958"/>
             </a:xfrm>
             <a:prstGeom prst="rect">
               <a:avLst/>
@@ -4288,7 +4495,9 @@
               <a:r>
                 <a:rPr lang="en-US" sz="800" dirty="0">
                   <a:solidFill>
-                    <a:srgbClr val="7030A0"/>
+                    <a:schemeClr val="bg1">
+                      <a:lumMod val="50000"/>
+                    </a:schemeClr>
                   </a:solidFill>
                 </a:rPr>
                 <a:t>Quelle</a:t>
@@ -4297,9 +4506,11 @@
             <a:p>
               <a:pPr algn="ctr"/>
               <a:r>
-                <a:rPr lang="en-US" sz="800" dirty="0">
+                <a:rPr lang="en-US" sz="600" dirty="0">
                   <a:solidFill>
-                    <a:srgbClr val="7030A0"/>
+                    <a:schemeClr val="bg1">
+                      <a:lumMod val="50000"/>
+                    </a:schemeClr>
                   </a:solidFill>
                 </a:rPr>
                 <a:t>&lt;&lt;PEG Grammar&gt;&gt;</a:t>
@@ -4308,430 +4519,6 @@
           </p:txBody>
         </p:sp>
       </p:grpSp>
-      <p:sp>
-        <p:nvSpPr>
-          <p:cNvPr id="23" name="Rectangle 22">
-            <a:extLst>
-              <a:ext uri="{FF2B5EF4-FFF2-40B4-BE49-F238E27FC236}">
-                <a16:creationId xmlns:a16="http://schemas.microsoft.com/office/drawing/2014/main" id="{8C09CDAF-8273-9ABD-5858-3FBAF3771B6B}"/>
-              </a:ext>
-            </a:extLst>
-          </p:cNvPr>
-          <p:cNvSpPr/>
-          <p:nvPr/>
-        </p:nvSpPr>
-        <p:spPr>
-          <a:xfrm>
-            <a:off x="3228565" y="2787749"/>
-            <a:ext cx="1575459" cy="979714"/>
-          </a:xfrm>
-          <a:prstGeom prst="rect">
-            <a:avLst/>
-          </a:prstGeom>
-          <a:solidFill>
-            <a:srgbClr val="7030A0"/>
-          </a:solidFill>
-        </p:spPr>
-        <p:style>
-          <a:lnRef idx="2">
-            <a:schemeClr val="accent1">
-              <a:shade val="50000"/>
-            </a:schemeClr>
-          </a:lnRef>
-          <a:fillRef idx="1">
-            <a:schemeClr val="accent1"/>
-          </a:fillRef>
-          <a:effectRef idx="0">
-            <a:schemeClr val="accent1"/>
-          </a:effectRef>
-          <a:fontRef idx="minor">
-            <a:schemeClr val="lt1"/>
-          </a:fontRef>
-        </p:style>
-        <p:txBody>
-          <a:bodyPr rtlCol="0" anchor="ctr"/>
-          <a:lstStyle/>
-          <a:p>
-            <a:pPr algn="ctr"/>
-            <a:r>
-              <a:rPr lang="en-US" sz="800" dirty="0"/>
-              <a:t>http://github.com/kwonus</a:t>
-            </a:r>
-          </a:p>
-          <a:p>
-            <a:pPr algn="ctr"/>
-            <a:r>
-              <a:rPr lang="en-US" sz="800" dirty="0"/>
-              <a:t>&lt;&lt; C# x64 &gt;&gt;</a:t>
-            </a:r>
-          </a:p>
-          <a:p>
-            <a:pPr algn="ctr"/>
-            <a:r>
-              <a:rPr lang="en-US" dirty="0"/>
-              <a:t>Blueprint-Blue</a:t>
-            </a:r>
-          </a:p>
-          <a:p>
-            <a:pPr algn="ctr"/>
-            <a:r>
-              <a:rPr lang="en-US" sz="800" dirty="0"/>
-              <a:t> [dotnet 7.0 / </a:t>
-            </a:r>
-            <a:r>
-              <a:rPr lang="en-US" sz="800" dirty="0" err="1"/>
-              <a:t>FlatSharp</a:t>
-            </a:r>
-            <a:r>
-              <a:rPr lang="en-US" sz="800" dirty="0"/>
-              <a:t>]</a:t>
-            </a:r>
-          </a:p>
-          <a:p>
-            <a:pPr algn="ctr"/>
-            <a:endParaRPr lang="en-US" sz="800" dirty="0"/>
-          </a:p>
-          <a:p>
-            <a:pPr algn="ctr"/>
-            <a:r>
-              <a:rPr lang="en-US" sz="800" dirty="0"/>
-              <a:t>Q1/2023</a:t>
-            </a:r>
-          </a:p>
-        </p:txBody>
-      </p:sp>
-      <p:grpSp>
-        <p:nvGrpSpPr>
-          <p:cNvPr id="32" name="Group 31">
-            <a:extLst>
-              <a:ext uri="{FF2B5EF4-FFF2-40B4-BE49-F238E27FC236}">
-                <a16:creationId xmlns:a16="http://schemas.microsoft.com/office/drawing/2014/main" id="{71FD284F-4257-727B-0D98-17734D058D3C}"/>
-              </a:ext>
-            </a:extLst>
-          </p:cNvPr>
-          <p:cNvGrpSpPr/>
-          <p:nvPr/>
-        </p:nvGrpSpPr>
-        <p:grpSpPr>
-          <a:xfrm>
-            <a:off x="4804024" y="2935366"/>
-            <a:ext cx="371012" cy="197717"/>
-            <a:chOff x="8494815" y="3989285"/>
-            <a:chExt cx="371012" cy="197717"/>
-          </a:xfrm>
-        </p:grpSpPr>
-        <p:sp>
-          <p:nvSpPr>
-            <p:cNvPr id="24" name="Oval 23">
-              <a:extLst>
-                <a:ext uri="{FF2B5EF4-FFF2-40B4-BE49-F238E27FC236}">
-                  <a16:creationId xmlns:a16="http://schemas.microsoft.com/office/drawing/2014/main" id="{1DF45D3A-6370-186B-57B7-957475CE31E5}"/>
-                </a:ext>
-              </a:extLst>
-            </p:cNvPr>
-            <p:cNvSpPr/>
-            <p:nvPr/>
-          </p:nvSpPr>
-          <p:spPr>
-            <a:xfrm>
-              <a:off x="8650091" y="3989285"/>
-              <a:ext cx="215736" cy="197717"/>
-            </a:xfrm>
-            <a:prstGeom prst="ellipse">
-              <a:avLst/>
-            </a:prstGeom>
-            <a:solidFill>
-              <a:srgbClr val="7030A0"/>
-            </a:solidFill>
-          </p:spPr>
-          <p:style>
-            <a:lnRef idx="2">
-              <a:schemeClr val="accent1">
-                <a:shade val="50000"/>
-              </a:schemeClr>
-            </a:lnRef>
-            <a:fillRef idx="1">
-              <a:schemeClr val="accent1"/>
-            </a:fillRef>
-            <a:effectRef idx="0">
-              <a:schemeClr val="accent1"/>
-            </a:effectRef>
-            <a:fontRef idx="minor">
-              <a:schemeClr val="lt1"/>
-            </a:fontRef>
-          </p:style>
-          <p:txBody>
-            <a:bodyPr rtlCol="0" anchor="ctr"/>
-            <a:lstStyle/>
-            <a:p>
-              <a:pPr algn="ctr"/>
-              <a:endParaRPr lang="en-US"/>
-            </a:p>
-          </p:txBody>
-        </p:sp>
-        <p:cxnSp>
-          <p:nvCxnSpPr>
-            <p:cNvPr id="26" name="Straight Connector 25">
-              <a:extLst>
-                <a:ext uri="{FF2B5EF4-FFF2-40B4-BE49-F238E27FC236}">
-                  <a16:creationId xmlns:a16="http://schemas.microsoft.com/office/drawing/2014/main" id="{A17A7667-F85C-8891-B0A3-1DBAE0C9E57E}"/>
-                </a:ext>
-              </a:extLst>
-            </p:cNvPr>
-            <p:cNvCxnSpPr>
-              <a:cxnSpLocks/>
-            </p:cNvCxnSpPr>
-            <p:nvPr/>
-          </p:nvCxnSpPr>
-          <p:spPr>
-            <a:xfrm>
-              <a:off x="8494815" y="4088144"/>
-              <a:ext cx="155276" cy="0"/>
-            </a:xfrm>
-            <a:prstGeom prst="line">
-              <a:avLst/>
-            </a:prstGeom>
-            <a:ln w="31750">
-              <a:solidFill>
-                <a:srgbClr val="7030A0"/>
-              </a:solidFill>
-            </a:ln>
-          </p:spPr>
-          <p:style>
-            <a:lnRef idx="1">
-              <a:schemeClr val="accent5"/>
-            </a:lnRef>
-            <a:fillRef idx="0">
-              <a:schemeClr val="accent5"/>
-            </a:fillRef>
-            <a:effectRef idx="0">
-              <a:schemeClr val="accent5"/>
-            </a:effectRef>
-            <a:fontRef idx="minor">
-              <a:schemeClr val="tx1"/>
-            </a:fontRef>
-          </p:style>
-        </p:cxnSp>
-      </p:grpSp>
-      <p:grpSp>
-        <p:nvGrpSpPr>
-          <p:cNvPr id="31" name="Group 30">
-            <a:extLst>
-              <a:ext uri="{FF2B5EF4-FFF2-40B4-BE49-F238E27FC236}">
-                <a16:creationId xmlns:a16="http://schemas.microsoft.com/office/drawing/2014/main" id="{9B900D59-867B-802D-533C-F6CD6E13BEE7}"/>
-              </a:ext>
-            </a:extLst>
-          </p:cNvPr>
-          <p:cNvGrpSpPr/>
-          <p:nvPr/>
-        </p:nvGrpSpPr>
-        <p:grpSpPr>
-          <a:xfrm rot="10800000">
-            <a:off x="1825361" y="4330132"/>
-            <a:ext cx="371012" cy="197717"/>
-            <a:chOff x="1325182" y="3958033"/>
-            <a:chExt cx="371012" cy="197717"/>
-          </a:xfrm>
-          <a:solidFill>
-            <a:schemeClr val="tx1">
-              <a:lumMod val="50000"/>
-              <a:lumOff val="50000"/>
-            </a:schemeClr>
-          </a:solidFill>
-        </p:grpSpPr>
-        <p:sp>
-          <p:nvSpPr>
-            <p:cNvPr id="28" name="Oval 27">
-              <a:extLst>
-                <a:ext uri="{FF2B5EF4-FFF2-40B4-BE49-F238E27FC236}">
-                  <a16:creationId xmlns:a16="http://schemas.microsoft.com/office/drawing/2014/main" id="{50949669-51FB-7BBE-7B39-A062B6EA145A}"/>
-                </a:ext>
-              </a:extLst>
-            </p:cNvPr>
-            <p:cNvSpPr/>
-            <p:nvPr/>
-          </p:nvSpPr>
-          <p:spPr>
-            <a:xfrm>
-              <a:off x="1480458" y="3958033"/>
-              <a:ext cx="215736" cy="197717"/>
-            </a:xfrm>
-            <a:prstGeom prst="ellipse">
-              <a:avLst/>
-            </a:prstGeom>
-            <a:solidFill>
-              <a:srgbClr val="7030A0"/>
-            </a:solidFill>
-            <a:ln>
-              <a:solidFill>
-                <a:schemeClr val="accent1"/>
-              </a:solidFill>
-            </a:ln>
-          </p:spPr>
-          <p:style>
-            <a:lnRef idx="2">
-              <a:schemeClr val="accent1">
-                <a:shade val="50000"/>
-              </a:schemeClr>
-            </a:lnRef>
-            <a:fillRef idx="1">
-              <a:schemeClr val="accent1"/>
-            </a:fillRef>
-            <a:effectRef idx="0">
-              <a:schemeClr val="accent1"/>
-            </a:effectRef>
-            <a:fontRef idx="minor">
-              <a:schemeClr val="lt1"/>
-            </a:fontRef>
-          </p:style>
-          <p:txBody>
-            <a:bodyPr rtlCol="0" anchor="ctr"/>
-            <a:lstStyle/>
-            <a:p>
-              <a:pPr algn="ctr"/>
-              <a:endParaRPr lang="en-US"/>
-            </a:p>
-          </p:txBody>
-        </p:sp>
-        <p:cxnSp>
-          <p:nvCxnSpPr>
-            <p:cNvPr id="29" name="Straight Connector 28">
-              <a:extLst>
-                <a:ext uri="{FF2B5EF4-FFF2-40B4-BE49-F238E27FC236}">
-                  <a16:creationId xmlns:a16="http://schemas.microsoft.com/office/drawing/2014/main" id="{3B8DF4AB-B8F0-6F1E-9276-E24845491C55}"/>
-                </a:ext>
-              </a:extLst>
-            </p:cNvPr>
-            <p:cNvCxnSpPr>
-              <a:cxnSpLocks/>
-            </p:cNvCxnSpPr>
-            <p:nvPr/>
-          </p:nvCxnSpPr>
-          <p:spPr>
-            <a:xfrm>
-              <a:off x="1325182" y="4056892"/>
-              <a:ext cx="155276" cy="0"/>
-            </a:xfrm>
-            <a:prstGeom prst="line">
-              <a:avLst/>
-            </a:prstGeom>
-            <a:grpFill/>
-            <a:ln w="31750">
-              <a:solidFill>
-                <a:srgbClr val="7030A0"/>
-              </a:solidFill>
-            </a:ln>
-          </p:spPr>
-          <p:style>
-            <a:lnRef idx="1">
-              <a:schemeClr val="accent5"/>
-            </a:lnRef>
-            <a:fillRef idx="0">
-              <a:schemeClr val="accent5"/>
-            </a:fillRef>
-            <a:effectRef idx="0">
-              <a:schemeClr val="accent5"/>
-            </a:effectRef>
-            <a:fontRef idx="minor">
-              <a:schemeClr val="tx1"/>
-            </a:fontRef>
-          </p:style>
-        </p:cxnSp>
-      </p:grpSp>
-      <p:sp>
-        <p:nvSpPr>
-          <p:cNvPr id="33" name="TextBox 32">
-            <a:extLst>
-              <a:ext uri="{FF2B5EF4-FFF2-40B4-BE49-F238E27FC236}">
-                <a16:creationId xmlns:a16="http://schemas.microsoft.com/office/drawing/2014/main" id="{7B34E417-0BDE-1298-52BD-4B078A8A0842}"/>
-              </a:ext>
-            </a:extLst>
-          </p:cNvPr>
-          <p:cNvSpPr txBox="1"/>
-          <p:nvPr/>
-        </p:nvSpPr>
-        <p:spPr>
-          <a:xfrm>
-            <a:off x="1687313" y="4044016"/>
-            <a:ext cx="525628" cy="276999"/>
-          </a:xfrm>
-          <a:prstGeom prst="rect">
-            <a:avLst/>
-          </a:prstGeom>
-          <a:noFill/>
-        </p:spPr>
-        <p:txBody>
-          <a:bodyPr wrap="square" rtlCol="0">
-            <a:spAutoFit/>
-          </a:bodyPr>
-          <a:lstStyle/>
-          <a:p>
-            <a:pPr algn="ctr"/>
-            <a:r>
-              <a:rPr lang="en-US" sz="1200" dirty="0">
-                <a:solidFill>
-                  <a:schemeClr val="tx1">
-                    <a:lumMod val="50000"/>
-                    <a:lumOff val="50000"/>
-                  </a:schemeClr>
-                </a:solidFill>
-              </a:rPr>
-              <a:t>REST</a:t>
-            </a:r>
-          </a:p>
-        </p:txBody>
-      </p:sp>
-      <p:sp>
-        <p:nvSpPr>
-          <p:cNvPr id="34" name="TextBox 33">
-            <a:extLst>
-              <a:ext uri="{FF2B5EF4-FFF2-40B4-BE49-F238E27FC236}">
-                <a16:creationId xmlns:a16="http://schemas.microsoft.com/office/drawing/2014/main" id="{789AB930-A90B-FAF8-72EA-2585088060F7}"/>
-              </a:ext>
-            </a:extLst>
-          </p:cNvPr>
-          <p:cNvSpPr txBox="1"/>
-          <p:nvPr/>
-        </p:nvSpPr>
-        <p:spPr>
-          <a:xfrm>
-            <a:off x="4783933" y="2530741"/>
-            <a:ext cx="559426" cy="430887"/>
-          </a:xfrm>
-          <a:prstGeom prst="rect">
-            <a:avLst/>
-          </a:prstGeom>
-          <a:noFill/>
-        </p:spPr>
-        <p:txBody>
-          <a:bodyPr wrap="square" rtlCol="0">
-            <a:spAutoFit/>
-          </a:bodyPr>
-          <a:lstStyle/>
-          <a:p>
-            <a:pPr algn="ctr"/>
-            <a:r>
-              <a:rPr lang="en-US" sz="1000" dirty="0">
-                <a:solidFill>
-                  <a:schemeClr val="accent1"/>
-                </a:solidFill>
-              </a:rPr>
-              <a:t>named</a:t>
-            </a:r>
-          </a:p>
-          <a:p>
-            <a:pPr algn="ctr"/>
-            <a:r>
-              <a:rPr lang="en-US" sz="1200" dirty="0">
-                <a:solidFill>
-                  <a:schemeClr val="accent1"/>
-                </a:solidFill>
-              </a:rPr>
-              <a:t>PIPE</a:t>
-            </a:r>
-          </a:p>
-        </p:txBody>
-      </p:sp>
       <p:cxnSp>
         <p:nvCxnSpPr>
           <p:cNvPr id="36" name="Straight Arrow Connector 35">
@@ -4743,22 +4530,28 @@
           </p:cNvPr>
           <p:cNvCxnSpPr>
             <a:cxnSpLocks/>
-            <a:stCxn id="23" idx="1"/>
+            <a:stCxn id="23" idx="3"/>
             <a:endCxn id="6" idx="2"/>
           </p:cNvCxnSpPr>
           <p:nvPr/>
         </p:nvCxnSpPr>
         <p:spPr>
-          <a:xfrm rot="10800000">
-            <a:off x="2986333" y="2292110"/>
-            <a:ext cx="242232" cy="985497"/>
+          <a:xfrm flipH="1" flipV="1">
+            <a:off x="2986333" y="2292109"/>
+            <a:ext cx="1817691" cy="985497"/>
           </a:xfrm>
-          <a:prstGeom prst="bentConnector2">
-            <a:avLst/>
+          <a:prstGeom prst="bentConnector4">
+            <a:avLst>
+              <a:gd name="adj1" fmla="val 47277"/>
+              <a:gd name="adj2" fmla="val 21349"/>
+            </a:avLst>
           </a:prstGeom>
           <a:ln>
             <a:solidFill>
-              <a:srgbClr val="7030A0"/>
+              <a:schemeClr val="tx1">
+                <a:lumMod val="50000"/>
+                <a:lumOff val="50000"/>
+              </a:schemeClr>
             </a:solidFill>
             <a:tailEnd type="triangle"/>
           </a:ln>
@@ -4792,10 +4585,10 @@
         </p:nvGrpSpPr>
         <p:grpSpPr>
           <a:xfrm>
-            <a:off x="1362511" y="4622973"/>
-            <a:ext cx="631295" cy="791166"/>
-            <a:chOff x="4051677" y="3615014"/>
-            <a:chExt cx="931651" cy="1164364"/>
+            <a:off x="1240730" y="4389948"/>
+            <a:ext cx="987891" cy="760389"/>
+            <a:chOff x="3793406" y="3615014"/>
+            <a:chExt cx="1457907" cy="1119069"/>
           </a:xfrm>
         </p:grpSpPr>
         <p:grpSp>
@@ -4859,7 +4652,10 @@
                   <a:avLst/>
                 </a:prstGeom>
                 <a:solidFill>
-                  <a:srgbClr val="7030A0"/>
+                  <a:schemeClr val="accent1">
+                    <a:lumMod val="60000"/>
+                    <a:lumOff val="40000"/>
+                  </a:schemeClr>
                 </a:solidFill>
               </p:spPr>
               <p:style>
@@ -5261,8 +5057,8 @@
           </p:nvSpPr>
           <p:spPr>
             <a:xfrm>
-              <a:off x="4051677" y="4281126"/>
-              <a:ext cx="931651" cy="498252"/>
+              <a:off x="3793406" y="4281126"/>
+              <a:ext cx="1457907" cy="452957"/>
             </a:xfrm>
             <a:prstGeom prst="rect">
               <a:avLst/>
@@ -5277,44 +5073,27 @@
             <a:p>
               <a:pPr algn="ctr"/>
               <a:r>
-                <a:rPr lang="en-US" sz="800" dirty="0" err="1">
+                <a:rPr lang="en-US" sz="800" dirty="0">
                   <a:solidFill>
-                    <a:srgbClr val="7030A0"/>
+                    <a:schemeClr val="bg1">
+                      <a:lumMod val="50000"/>
+                    </a:schemeClr>
                   </a:solidFill>
                 </a:rPr>
-                <a:t>Pinshot</a:t>
+                <a:t>en_US.txt</a:t>
               </a:r>
-              <a:endParaRPr lang="en-US" sz="800" dirty="0">
-                <a:solidFill>
-                  <a:srgbClr val="7030A0"/>
-                </a:solidFill>
-              </a:endParaRPr>
             </a:p>
             <a:p>
               <a:pPr algn="ctr"/>
               <a:r>
-                <a:rPr lang="en-US" sz="800" dirty="0">
+                <a:rPr lang="en-US" sz="600" dirty="0">
                   <a:solidFill>
-                    <a:srgbClr val="7030A0"/>
+                    <a:schemeClr val="bg1">
+                      <a:lumMod val="50000"/>
+                    </a:schemeClr>
                   </a:solidFill>
                 </a:rPr>
-                <a:t>&lt;&lt;</a:t>
-              </a:r>
-              <a:r>
-                <a:rPr lang="en-US" sz="800" dirty="0" err="1">
-                  <a:solidFill>
-                    <a:srgbClr val="7030A0"/>
-                  </a:solidFill>
-                </a:rPr>
-                <a:t>json</a:t>
-              </a:r>
-              <a:r>
-                <a:rPr lang="en-US" sz="800" dirty="0">
-                  <a:solidFill>
-                    <a:srgbClr val="7030A0"/>
-                  </a:solidFill>
-                </a:rPr>
-                <a:t>&gt;&gt;</a:t>
+                <a:t>&lt;&lt;IPA lexicon&gt;&gt;</a:t>
               </a:r>
             </a:p>
           </p:txBody>
@@ -5334,10 +5113,10 @@
         </p:nvGrpSpPr>
         <p:grpSpPr>
           <a:xfrm>
-            <a:off x="5084262" y="3043504"/>
-            <a:ext cx="1004590" cy="791166"/>
+            <a:off x="5030287" y="3043505"/>
+            <a:ext cx="1004590" cy="760389"/>
             <a:chOff x="6481755" y="3590179"/>
-            <a:chExt cx="1482551" cy="1164364"/>
+            <a:chExt cx="1482551" cy="1119069"/>
           </a:xfrm>
         </p:grpSpPr>
         <p:grpSp>
@@ -5401,7 +5180,10 @@
                   <a:avLst/>
                 </a:prstGeom>
                 <a:solidFill>
-                  <a:srgbClr val="7030A0"/>
+                  <a:schemeClr val="accent1">
+                    <a:lumMod val="60000"/>
+                    <a:lumOff val="40000"/>
+                  </a:schemeClr>
                 </a:solidFill>
               </p:spPr>
               <p:style>
@@ -5804,7 +5586,7 @@
           <p:spPr>
             <a:xfrm>
               <a:off x="6481755" y="4256291"/>
-              <a:ext cx="1482551" cy="498252"/>
+              <a:ext cx="1482551" cy="452957"/>
             </a:xfrm>
             <a:prstGeom prst="rect">
               <a:avLst/>
@@ -5821,7 +5603,9 @@
               <a:r>
                 <a:rPr lang="en-US" sz="800" dirty="0">
                   <a:solidFill>
-                    <a:schemeClr val="accent1"/>
+                    <a:schemeClr val="bg1">
+                      <a:lumMod val="50000"/>
+                    </a:schemeClr>
                   </a:solidFill>
                 </a:rPr>
                 <a:t>Blueprint</a:t>
@@ -5830,25 +5614,31 @@
             <a:p>
               <a:pPr algn="ctr"/>
               <a:r>
-                <a:rPr lang="en-US" sz="800" dirty="0">
+                <a:rPr lang="en-US" sz="600" dirty="0">
                   <a:solidFill>
-                    <a:schemeClr val="accent1"/>
+                    <a:schemeClr val="bg1">
+                      <a:lumMod val="50000"/>
+                    </a:schemeClr>
                   </a:solidFill>
                 </a:rPr>
                 <a:t>&lt;&lt;</a:t>
               </a:r>
               <a:r>
-                <a:rPr lang="en-US" sz="800" dirty="0" err="1">
+                <a:rPr lang="en-US" sz="600" dirty="0" err="1">
                   <a:solidFill>
-                    <a:schemeClr val="accent1"/>
+                    <a:schemeClr val="bg1">
+                      <a:lumMod val="50000"/>
+                    </a:schemeClr>
                   </a:solidFill>
                 </a:rPr>
                 <a:t>flatbuffers</a:t>
               </a:r>
               <a:r>
-                <a:rPr lang="en-US" sz="800" dirty="0">
+                <a:rPr lang="en-US" sz="600" dirty="0">
                   <a:solidFill>
-                    <a:schemeClr val="accent1"/>
+                    <a:schemeClr val="bg1">
+                      <a:lumMod val="50000"/>
+                    </a:schemeClr>
                   </a:solidFill>
                 </a:rPr>
                 <a:t>&gt;&gt;</a:t>
@@ -5870,9 +5660,9 @@
           <p:nvPr/>
         </p:nvSpPr>
         <p:spPr>
-          <a:xfrm>
-            <a:off x="2230053" y="2268926"/>
-            <a:ext cx="770283" cy="276999"/>
+          <a:xfrm rot="16200000">
+            <a:off x="2657920" y="2600475"/>
+            <a:ext cx="770283" cy="215444"/>
           </a:xfrm>
           <a:prstGeom prst="rect">
             <a:avLst/>
@@ -5887,67 +5677,14 @@
           <a:p>
             <a:pPr algn="r"/>
             <a:r>
-              <a:rPr lang="en-US" sz="1200" dirty="0">
+              <a:rPr lang="en-US" sz="800" dirty="0">
                 <a:solidFill>
-                  <a:srgbClr val="7030A0"/>
+                  <a:schemeClr val="bg1">
+                    <a:lumMod val="50000"/>
+                  </a:schemeClr>
                 </a:solidFill>
               </a:rPr>
               <a:t>Rust: FFI</a:t>
-            </a:r>
-          </a:p>
-        </p:txBody>
-      </p:sp>
-      <p:sp>
-        <p:nvSpPr>
-          <p:cNvPr id="79" name="TextBox 78">
-            <a:extLst>
-              <a:ext uri="{FF2B5EF4-FFF2-40B4-BE49-F238E27FC236}">
-                <a16:creationId xmlns:a16="http://schemas.microsoft.com/office/drawing/2014/main" id="{145DCF71-B845-C199-084A-7DB93544E068}"/>
-              </a:ext>
-            </a:extLst>
-          </p:cNvPr>
-          <p:cNvSpPr txBox="1"/>
-          <p:nvPr/>
-        </p:nvSpPr>
-        <p:spPr>
-          <a:xfrm>
-            <a:off x="1890837" y="3280519"/>
-            <a:ext cx="1416307" cy="276999"/>
-          </a:xfrm>
-          <a:prstGeom prst="rect">
-            <a:avLst/>
-          </a:prstGeom>
-          <a:noFill/>
-        </p:spPr>
-        <p:txBody>
-          <a:bodyPr wrap="square" rtlCol="0">
-            <a:spAutoFit/>
-          </a:bodyPr>
-          <a:lstStyle/>
-          <a:p>
-            <a:r>
-              <a:rPr lang="en-US" sz="1200" dirty="0">
-                <a:solidFill>
-                  <a:srgbClr val="7030A0"/>
-                </a:solidFill>
-              </a:rPr>
-              <a:t>C#: P/Invoke [</a:t>
-            </a:r>
-            <a:r>
-              <a:rPr lang="en-US" sz="1200" dirty="0" err="1">
-                <a:solidFill>
-                  <a:srgbClr val="7030A0"/>
-                </a:solidFill>
-              </a:rPr>
-              <a:t>cdecl</a:t>
-            </a:r>
-            <a:r>
-              <a:rPr lang="en-US" sz="1200" dirty="0">
-                <a:solidFill>
-                  <a:srgbClr val="7030A0"/>
-                </a:solidFill>
-              </a:rPr>
-              <a:t>]</a:t>
             </a:r>
           </a:p>
         </p:txBody>
@@ -5978,7 +5715,10 @@
           </a:prstGeom>
           <a:ln>
             <a:solidFill>
-              <a:srgbClr val="7030A0"/>
+              <a:schemeClr val="tx1">
+                <a:lumMod val="50000"/>
+                <a:lumOff val="50000"/>
+              </a:schemeClr>
             </a:solidFill>
             <a:tailEnd type="triangle"/>
           </a:ln>
@@ -6201,6 +5941,12 @@
             <a:avLst/>
           </a:prstGeom>
           <a:ln>
+            <a:solidFill>
+              <a:schemeClr val="tx1">
+                <a:lumMod val="50000"/>
+                <a:lumOff val="50000"/>
+              </a:schemeClr>
+            </a:solidFill>
             <a:tailEnd type="triangle"/>
           </a:ln>
         </p:spPr>
@@ -6243,6 +5989,12 @@
             <a:avLst/>
           </a:prstGeom>
           <a:ln>
+            <a:solidFill>
+              <a:schemeClr val="tx1">
+                <a:lumMod val="50000"/>
+                <a:lumOff val="50000"/>
+              </a:schemeClr>
+            </a:solidFill>
             <a:tailEnd type="triangle"/>
           </a:ln>
         </p:spPr>
@@ -6426,301 +6178,6 @@
           </a:p>
         </p:txBody>
       </p:sp>
-      <p:grpSp>
-        <p:nvGrpSpPr>
-          <p:cNvPr id="70" name="Group 69">
-            <a:extLst>
-              <a:ext uri="{FF2B5EF4-FFF2-40B4-BE49-F238E27FC236}">
-                <a16:creationId xmlns:a16="http://schemas.microsoft.com/office/drawing/2014/main" id="{F7DF39D7-F944-B81A-86D3-64CD68469B1B}"/>
-              </a:ext>
-            </a:extLst>
-          </p:cNvPr>
-          <p:cNvGrpSpPr/>
-          <p:nvPr/>
-        </p:nvGrpSpPr>
-        <p:grpSpPr>
-          <a:xfrm>
-            <a:off x="1801378" y="5817378"/>
-            <a:ext cx="263702" cy="540628"/>
-            <a:chOff x="1801378" y="5817378"/>
-            <a:chExt cx="263702" cy="540628"/>
-          </a:xfrm>
-        </p:grpSpPr>
-        <p:sp>
-          <p:nvSpPr>
-            <p:cNvPr id="126" name="Oval 125">
-              <a:extLst>
-                <a:ext uri="{FF2B5EF4-FFF2-40B4-BE49-F238E27FC236}">
-                  <a16:creationId xmlns:a16="http://schemas.microsoft.com/office/drawing/2014/main" id="{4910D05C-2537-1CCB-8AEC-D5B8FB5F9DBA}"/>
-                </a:ext>
-              </a:extLst>
-            </p:cNvPr>
-            <p:cNvSpPr/>
-            <p:nvPr/>
-          </p:nvSpPr>
-          <p:spPr>
-            <a:xfrm>
-              <a:off x="1883774" y="5817378"/>
-              <a:ext cx="112655" cy="96829"/>
-            </a:xfrm>
-            <a:prstGeom prst="ellipse">
-              <a:avLst/>
-            </a:prstGeom>
-            <a:solidFill>
-              <a:schemeClr val="tx1">
-                <a:lumMod val="50000"/>
-                <a:lumOff val="50000"/>
-              </a:schemeClr>
-            </a:solidFill>
-            <a:ln>
-              <a:solidFill>
-                <a:srgbClr val="7030A0"/>
-              </a:solidFill>
-            </a:ln>
-          </p:spPr>
-          <p:style>
-            <a:lnRef idx="2">
-              <a:schemeClr val="accent1">
-                <a:shade val="50000"/>
-              </a:schemeClr>
-            </a:lnRef>
-            <a:fillRef idx="1">
-              <a:schemeClr val="accent1"/>
-            </a:fillRef>
-            <a:effectRef idx="0">
-              <a:schemeClr val="accent1"/>
-            </a:effectRef>
-            <a:fontRef idx="minor">
-              <a:schemeClr val="lt1"/>
-            </a:fontRef>
-          </p:style>
-          <p:txBody>
-            <a:bodyPr rtlCol="0" anchor="ctr"/>
-            <a:lstStyle/>
-            <a:p>
-              <a:pPr algn="ctr"/>
-              <a:endParaRPr lang="en-US"/>
-            </a:p>
-          </p:txBody>
-        </p:sp>
-        <p:cxnSp>
-          <p:nvCxnSpPr>
-            <p:cNvPr id="127" name="Straight Connector 126">
-              <a:extLst>
-                <a:ext uri="{FF2B5EF4-FFF2-40B4-BE49-F238E27FC236}">
-                  <a16:creationId xmlns:a16="http://schemas.microsoft.com/office/drawing/2014/main" id="{BBCBC869-4ADF-EC02-D29C-4229AEFE219B}"/>
-                </a:ext>
-              </a:extLst>
-            </p:cNvPr>
-            <p:cNvCxnSpPr>
-              <a:stCxn id="126" idx="0"/>
-            </p:cNvCxnSpPr>
-            <p:nvPr/>
-          </p:nvCxnSpPr>
-          <p:spPr>
-            <a:xfrm flipH="1">
-              <a:off x="1936078" y="5817378"/>
-              <a:ext cx="4024" cy="283852"/>
-            </a:xfrm>
-            <a:prstGeom prst="line">
-              <a:avLst/>
-            </a:prstGeom>
-            <a:ln w="31750">
-              <a:solidFill>
-                <a:srgbClr val="7030A0"/>
-              </a:solidFill>
-            </a:ln>
-          </p:spPr>
-          <p:style>
-            <a:lnRef idx="1">
-              <a:schemeClr val="accent1"/>
-            </a:lnRef>
-            <a:fillRef idx="0">
-              <a:schemeClr val="accent1"/>
-            </a:fillRef>
-            <a:effectRef idx="0">
-              <a:schemeClr val="accent1"/>
-            </a:effectRef>
-            <a:fontRef idx="minor">
-              <a:schemeClr val="tx1"/>
-            </a:fontRef>
-          </p:style>
-        </p:cxnSp>
-        <p:cxnSp>
-          <p:nvCxnSpPr>
-            <p:cNvPr id="128" name="Straight Connector 127">
-              <a:extLst>
-                <a:ext uri="{FF2B5EF4-FFF2-40B4-BE49-F238E27FC236}">
-                  <a16:creationId xmlns:a16="http://schemas.microsoft.com/office/drawing/2014/main" id="{9C7CB5CE-9C26-77D0-7FC4-5C5ACF0138A9}"/>
-                </a:ext>
-              </a:extLst>
-            </p:cNvPr>
-            <p:cNvCxnSpPr>
-              <a:cxnSpLocks/>
-            </p:cNvCxnSpPr>
-            <p:nvPr/>
-          </p:nvCxnSpPr>
-          <p:spPr>
-            <a:xfrm>
-              <a:off x="1935241" y="6078134"/>
-              <a:ext cx="117134" cy="279872"/>
-            </a:xfrm>
-            <a:prstGeom prst="line">
-              <a:avLst/>
-            </a:prstGeom>
-            <a:ln w="31750">
-              <a:solidFill>
-                <a:srgbClr val="7030A0"/>
-              </a:solidFill>
-            </a:ln>
-          </p:spPr>
-          <p:style>
-            <a:lnRef idx="1">
-              <a:schemeClr val="accent1"/>
-            </a:lnRef>
-            <a:fillRef idx="0">
-              <a:schemeClr val="accent1"/>
-            </a:fillRef>
-            <a:effectRef idx="0">
-              <a:schemeClr val="accent1"/>
-            </a:effectRef>
-            <a:fontRef idx="minor">
-              <a:schemeClr val="tx1"/>
-            </a:fontRef>
-          </p:style>
-        </p:cxnSp>
-        <p:cxnSp>
-          <p:nvCxnSpPr>
-            <p:cNvPr id="129" name="Straight Connector 128">
-              <a:extLst>
-                <a:ext uri="{FF2B5EF4-FFF2-40B4-BE49-F238E27FC236}">
-                  <a16:creationId xmlns:a16="http://schemas.microsoft.com/office/drawing/2014/main" id="{047F2835-D59B-8D76-D37F-282EE8D8BDFA}"/>
-                </a:ext>
-              </a:extLst>
-            </p:cNvPr>
-            <p:cNvCxnSpPr>
-              <a:cxnSpLocks/>
-            </p:cNvCxnSpPr>
-            <p:nvPr/>
-          </p:nvCxnSpPr>
-          <p:spPr>
-            <a:xfrm flipH="1">
-              <a:off x="1817418" y="6078134"/>
-              <a:ext cx="115812" cy="279872"/>
-            </a:xfrm>
-            <a:prstGeom prst="line">
-              <a:avLst/>
-            </a:prstGeom>
-            <a:ln w="31750">
-              <a:solidFill>
-                <a:srgbClr val="7030A0"/>
-              </a:solidFill>
-            </a:ln>
-          </p:spPr>
-          <p:style>
-            <a:lnRef idx="1">
-              <a:schemeClr val="accent1"/>
-            </a:lnRef>
-            <a:fillRef idx="0">
-              <a:schemeClr val="accent1"/>
-            </a:fillRef>
-            <a:effectRef idx="0">
-              <a:schemeClr val="accent1"/>
-            </a:effectRef>
-            <a:fontRef idx="minor">
-              <a:schemeClr val="tx1"/>
-            </a:fontRef>
-          </p:style>
-        </p:cxnSp>
-        <p:cxnSp>
-          <p:nvCxnSpPr>
-            <p:cNvPr id="130" name="Straight Connector 129">
-              <a:extLst>
-                <a:ext uri="{FF2B5EF4-FFF2-40B4-BE49-F238E27FC236}">
-                  <a16:creationId xmlns:a16="http://schemas.microsoft.com/office/drawing/2014/main" id="{C4AB64BA-1695-7E9B-9228-BCC61DCCE44F}"/>
-                </a:ext>
-              </a:extLst>
-            </p:cNvPr>
-            <p:cNvCxnSpPr>
-              <a:cxnSpLocks/>
-            </p:cNvCxnSpPr>
-            <p:nvPr/>
-          </p:nvCxnSpPr>
-          <p:spPr>
-            <a:xfrm flipH="1">
-              <a:off x="1801378" y="5964428"/>
-              <a:ext cx="263702" cy="0"/>
-            </a:xfrm>
-            <a:prstGeom prst="line">
-              <a:avLst/>
-            </a:prstGeom>
-            <a:ln w="31750">
-              <a:solidFill>
-                <a:srgbClr val="7030A0"/>
-              </a:solidFill>
-            </a:ln>
-          </p:spPr>
-          <p:style>
-            <a:lnRef idx="1">
-              <a:schemeClr val="accent1"/>
-            </a:lnRef>
-            <a:fillRef idx="0">
-              <a:schemeClr val="accent1"/>
-            </a:fillRef>
-            <a:effectRef idx="0">
-              <a:schemeClr val="accent1"/>
-            </a:effectRef>
-            <a:fontRef idx="minor">
-              <a:schemeClr val="tx1"/>
-            </a:fontRef>
-          </p:style>
-        </p:cxnSp>
-      </p:grpSp>
-      <p:cxnSp>
-        <p:nvCxnSpPr>
-          <p:cNvPr id="132" name="Straight Arrow Connector 131">
-            <a:extLst>
-              <a:ext uri="{FF2B5EF4-FFF2-40B4-BE49-F238E27FC236}">
-                <a16:creationId xmlns:a16="http://schemas.microsoft.com/office/drawing/2014/main" id="{87AD9BFC-33B5-7CF0-E73A-61516A23B974}"/>
-              </a:ext>
-            </a:extLst>
-          </p:cNvPr>
-          <p:cNvCxnSpPr>
-            <a:cxnSpLocks/>
-            <a:endCxn id="28" idx="0"/>
-          </p:cNvCxnSpPr>
-          <p:nvPr/>
-        </p:nvCxnSpPr>
-        <p:spPr>
-          <a:xfrm flipH="1" flipV="1">
-            <a:off x="1933229" y="4527849"/>
-            <a:ext cx="6873" cy="1086683"/>
-          </a:xfrm>
-          <a:prstGeom prst="straightConnector1">
-            <a:avLst/>
-          </a:prstGeom>
-          <a:ln>
-            <a:solidFill>
-              <a:srgbClr val="7030A0"/>
-            </a:solidFill>
-            <a:tailEnd type="triangle"/>
-          </a:ln>
-        </p:spPr>
-        <p:style>
-          <a:lnRef idx="1">
-            <a:schemeClr val="accent1"/>
-          </a:lnRef>
-          <a:fillRef idx="0">
-            <a:schemeClr val="accent1"/>
-          </a:fillRef>
-          <a:effectRef idx="0">
-            <a:schemeClr val="accent1"/>
-          </a:effectRef>
-          <a:fontRef idx="minor">
-            <a:schemeClr val="tx1"/>
-          </a:fontRef>
-        </p:style>
-      </p:cxnSp>
       <p:sp>
         <p:nvSpPr>
           <p:cNvPr id="154" name="Rectangle 153">
@@ -6843,16 +6300,20 @@
           <p:nvPr/>
         </p:nvCxnSpPr>
         <p:spPr>
-          <a:xfrm rot="10800000">
-            <a:off x="7929755" y="3257106"/>
+          <a:xfrm flipH="1" flipV="1">
+            <a:off x="7929754" y="3257106"/>
             <a:ext cx="495561" cy="2538"/>
           </a:xfrm>
-          <a:prstGeom prst="bentConnector3">
-            <a:avLst>
-              <a:gd name="adj1" fmla="val 50000"/>
-            </a:avLst>
+          <a:prstGeom prst="straightConnector1">
+            <a:avLst/>
           </a:prstGeom>
           <a:ln>
+            <a:solidFill>
+              <a:schemeClr val="tx1">
+                <a:lumMod val="50000"/>
+                <a:lumOff val="50000"/>
+              </a:schemeClr>
+            </a:solidFill>
             <a:tailEnd type="triangle"/>
           </a:ln>
         </p:spPr>
@@ -7120,6 +6581,12 @@
             </a:avLst>
           </a:prstGeom>
           <a:ln>
+            <a:solidFill>
+              <a:schemeClr val="tx1">
+                <a:lumMod val="50000"/>
+                <a:lumOff val="50000"/>
+              </a:schemeClr>
+            </a:solidFill>
             <a:tailEnd type="triangle"/>
           </a:ln>
         </p:spPr>
@@ -7152,10 +6619,10 @@
         </p:nvGrpSpPr>
         <p:grpSpPr>
           <a:xfrm>
-            <a:off x="2348733" y="2518256"/>
-            <a:ext cx="603359" cy="791166"/>
+            <a:off x="2355512" y="2758219"/>
+            <a:ext cx="603359" cy="760389"/>
             <a:chOff x="4092905" y="3615014"/>
-            <a:chExt cx="890423" cy="1164364"/>
+            <a:chExt cx="890423" cy="1119069"/>
           </a:xfrm>
         </p:grpSpPr>
         <p:grpSp>
@@ -7219,7 +6686,10 @@
                   <a:avLst/>
                 </a:prstGeom>
                 <a:solidFill>
-                  <a:srgbClr val="7030A0"/>
+                  <a:schemeClr val="accent1">
+                    <a:lumMod val="60000"/>
+                    <a:lumOff val="40000"/>
+                  </a:schemeClr>
                 </a:solidFill>
               </p:spPr>
               <p:style>
@@ -7622,7 +7092,7 @@
           <p:spPr>
             <a:xfrm>
               <a:off x="4092905" y="4281126"/>
-              <a:ext cx="890423" cy="498252"/>
+              <a:ext cx="890423" cy="452957"/>
             </a:xfrm>
             <a:prstGeom prst="rect">
               <a:avLst/>
@@ -7639,38 +7109,49 @@
               <a:r>
                 <a:rPr lang="en-US" sz="800" dirty="0" err="1">
                   <a:solidFill>
-                    <a:srgbClr val="7030A0"/>
+                    <a:schemeClr val="bg1">
+                      <a:lumMod val="50000"/>
+                    </a:schemeClr>
                   </a:solidFill>
                 </a:rPr>
                 <a:t>Pinshot</a:t>
               </a:r>
               <a:endParaRPr lang="en-US" sz="800" dirty="0">
                 <a:solidFill>
-                  <a:srgbClr val="7030A0"/>
+                  <a:schemeClr val="bg1">
+                    <a:lumMod val="50000"/>
+                  </a:schemeClr>
                 </a:solidFill>
               </a:endParaRPr>
             </a:p>
             <a:p>
+              <a:pPr algn="ctr"/>
               <a:r>
-                <a:rPr lang="en-US" sz="800" dirty="0">
+                <a:rPr lang="en-US" sz="600" dirty="0">
                   <a:solidFill>
-                    <a:srgbClr val="7030A0"/>
+                    <a:schemeClr val="bg1">
+                      <a:lumMod val="50000"/>
+                    </a:schemeClr>
                   </a:solidFill>
                 </a:rPr>
                 <a:t>&lt;&lt;</a:t>
               </a:r>
               <a:r>
-                <a:rPr lang="en-US" sz="800" dirty="0" err="1">
+                <a:rPr lang="en-US" sz="600" dirty="0" err="1">
                   <a:solidFill>
-                    <a:srgbClr val="7030A0"/>
+                    <a:schemeClr val="bg1">
+                      <a:lumMod val="50000"/>
+                    </a:schemeClr>
                   </a:solidFill>
                 </a:rPr>
                 <a:t>json</a:t>
               </a:r>
               <a:r>
-                <a:rPr lang="en-US" sz="800" dirty="0">
+                <a:rPr lang="en-US" sz="600" dirty="0">
                   <a:solidFill>
-                    <a:srgbClr val="7030A0"/>
+                    <a:schemeClr val="bg1">
+                      <a:lumMod val="50000"/>
+                    </a:schemeClr>
                   </a:solidFill>
                 </a:rPr>
                 <a:t>&gt;&gt;</a:t>
@@ -7946,46 +7427,6 @@
       </p:grpSp>
       <p:sp>
         <p:nvSpPr>
-          <p:cNvPr id="248" name="TextBox 247">
-            <a:extLst>
-              <a:ext uri="{FF2B5EF4-FFF2-40B4-BE49-F238E27FC236}">
-                <a16:creationId xmlns:a16="http://schemas.microsoft.com/office/drawing/2014/main" id="{DD255817-DA87-F852-D890-89F5E4FF588A}"/>
-              </a:ext>
-            </a:extLst>
-          </p:cNvPr>
-          <p:cNvSpPr txBox="1"/>
-          <p:nvPr/>
-        </p:nvSpPr>
-        <p:spPr>
-          <a:xfrm>
-            <a:off x="1483001" y="6358006"/>
-            <a:ext cx="934252" cy="276999"/>
-          </a:xfrm>
-          <a:prstGeom prst="rect">
-            <a:avLst/>
-          </a:prstGeom>
-          <a:noFill/>
-        </p:spPr>
-        <p:txBody>
-          <a:bodyPr wrap="square" rtlCol="0">
-            <a:spAutoFit/>
-          </a:bodyPr>
-          <a:lstStyle/>
-          <a:p>
-            <a:pPr algn="ctr"/>
-            <a:r>
-              <a:rPr lang="en-US" sz="1200" dirty="0">
-                <a:solidFill>
-                  <a:srgbClr val="7030A0"/>
-                </a:solidFill>
-              </a:rPr>
-              <a:t>Developer</a:t>
-            </a:r>
-          </a:p>
-        </p:txBody>
-      </p:sp>
-      <p:sp>
-        <p:nvSpPr>
           <p:cNvPr id="249" name="TextBox 248">
             <a:extLst>
               <a:ext uri="{FF2B5EF4-FFF2-40B4-BE49-F238E27FC236}">
@@ -8019,7 +7460,7 @@
                   <a:schemeClr val="accent1"/>
                 </a:solidFill>
               </a:rPr>
-              <a:t>Desktop User</a:t>
+              <a:t>Windows User</a:t>
             </a:r>
           </a:p>
         </p:txBody>
@@ -8062,7 +7503,7 @@
                   </a:schemeClr>
                 </a:solidFill>
               </a:rPr>
-              <a:t>Web User</a:t>
+              <a:t>Any User</a:t>
             </a:r>
           </a:p>
         </p:txBody>
@@ -8221,6 +7662,12 @@
             <a:avLst/>
           </a:prstGeom>
           <a:ln>
+            <a:solidFill>
+              <a:schemeClr val="tx1">
+                <a:lumMod val="50000"/>
+                <a:lumOff val="50000"/>
+              </a:schemeClr>
+            </a:solidFill>
             <a:tailEnd type="triangle"/>
           </a:ln>
         </p:spPr>
@@ -8253,7 +7700,7 @@
         </p:nvSpPr>
         <p:spPr>
           <a:xfrm>
-            <a:off x="5782683" y="3117378"/>
+            <a:off x="5708211" y="3129695"/>
             <a:ext cx="82583" cy="77170"/>
           </a:xfrm>
           <a:prstGeom prst="rightArrow">
@@ -8264,7 +7711,10 @@
           </a:solidFill>
           <a:ln>
             <a:solidFill>
-              <a:srgbClr val="7030A0"/>
+              <a:schemeClr val="tx1">
+                <a:lumMod val="50000"/>
+                <a:lumOff val="50000"/>
+              </a:schemeClr>
             </a:solidFill>
           </a:ln>
         </p:spPr>
@@ -8307,7 +7757,7 @@
         </p:nvSpPr>
         <p:spPr>
           <a:xfrm>
-            <a:off x="2845277" y="2902033"/>
+            <a:off x="2853209" y="3022843"/>
             <a:ext cx="82583" cy="77170"/>
           </a:xfrm>
           <a:prstGeom prst="rightArrow">
@@ -8318,61 +7768,10 @@
           </a:solidFill>
           <a:ln>
             <a:solidFill>
-              <a:srgbClr val="7030A0"/>
-            </a:solidFill>
-          </a:ln>
-        </p:spPr>
-        <p:style>
-          <a:lnRef idx="2">
-            <a:schemeClr val="accent1">
-              <a:shade val="50000"/>
-            </a:schemeClr>
-          </a:lnRef>
-          <a:fillRef idx="1">
-            <a:schemeClr val="accent1"/>
-          </a:fillRef>
-          <a:effectRef idx="0">
-            <a:schemeClr val="accent1"/>
-          </a:effectRef>
-          <a:fontRef idx="minor">
-            <a:schemeClr val="lt1"/>
-          </a:fontRef>
-        </p:style>
-        <p:txBody>
-          <a:bodyPr rtlCol="0" anchor="ctr"/>
-          <a:lstStyle/>
-          <a:p>
-            <a:pPr algn="ctr"/>
-            <a:endParaRPr lang="en-US"/>
-          </a:p>
-        </p:txBody>
-      </p:sp>
-      <p:sp>
-        <p:nvSpPr>
-          <p:cNvPr id="273" name="Arrow: Right 272">
-            <a:extLst>
-              <a:ext uri="{FF2B5EF4-FFF2-40B4-BE49-F238E27FC236}">
-                <a16:creationId xmlns:a16="http://schemas.microsoft.com/office/drawing/2014/main" id="{BFC9A2E1-A980-46F2-1FD1-9326BB848954}"/>
-              </a:ext>
-            </a:extLst>
-          </p:cNvPr>
-          <p:cNvSpPr/>
-          <p:nvPr/>
-        </p:nvSpPr>
-        <p:spPr>
-          <a:xfrm rot="4328670">
-            <a:off x="1701948" y="5448305"/>
-            <a:ext cx="82583" cy="77170"/>
-          </a:xfrm>
-          <a:prstGeom prst="rightArrow">
-            <a:avLst/>
-          </a:prstGeom>
-          <a:solidFill>
-            <a:schemeClr val="bg2"/>
-          </a:solidFill>
-          <a:ln>
-            <a:solidFill>
-              <a:srgbClr val="7030A0"/>
+              <a:schemeClr val="tx1">
+                <a:lumMod val="50000"/>
+                <a:lumOff val="50000"/>
+              </a:schemeClr>
             </a:solidFill>
           </a:ln>
         </p:spPr>
@@ -8566,6 +7965,12 @@
             <a:avLst/>
           </a:prstGeom>
           <a:ln>
+            <a:solidFill>
+              <a:schemeClr val="tx1">
+                <a:lumMod val="50000"/>
+                <a:lumOff val="50000"/>
+              </a:schemeClr>
+            </a:solidFill>
             <a:tailEnd type="triangle"/>
           </a:ln>
         </p:spPr>
@@ -8734,14 +8139,14 @@
           </p:cNvPr>
           <p:cNvCxnSpPr>
             <a:cxnSpLocks/>
-            <a:endCxn id="116" idx="6"/>
+            <a:endCxn id="327" idx="3"/>
           </p:cNvCxnSpPr>
           <p:nvPr/>
         </p:nvCxnSpPr>
         <p:spPr>
           <a:xfrm rot="16200000" flipV="1">
-            <a:off x="8519293" y="3389864"/>
-            <a:ext cx="4184733" cy="488581"/>
+            <a:off x="8466230" y="3336797"/>
+            <a:ext cx="3924269" cy="855179"/>
           </a:xfrm>
           <a:prstGeom prst="bentConnector2">
             <a:avLst/>
@@ -8785,10 +8190,10 @@
         </p:nvGrpSpPr>
         <p:grpSpPr>
           <a:xfrm>
-            <a:off x="4568237" y="1541912"/>
-            <a:ext cx="1004590" cy="791166"/>
-            <a:chOff x="6481755" y="3590179"/>
-            <a:chExt cx="1482551" cy="1164364"/>
+            <a:off x="4709808" y="1288744"/>
+            <a:ext cx="1624915" cy="852722"/>
+            <a:chOff x="6017740" y="3590179"/>
+            <a:chExt cx="2398012" cy="1254956"/>
           </a:xfrm>
         </p:grpSpPr>
         <p:grpSp>
@@ -8852,8 +8257,16 @@
                   <a:avLst/>
                 </a:prstGeom>
                 <a:solidFill>
-                  <a:srgbClr val="7030A0"/>
+                  <a:schemeClr val="accent1">
+                    <a:lumMod val="60000"/>
+                    <a:lumOff val="40000"/>
+                  </a:schemeClr>
                 </a:solidFill>
+                <a:ln>
+                  <a:solidFill>
+                    <a:srgbClr val="0070C0"/>
+                  </a:solidFill>
+                </a:ln>
               </p:spPr>
               <p:style>
                 <a:lnRef idx="2">
@@ -9254,8 +8667,8 @@
           </p:nvSpPr>
           <p:spPr>
             <a:xfrm>
-              <a:off x="6481755" y="4256291"/>
-              <a:ext cx="1482551" cy="498252"/>
+              <a:off x="6017740" y="4256291"/>
+              <a:ext cx="2398012" cy="588844"/>
             </a:xfrm>
             <a:prstGeom prst="rect">
               <a:avLst/>
@@ -9270,81 +8683,57 @@
             <a:p>
               <a:pPr algn="ctr"/>
               <a:r>
-                <a:rPr lang="en-US" sz="800">
+                <a:rPr lang="en-US" sz="800" dirty="0">
                   <a:solidFill>
-                    <a:srgbClr val="7030A0"/>
+                    <a:schemeClr val="bg1">
+                      <a:lumMod val="50000"/>
+                    </a:schemeClr>
                   </a:solidFill>
                 </a:rPr>
                 <a:t>AVX-Omega-3507</a:t>
               </a:r>
-              <a:endParaRPr lang="en-US" sz="800" dirty="0">
-                <a:solidFill>
-                  <a:srgbClr val="7030A0"/>
-                </a:solidFill>
-              </a:endParaRPr>
             </a:p>
             <a:p>
-              <a:pPr algn="ctr"/>
+              <a:pPr marL="0" marR="0" lvl="0" indent="0" algn="ctr" defTabSz="914400" rtl="0" eaLnBrk="1" fontAlgn="auto" latinLnBrk="0" hangingPunct="1">
+                <a:lnSpc>
+                  <a:spcPct val="100000"/>
+                </a:lnSpc>
+                <a:spcBef>
+                  <a:spcPts val="0"/>
+                </a:spcBef>
+                <a:spcAft>
+                  <a:spcPts val="0"/>
+                </a:spcAft>
+                <a:buClrTx/>
+                <a:buSzTx/>
+                <a:buFontTx/>
+                <a:buNone/>
+                <a:tabLst/>
+                <a:defRPr/>
+              </a:pPr>
               <a:r>
-                <a:rPr lang="en-US" sz="800" dirty="0">
+                <a:rPr kumimoji="0" lang="en-US" sz="1200" b="1" i="0" u="none" strike="noStrike" kern="1200" cap="none" spc="0" normalizeH="0" baseline="0" noProof="0" dirty="0">
+                  <a:ln>
+                    <a:noFill/>
+                  </a:ln>
                   <a:solidFill>
-                    <a:srgbClr val="7030A0"/>
+                    <a:schemeClr val="bg1">
+                      <a:lumMod val="50000"/>
+                    </a:schemeClr>
                   </a:solidFill>
+                  <a:effectLst/>
+                  <a:uLnTx/>
+                  <a:uFillTx/>
+                  <a:latin typeface="Calibri" panose="020F0502020204030204"/>
+                  <a:ea typeface="+mn-ea"/>
+                  <a:cs typeface="+mn-cs"/>
                 </a:rPr>
-                <a:t>&lt;&lt;binary data&gt;&gt;</a:t>
+                <a:t>Digital-AV SDK</a:t>
               </a:r>
             </a:p>
           </p:txBody>
         </p:sp>
       </p:grpSp>
-      <p:cxnSp>
-        <p:nvCxnSpPr>
-          <p:cNvPr id="75" name="Straight Arrow Connector 74">
-            <a:extLst>
-              <a:ext uri="{FF2B5EF4-FFF2-40B4-BE49-F238E27FC236}">
-                <a16:creationId xmlns:a16="http://schemas.microsoft.com/office/drawing/2014/main" id="{2DB62C28-5F9B-175A-255F-5908DB92D87A}"/>
-              </a:ext>
-            </a:extLst>
-          </p:cNvPr>
-          <p:cNvCxnSpPr>
-            <a:cxnSpLocks/>
-            <a:endCxn id="20" idx="1"/>
-          </p:cNvCxnSpPr>
-          <p:nvPr/>
-        </p:nvCxnSpPr>
-        <p:spPr>
-          <a:xfrm rot="16200000" flipV="1">
-            <a:off x="762000" y="2619284"/>
-            <a:ext cx="2467428" cy="831264"/>
-          </a:xfrm>
-          <a:prstGeom prst="bentConnector4">
-            <a:avLst>
-              <a:gd name="adj1" fmla="val 13186"/>
-              <a:gd name="adj2" fmla="val 139544"/>
-            </a:avLst>
-          </a:prstGeom>
-          <a:ln>
-            <a:solidFill>
-              <a:srgbClr val="7030A0"/>
-            </a:solidFill>
-            <a:tailEnd type="triangle"/>
-          </a:ln>
-        </p:spPr>
-        <p:style>
-          <a:lnRef idx="1">
-            <a:schemeClr val="accent1"/>
-          </a:lnRef>
-          <a:fillRef idx="0">
-            <a:schemeClr val="accent1"/>
-          </a:fillRef>
-          <a:effectRef idx="0">
-            <a:schemeClr val="accent1"/>
-          </a:effectRef>
-          <a:fontRef idx="minor">
-            <a:schemeClr val="tx1"/>
-          </a:fontRef>
-        </p:style>
-      </p:cxnSp>
       <p:sp>
         <p:nvSpPr>
           <p:cNvPr id="68" name="Arrow: Right 67">
@@ -9359,7 +8748,7 @@
         </p:nvSpPr>
         <p:spPr>
           <a:xfrm rot="10800000">
-            <a:off x="5498646" y="2941544"/>
+            <a:off x="5498646" y="2939163"/>
             <a:ext cx="82583" cy="77170"/>
           </a:xfrm>
           <a:prstGeom prst="rightArrow">
@@ -9370,7 +8759,10 @@
           </a:solidFill>
           <a:ln>
             <a:solidFill>
-              <a:schemeClr val="accent1"/>
+              <a:schemeClr val="tx1">
+                <a:lumMod val="50000"/>
+                <a:lumOff val="50000"/>
+              </a:schemeClr>
             </a:solidFill>
           </a:ln>
         </p:spPr>
@@ -9413,7 +8805,7 @@
         </p:nvSpPr>
         <p:spPr>
           <a:xfrm>
-            <a:off x="5480461" y="2870667"/>
+            <a:off x="5480461" y="2868286"/>
             <a:ext cx="937267" cy="215444"/>
           </a:xfrm>
           <a:prstGeom prst="rect">
@@ -9441,30 +8833,85 @@
       </p:sp>
       <p:cxnSp>
         <p:nvCxnSpPr>
-          <p:cNvPr id="82" name="Straight Arrow Connector 66">
-            <a:extLst>
-              <a:ext uri="{FF2B5EF4-FFF2-40B4-BE49-F238E27FC236}">
-                <a16:creationId xmlns:a16="http://schemas.microsoft.com/office/drawing/2014/main" id="{8836989B-3F19-597F-3F5E-9C360EC741DF}"/>
+          <p:cNvPr id="71" name="Straight Arrow Connector 70">
+            <a:extLst>
+              <a:ext uri="{FF2B5EF4-FFF2-40B4-BE49-F238E27FC236}">
+                <a16:creationId xmlns:a16="http://schemas.microsoft.com/office/drawing/2014/main" id="{8C6B30CD-F697-AD38-00B5-7978629AB47F}"/>
               </a:ext>
             </a:extLst>
           </p:cNvPr>
           <p:cNvCxnSpPr>
             <a:cxnSpLocks/>
-            <a:endCxn id="38" idx="3"/>
           </p:cNvCxnSpPr>
           <p:nvPr/>
         </p:nvCxnSpPr>
         <p:spPr>
-          <a:xfrm rot="10800000">
-            <a:off x="5204934" y="1807604"/>
-            <a:ext cx="1264817" cy="1027671"/>
+          <a:xfrm flipH="1" flipV="1">
+            <a:off x="1881361" y="4672774"/>
+            <a:ext cx="304694" cy="1050"/>
           </a:xfrm>
-          <a:prstGeom prst="bentConnector3">
+          <a:prstGeom prst="straightConnector1">
+            <a:avLst/>
+          </a:prstGeom>
+          <a:ln>
+            <a:solidFill>
+              <a:schemeClr val="tx1">
+                <a:lumMod val="50000"/>
+                <a:lumOff val="50000"/>
+              </a:schemeClr>
+            </a:solidFill>
+            <a:tailEnd type="triangle"/>
+          </a:ln>
+        </p:spPr>
+        <p:style>
+          <a:lnRef idx="1">
+            <a:schemeClr val="accent1"/>
+          </a:lnRef>
+          <a:fillRef idx="0">
+            <a:schemeClr val="accent1"/>
+          </a:fillRef>
+          <a:effectRef idx="0">
+            <a:schemeClr val="accent1"/>
+          </a:effectRef>
+          <a:fontRef idx="minor">
+            <a:schemeClr val="tx1"/>
+          </a:fontRef>
+        </p:style>
+      </p:cxnSp>
+      <p:cxnSp>
+        <p:nvCxnSpPr>
+          <p:cNvPr id="76" name="Straight Arrow Connector 35">
+            <a:extLst>
+              <a:ext uri="{FF2B5EF4-FFF2-40B4-BE49-F238E27FC236}">
+                <a16:creationId xmlns:a16="http://schemas.microsoft.com/office/drawing/2014/main" id="{D3B71E10-8CBA-BC08-23D4-1091CDB8201A}"/>
+              </a:ext>
+            </a:extLst>
+          </p:cNvPr>
+          <p:cNvCxnSpPr>
+            <a:cxnSpLocks/>
+            <a:stCxn id="23" idx="3"/>
+            <a:endCxn id="9" idx="0"/>
+          </p:cNvCxnSpPr>
+          <p:nvPr/>
+        </p:nvCxnSpPr>
+        <p:spPr>
+          <a:xfrm flipH="1">
+            <a:off x="2984103" y="3277606"/>
+            <a:ext cx="1819921" cy="910446"/>
+          </a:xfrm>
+          <a:prstGeom prst="bentConnector4">
             <a:avLst>
-              <a:gd name="adj1" fmla="val 50000"/>
+              <a:gd name="adj1" fmla="val 45751"/>
+              <a:gd name="adj2" fmla="val 25585"/>
             </a:avLst>
           </a:prstGeom>
           <a:ln>
+            <a:solidFill>
+              <a:schemeClr val="tx1">
+                <a:lumMod val="50000"/>
+                <a:lumOff val="50000"/>
+              </a:schemeClr>
+            </a:solidFill>
             <a:tailEnd type="triangle"/>
           </a:ln>
         </p:spPr>
@@ -9485,10 +8932,627 @@
       </p:cxnSp>
       <p:sp>
         <p:nvSpPr>
-          <p:cNvPr id="98" name="TextBox 97">
-            <a:extLst>
-              <a:ext uri="{FF2B5EF4-FFF2-40B4-BE49-F238E27FC236}">
-                <a16:creationId xmlns:a16="http://schemas.microsoft.com/office/drawing/2014/main" id="{79E12740-8A9A-AFB5-CE0B-0BF5A1EFC983}"/>
+          <p:cNvPr id="23" name="Rectangle 22">
+            <a:extLst>
+              <a:ext uri="{FF2B5EF4-FFF2-40B4-BE49-F238E27FC236}">
+                <a16:creationId xmlns:a16="http://schemas.microsoft.com/office/drawing/2014/main" id="{8C09CDAF-8273-9ABD-5858-3FBAF3771B6B}"/>
+              </a:ext>
+            </a:extLst>
+          </p:cNvPr>
+          <p:cNvSpPr/>
+          <p:nvPr/>
+        </p:nvSpPr>
+        <p:spPr>
+          <a:xfrm>
+            <a:off x="3228565" y="2787749"/>
+            <a:ext cx="1575459" cy="979714"/>
+          </a:xfrm>
+          <a:prstGeom prst="rect">
+            <a:avLst/>
+          </a:prstGeom>
+          <a:solidFill>
+            <a:srgbClr val="7030A0"/>
+          </a:solidFill>
+        </p:spPr>
+        <p:style>
+          <a:lnRef idx="2">
+            <a:schemeClr val="accent1">
+              <a:shade val="50000"/>
+            </a:schemeClr>
+          </a:lnRef>
+          <a:fillRef idx="1">
+            <a:schemeClr val="accent1"/>
+          </a:fillRef>
+          <a:effectRef idx="0">
+            <a:schemeClr val="accent1"/>
+          </a:effectRef>
+          <a:fontRef idx="minor">
+            <a:schemeClr val="lt1"/>
+          </a:fontRef>
+        </p:style>
+        <p:txBody>
+          <a:bodyPr rtlCol="0" anchor="ctr"/>
+          <a:lstStyle/>
+          <a:p>
+            <a:pPr algn="ctr"/>
+            <a:r>
+              <a:rPr lang="en-US" sz="800" dirty="0"/>
+              <a:t>http://github.com/kwonus</a:t>
+            </a:r>
+          </a:p>
+          <a:p>
+            <a:pPr algn="ctr"/>
+            <a:r>
+              <a:rPr lang="en-US" sz="800" dirty="0"/>
+              <a:t>&lt;&lt; C# x64 &gt;&gt;</a:t>
+            </a:r>
+          </a:p>
+          <a:p>
+            <a:pPr algn="ctr"/>
+            <a:r>
+              <a:rPr lang="en-US" dirty="0"/>
+              <a:t>Blueprint-Blue</a:t>
+            </a:r>
+          </a:p>
+          <a:p>
+            <a:pPr algn="ctr"/>
+            <a:r>
+              <a:rPr lang="en-US" sz="800" dirty="0"/>
+              <a:t> [dotnet 7.0 / </a:t>
+            </a:r>
+            <a:r>
+              <a:rPr lang="en-US" sz="800" dirty="0" err="1"/>
+              <a:t>FlatSharp</a:t>
+            </a:r>
+            <a:r>
+              <a:rPr lang="en-US" sz="800" dirty="0"/>
+              <a:t>]</a:t>
+            </a:r>
+          </a:p>
+          <a:p>
+            <a:pPr algn="ctr"/>
+            <a:endParaRPr lang="en-US" sz="800" dirty="0"/>
+          </a:p>
+          <a:p>
+            <a:pPr algn="ctr"/>
+            <a:r>
+              <a:rPr lang="en-US" sz="800" dirty="0"/>
+              <a:t>Q1/2023</a:t>
+            </a:r>
+          </a:p>
+        </p:txBody>
+      </p:sp>
+      <p:grpSp>
+        <p:nvGrpSpPr>
+          <p:cNvPr id="85" name="Group 84">
+            <a:extLst>
+              <a:ext uri="{FF2B5EF4-FFF2-40B4-BE49-F238E27FC236}">
+                <a16:creationId xmlns:a16="http://schemas.microsoft.com/office/drawing/2014/main" id="{0BF5D7C4-054A-5368-2A37-4E4E28CD908E}"/>
+              </a:ext>
+            </a:extLst>
+          </p:cNvPr>
+          <p:cNvGrpSpPr/>
+          <p:nvPr/>
+        </p:nvGrpSpPr>
+        <p:grpSpPr>
+          <a:xfrm>
+            <a:off x="4790274" y="2197884"/>
+            <a:ext cx="1396197" cy="668056"/>
+            <a:chOff x="6128291" y="3590179"/>
+            <a:chExt cx="2060475" cy="983182"/>
+          </a:xfrm>
+        </p:grpSpPr>
+        <p:grpSp>
+          <p:nvGrpSpPr>
+            <p:cNvPr id="86" name="Group 85">
+              <a:extLst>
+                <a:ext uri="{FF2B5EF4-FFF2-40B4-BE49-F238E27FC236}">
+                  <a16:creationId xmlns:a16="http://schemas.microsoft.com/office/drawing/2014/main" id="{EB1414B1-BCBA-2A0B-3663-586494C3D0A1}"/>
+                </a:ext>
+              </a:extLst>
+            </p:cNvPr>
+            <p:cNvGrpSpPr/>
+            <p:nvPr/>
+          </p:nvGrpSpPr>
+          <p:grpSpPr>
+            <a:xfrm>
+              <a:off x="6932922" y="3590179"/>
+              <a:ext cx="488454" cy="707199"/>
+              <a:chOff x="1272930" y="2721801"/>
+              <a:chExt cx="488454" cy="707199"/>
+            </a:xfrm>
+          </p:grpSpPr>
+          <p:grpSp>
+            <p:nvGrpSpPr>
+              <p:cNvPr id="90" name="Group 89">
+                <a:extLst>
+                  <a:ext uri="{FF2B5EF4-FFF2-40B4-BE49-F238E27FC236}">
+                    <a16:creationId xmlns:a16="http://schemas.microsoft.com/office/drawing/2014/main" id="{55D1E0AF-DF30-0CDA-60C0-C8D66F1E2B02}"/>
+                  </a:ext>
+                </a:extLst>
+              </p:cNvPr>
+              <p:cNvGrpSpPr/>
+              <p:nvPr/>
+            </p:nvGrpSpPr>
+            <p:grpSpPr>
+              <a:xfrm>
+                <a:off x="1272930" y="2721801"/>
+                <a:ext cx="488454" cy="707199"/>
+                <a:chOff x="2082555" y="2721801"/>
+                <a:chExt cx="488454" cy="707199"/>
+              </a:xfrm>
+            </p:grpSpPr>
+            <p:sp>
+              <p:nvSpPr>
+                <p:cNvPr id="99" name="Rectangle 98">
+                  <a:extLst>
+                    <a:ext uri="{FF2B5EF4-FFF2-40B4-BE49-F238E27FC236}">
+                      <a16:creationId xmlns:a16="http://schemas.microsoft.com/office/drawing/2014/main" id="{A1B0271E-838E-CC16-0FE8-61CE508E4AD4}"/>
+                    </a:ext>
+                  </a:extLst>
+                </p:cNvPr>
+                <p:cNvSpPr/>
+                <p:nvPr/>
+              </p:nvSpPr>
+              <p:spPr>
+                <a:xfrm>
+                  <a:off x="2107871" y="2796639"/>
+                  <a:ext cx="463138" cy="632361"/>
+                </a:xfrm>
+                <a:prstGeom prst="rect">
+                  <a:avLst/>
+                </a:prstGeom>
+                <a:solidFill>
+                  <a:schemeClr val="accent1">
+                    <a:lumMod val="60000"/>
+                    <a:lumOff val="40000"/>
+                  </a:schemeClr>
+                </a:solidFill>
+              </p:spPr>
+              <p:style>
+                <a:lnRef idx="2">
+                  <a:schemeClr val="accent1">
+                    <a:shade val="50000"/>
+                  </a:schemeClr>
+                </a:lnRef>
+                <a:fillRef idx="1">
+                  <a:schemeClr val="accent1"/>
+                </a:fillRef>
+                <a:effectRef idx="0">
+                  <a:schemeClr val="accent1"/>
+                </a:effectRef>
+                <a:fontRef idx="minor">
+                  <a:schemeClr val="lt1"/>
+                </a:fontRef>
+              </p:style>
+              <p:txBody>
+                <a:bodyPr rtlCol="0" anchor="ctr"/>
+                <a:lstStyle/>
+                <a:p>
+                  <a:pPr algn="ctr"/>
+                  <a:endParaRPr lang="en-US"/>
+                </a:p>
+              </p:txBody>
+            </p:sp>
+            <p:sp>
+              <p:nvSpPr>
+                <p:cNvPr id="100" name="Isosceles Triangle 99">
+                  <a:extLst>
+                    <a:ext uri="{FF2B5EF4-FFF2-40B4-BE49-F238E27FC236}">
+                      <a16:creationId xmlns:a16="http://schemas.microsoft.com/office/drawing/2014/main" id="{42F70908-34EA-20CD-6D5C-248B67FA6BF3}"/>
+                    </a:ext>
+                  </a:extLst>
+                </p:cNvPr>
+                <p:cNvSpPr/>
+                <p:nvPr/>
+              </p:nvSpPr>
+              <p:spPr>
+                <a:xfrm rot="7947381" flipV="1">
+                  <a:off x="2035459" y="2768897"/>
+                  <a:ext cx="201880" cy="107688"/>
+                </a:xfrm>
+                <a:prstGeom prst="triangle">
+                  <a:avLst>
+                    <a:gd name="adj" fmla="val 50415"/>
+                  </a:avLst>
+                </a:prstGeom>
+                <a:solidFill>
+                  <a:schemeClr val="bg1"/>
+                </a:solidFill>
+                <a:ln>
+                  <a:solidFill>
+                    <a:schemeClr val="bg1"/>
+                  </a:solidFill>
+                </a:ln>
+              </p:spPr>
+              <p:style>
+                <a:lnRef idx="2">
+                  <a:schemeClr val="accent1">
+                    <a:shade val="50000"/>
+                  </a:schemeClr>
+                </a:lnRef>
+                <a:fillRef idx="1">
+                  <a:schemeClr val="accent1"/>
+                </a:fillRef>
+                <a:effectRef idx="0">
+                  <a:schemeClr val="accent1"/>
+                </a:effectRef>
+                <a:fontRef idx="minor">
+                  <a:schemeClr val="lt1"/>
+                </a:fontRef>
+              </p:style>
+              <p:txBody>
+                <a:bodyPr rtlCol="0" anchor="ctr"/>
+                <a:lstStyle/>
+                <a:p>
+                  <a:pPr algn="ctr"/>
+                  <a:endParaRPr lang="en-US"/>
+                </a:p>
+              </p:txBody>
+            </p:sp>
+            <p:sp>
+              <p:nvSpPr>
+                <p:cNvPr id="102" name="Isosceles Triangle 101">
+                  <a:extLst>
+                    <a:ext uri="{FF2B5EF4-FFF2-40B4-BE49-F238E27FC236}">
+                      <a16:creationId xmlns:a16="http://schemas.microsoft.com/office/drawing/2014/main" id="{7A844674-834D-072E-AC36-9FD6A9F3D710}"/>
+                    </a:ext>
+                  </a:extLst>
+                </p:cNvPr>
+                <p:cNvSpPr/>
+                <p:nvPr/>
+              </p:nvSpPr>
+              <p:spPr>
+                <a:xfrm rot="18762502" flipV="1">
+                  <a:off x="2123370" y="2859537"/>
+                  <a:ext cx="201880" cy="107688"/>
+                </a:xfrm>
+                <a:prstGeom prst="triangle">
+                  <a:avLst>
+                    <a:gd name="adj" fmla="val 50415"/>
+                  </a:avLst>
+                </a:prstGeom>
+                <a:solidFill>
+                  <a:schemeClr val="bg1"/>
+                </a:solidFill>
+                <a:ln>
+                  <a:solidFill>
+                    <a:schemeClr val="accent1"/>
+                  </a:solidFill>
+                </a:ln>
+              </p:spPr>
+              <p:style>
+                <a:lnRef idx="2">
+                  <a:schemeClr val="accent1">
+                    <a:shade val="50000"/>
+                  </a:schemeClr>
+                </a:lnRef>
+                <a:fillRef idx="1">
+                  <a:schemeClr val="accent1"/>
+                </a:fillRef>
+                <a:effectRef idx="0">
+                  <a:schemeClr val="accent1"/>
+                </a:effectRef>
+                <a:fontRef idx="minor">
+                  <a:schemeClr val="lt1"/>
+                </a:fontRef>
+              </p:style>
+              <p:txBody>
+                <a:bodyPr rtlCol="0" anchor="ctr"/>
+                <a:lstStyle/>
+                <a:p>
+                  <a:pPr algn="ctr"/>
+                  <a:endParaRPr lang="en-US"/>
+                </a:p>
+              </p:txBody>
+            </p:sp>
+          </p:grpSp>
+          <p:grpSp>
+            <p:nvGrpSpPr>
+              <p:cNvPr id="91" name="Group 90">
+                <a:extLst>
+                  <a:ext uri="{FF2B5EF4-FFF2-40B4-BE49-F238E27FC236}">
+                    <a16:creationId xmlns:a16="http://schemas.microsoft.com/office/drawing/2014/main" id="{33892D1C-EF0C-D7A6-7A89-449386A5EF5B}"/>
+                  </a:ext>
+                </a:extLst>
+              </p:cNvPr>
+              <p:cNvGrpSpPr/>
+              <p:nvPr/>
+            </p:nvGrpSpPr>
+            <p:grpSpPr>
+              <a:xfrm>
+                <a:off x="1371411" y="3024074"/>
+                <a:ext cx="326420" cy="325909"/>
+                <a:chOff x="1371411" y="3024074"/>
+                <a:chExt cx="342900" cy="325909"/>
+              </a:xfrm>
+            </p:grpSpPr>
+            <p:cxnSp>
+              <p:nvCxnSpPr>
+                <p:cNvPr id="92" name="Straight Connector 91">
+                  <a:extLst>
+                    <a:ext uri="{FF2B5EF4-FFF2-40B4-BE49-F238E27FC236}">
+                      <a16:creationId xmlns:a16="http://schemas.microsoft.com/office/drawing/2014/main" id="{34821ED9-2955-AD74-731D-8C538C07503E}"/>
+                    </a:ext>
+                  </a:extLst>
+                </p:cNvPr>
+                <p:cNvCxnSpPr>
+                  <a:cxnSpLocks/>
+                </p:cNvCxnSpPr>
+                <p:nvPr/>
+              </p:nvCxnSpPr>
+              <p:spPr>
+                <a:xfrm>
+                  <a:off x="1371411" y="3024074"/>
+                  <a:ext cx="342900" cy="0"/>
+                </a:xfrm>
+                <a:prstGeom prst="line">
+                  <a:avLst/>
+                </a:prstGeom>
+                <a:ln>
+                  <a:solidFill>
+                    <a:schemeClr val="bg1">
+                      <a:lumMod val="95000"/>
+                    </a:schemeClr>
+                  </a:solidFill>
+                </a:ln>
+              </p:spPr>
+              <p:style>
+                <a:lnRef idx="1">
+                  <a:schemeClr val="accent1"/>
+                </a:lnRef>
+                <a:fillRef idx="0">
+                  <a:schemeClr val="accent1"/>
+                </a:fillRef>
+                <a:effectRef idx="0">
+                  <a:schemeClr val="accent1"/>
+                </a:effectRef>
+                <a:fontRef idx="minor">
+                  <a:schemeClr val="tx1"/>
+                </a:fontRef>
+              </p:style>
+            </p:cxnSp>
+            <p:cxnSp>
+              <p:nvCxnSpPr>
+                <p:cNvPr id="94" name="Straight Connector 93">
+                  <a:extLst>
+                    <a:ext uri="{FF2B5EF4-FFF2-40B4-BE49-F238E27FC236}">
+                      <a16:creationId xmlns:a16="http://schemas.microsoft.com/office/drawing/2014/main" id="{1115B24B-2DFE-982E-63C2-94E6AB28E375}"/>
+                    </a:ext>
+                  </a:extLst>
+                </p:cNvPr>
+                <p:cNvCxnSpPr>
+                  <a:cxnSpLocks/>
+                </p:cNvCxnSpPr>
+                <p:nvPr/>
+              </p:nvCxnSpPr>
+              <p:spPr>
+                <a:xfrm>
+                  <a:off x="1371411" y="3105551"/>
+                  <a:ext cx="342900" cy="0"/>
+                </a:xfrm>
+                <a:prstGeom prst="line">
+                  <a:avLst/>
+                </a:prstGeom>
+                <a:ln>
+                  <a:solidFill>
+                    <a:schemeClr val="bg1">
+                      <a:lumMod val="95000"/>
+                    </a:schemeClr>
+                  </a:solidFill>
+                </a:ln>
+              </p:spPr>
+              <p:style>
+                <a:lnRef idx="1">
+                  <a:schemeClr val="accent1"/>
+                </a:lnRef>
+                <a:fillRef idx="0">
+                  <a:schemeClr val="accent1"/>
+                </a:fillRef>
+                <a:effectRef idx="0">
+                  <a:schemeClr val="accent1"/>
+                </a:effectRef>
+                <a:fontRef idx="minor">
+                  <a:schemeClr val="tx1"/>
+                </a:fontRef>
+              </p:style>
+            </p:cxnSp>
+            <p:cxnSp>
+              <p:nvCxnSpPr>
+                <p:cNvPr id="95" name="Straight Connector 94">
+                  <a:extLst>
+                    <a:ext uri="{FF2B5EF4-FFF2-40B4-BE49-F238E27FC236}">
+                      <a16:creationId xmlns:a16="http://schemas.microsoft.com/office/drawing/2014/main" id="{AA9587AC-9E06-956C-E583-C5F08AC15572}"/>
+                    </a:ext>
+                  </a:extLst>
+                </p:cNvPr>
+                <p:cNvCxnSpPr>
+                  <a:cxnSpLocks/>
+                </p:cNvCxnSpPr>
+                <p:nvPr/>
+              </p:nvCxnSpPr>
+              <p:spPr>
+                <a:xfrm>
+                  <a:off x="1371411" y="3187028"/>
+                  <a:ext cx="342900" cy="0"/>
+                </a:xfrm>
+                <a:prstGeom prst="line">
+                  <a:avLst/>
+                </a:prstGeom>
+                <a:ln>
+                  <a:solidFill>
+                    <a:schemeClr val="bg1">
+                      <a:lumMod val="95000"/>
+                    </a:schemeClr>
+                  </a:solidFill>
+                </a:ln>
+              </p:spPr>
+              <p:style>
+                <a:lnRef idx="1">
+                  <a:schemeClr val="accent1"/>
+                </a:lnRef>
+                <a:fillRef idx="0">
+                  <a:schemeClr val="accent1"/>
+                </a:fillRef>
+                <a:effectRef idx="0">
+                  <a:schemeClr val="accent1"/>
+                </a:effectRef>
+                <a:fontRef idx="minor">
+                  <a:schemeClr val="tx1"/>
+                </a:fontRef>
+              </p:style>
+            </p:cxnSp>
+            <p:cxnSp>
+              <p:nvCxnSpPr>
+                <p:cNvPr id="96" name="Straight Connector 95">
+                  <a:extLst>
+                    <a:ext uri="{FF2B5EF4-FFF2-40B4-BE49-F238E27FC236}">
+                      <a16:creationId xmlns:a16="http://schemas.microsoft.com/office/drawing/2014/main" id="{EA9C795C-0B90-9BDB-C927-5F76F0357981}"/>
+                    </a:ext>
+                  </a:extLst>
+                </p:cNvPr>
+                <p:cNvCxnSpPr>
+                  <a:cxnSpLocks/>
+                </p:cNvCxnSpPr>
+                <p:nvPr/>
+              </p:nvCxnSpPr>
+              <p:spPr>
+                <a:xfrm>
+                  <a:off x="1371411" y="3268505"/>
+                  <a:ext cx="342900" cy="0"/>
+                </a:xfrm>
+                <a:prstGeom prst="line">
+                  <a:avLst/>
+                </a:prstGeom>
+                <a:ln>
+                  <a:solidFill>
+                    <a:schemeClr val="bg1">
+                      <a:lumMod val="95000"/>
+                    </a:schemeClr>
+                  </a:solidFill>
+                </a:ln>
+              </p:spPr>
+              <p:style>
+                <a:lnRef idx="1">
+                  <a:schemeClr val="accent1"/>
+                </a:lnRef>
+                <a:fillRef idx="0">
+                  <a:schemeClr val="accent1"/>
+                </a:fillRef>
+                <a:effectRef idx="0">
+                  <a:schemeClr val="accent1"/>
+                </a:effectRef>
+                <a:fontRef idx="minor">
+                  <a:schemeClr val="tx1"/>
+                </a:fontRef>
+              </p:style>
+            </p:cxnSp>
+            <p:cxnSp>
+              <p:nvCxnSpPr>
+                <p:cNvPr id="97" name="Straight Connector 96">
+                  <a:extLst>
+                    <a:ext uri="{FF2B5EF4-FFF2-40B4-BE49-F238E27FC236}">
+                      <a16:creationId xmlns:a16="http://schemas.microsoft.com/office/drawing/2014/main" id="{6ABAF272-2A6C-726B-F091-FD5A8712451E}"/>
+                    </a:ext>
+                  </a:extLst>
+                </p:cNvPr>
+                <p:cNvCxnSpPr>
+                  <a:cxnSpLocks/>
+                </p:cNvCxnSpPr>
+                <p:nvPr/>
+              </p:nvCxnSpPr>
+              <p:spPr>
+                <a:xfrm>
+                  <a:off x="1371411" y="3349983"/>
+                  <a:ext cx="342900" cy="0"/>
+                </a:xfrm>
+                <a:prstGeom prst="line">
+                  <a:avLst/>
+                </a:prstGeom>
+                <a:ln>
+                  <a:solidFill>
+                    <a:schemeClr val="bg1">
+                      <a:lumMod val="95000"/>
+                    </a:schemeClr>
+                  </a:solidFill>
+                </a:ln>
+              </p:spPr>
+              <p:style>
+                <a:lnRef idx="1">
+                  <a:schemeClr val="accent1"/>
+                </a:lnRef>
+                <a:fillRef idx="0">
+                  <a:schemeClr val="accent1"/>
+                </a:fillRef>
+                <a:effectRef idx="0">
+                  <a:schemeClr val="accent1"/>
+                </a:effectRef>
+                <a:fontRef idx="minor">
+                  <a:schemeClr val="tx1"/>
+                </a:fontRef>
+              </p:style>
+            </p:cxnSp>
+          </p:grpSp>
+        </p:grpSp>
+        <p:sp>
+          <p:nvSpPr>
+            <p:cNvPr id="87" name="TextBox 86">
+              <a:extLst>
+                <a:ext uri="{FF2B5EF4-FFF2-40B4-BE49-F238E27FC236}">
+                  <a16:creationId xmlns:a16="http://schemas.microsoft.com/office/drawing/2014/main" id="{2CA5AD47-EABA-8B67-4A00-682C4A613EA9}"/>
+                </a:ext>
+              </a:extLst>
+            </p:cNvPr>
+            <p:cNvSpPr txBox="1"/>
+            <p:nvPr/>
+          </p:nvSpPr>
+          <p:spPr>
+            <a:xfrm>
+              <a:off x="6128291" y="4256291"/>
+              <a:ext cx="2060475" cy="317070"/>
+            </a:xfrm>
+            <a:prstGeom prst="rect">
+              <a:avLst/>
+            </a:prstGeom>
+            <a:noFill/>
+          </p:spPr>
+          <p:txBody>
+            <a:bodyPr wrap="square" rtlCol="0">
+              <a:spAutoFit/>
+            </a:bodyPr>
+            <a:lstStyle/>
+            <a:p>
+              <a:pPr algn="ctr"/>
+              <a:r>
+                <a:rPr lang="en-US" sz="800" dirty="0" err="1">
+                  <a:solidFill>
+                    <a:schemeClr val="bg1">
+                      <a:lumMod val="50000"/>
+                    </a:schemeClr>
+                  </a:solidFill>
+                </a:rPr>
+                <a:t>NUPhone</a:t>
+              </a:r>
+              <a:r>
+                <a:rPr lang="en-US" sz="800" dirty="0">
+                  <a:solidFill>
+                    <a:schemeClr val="bg1">
+                      <a:lumMod val="50000"/>
+                    </a:schemeClr>
+                  </a:solidFill>
+                </a:rPr>
+                <a:t>-Lexicon for AVX</a:t>
+              </a:r>
+            </a:p>
+          </p:txBody>
+        </p:sp>
+      </p:grpSp>
+      <p:sp>
+        <p:nvSpPr>
+          <p:cNvPr id="142" name="TextBox 141">
+            <a:extLst>
+              <a:ext uri="{FF2B5EF4-FFF2-40B4-BE49-F238E27FC236}">
+                <a16:creationId xmlns:a16="http://schemas.microsoft.com/office/drawing/2014/main" id="{805B72EA-DF1E-BE10-BDEC-8997EAEFF3AE}"/>
               </a:ext>
             </a:extLst>
           </p:cNvPr>
@@ -9496,9 +9560,9 @@
           <p:nvPr/>
         </p:nvSpPr>
         <p:spPr>
-          <a:xfrm>
-            <a:off x="4474143" y="1304430"/>
-            <a:ext cx="1204829" cy="276999"/>
+          <a:xfrm rot="16200000">
+            <a:off x="4069890" y="2527349"/>
+            <a:ext cx="448344" cy="200055"/>
           </a:xfrm>
           <a:prstGeom prst="rect">
             <a:avLst/>
@@ -9513,137 +9577,534 @@
           <a:p>
             <a:pPr algn="ctr"/>
             <a:r>
-              <a:rPr lang="en-US" sz="1200" b="1" dirty="0">
+              <a:rPr lang="en-US" sz="700" dirty="0">
                 <a:solidFill>
                   <a:srgbClr val="7030A0"/>
                 </a:solidFill>
               </a:rPr>
-              <a:t>Digital-AV SDK</a:t>
-            </a:r>
+              <a:t>create</a:t>
+            </a:r>
+            <a:endParaRPr lang="en-US" sz="1050" dirty="0">
+              <a:solidFill>
+                <a:srgbClr val="7030A0"/>
+              </a:solidFill>
+            </a:endParaRPr>
           </a:p>
         </p:txBody>
       </p:sp>
-      <p:grpSp>
-        <p:nvGrpSpPr>
-          <p:cNvPr id="115" name="Group 114">
-            <a:extLst>
-              <a:ext uri="{FF2B5EF4-FFF2-40B4-BE49-F238E27FC236}">
-                <a16:creationId xmlns:a16="http://schemas.microsoft.com/office/drawing/2014/main" id="{5503A6B2-FA15-F0D2-564D-95EA8E77F17D}"/>
-              </a:ext>
-            </a:extLst>
-          </p:cNvPr>
-          <p:cNvGrpSpPr/>
+      <p:sp>
+        <p:nvSpPr>
+          <p:cNvPr id="143" name="TextBox 142">
+            <a:extLst>
+              <a:ext uri="{FF2B5EF4-FFF2-40B4-BE49-F238E27FC236}">
+                <a16:creationId xmlns:a16="http://schemas.microsoft.com/office/drawing/2014/main" id="{65CC9764-E311-3161-C3F7-EB80DC496B4C}"/>
+              </a:ext>
+            </a:extLst>
+          </p:cNvPr>
+          <p:cNvSpPr txBox="1"/>
           <p:nvPr/>
-        </p:nvGrpSpPr>
-        <p:grpSpPr>
+        </p:nvSpPr>
+        <p:spPr>
           <a:xfrm>
-            <a:off x="9996356" y="1442929"/>
-            <a:ext cx="371012" cy="197717"/>
-            <a:chOff x="1325182" y="3958033"/>
-            <a:chExt cx="371012" cy="197717"/>
+            <a:off x="3156618" y="1957345"/>
+            <a:ext cx="475163" cy="369332"/>
           </a:xfrm>
+          <a:prstGeom prst="rect">
+            <a:avLst/>
+          </a:prstGeom>
+          <a:noFill/>
+        </p:spPr>
+        <p:txBody>
+          <a:bodyPr wrap="square" rtlCol="0">
+            <a:spAutoFit/>
+          </a:bodyPr>
+          <a:lstStyle/>
+          <a:p>
+            <a:r>
+              <a:rPr lang="en-US" dirty="0">
+                <a:solidFill>
+                  <a:schemeClr val="accent6"/>
+                </a:solidFill>
+                <a:sym typeface="Wingdings" panose="05000000000000000000" pitchFamily="2" charset="2"/>
+              </a:rPr>
+              <a:t></a:t>
+            </a:r>
+            <a:endParaRPr lang="en-US" dirty="0">
+              <a:solidFill>
+                <a:schemeClr val="accent6"/>
+              </a:solidFill>
+            </a:endParaRPr>
+          </a:p>
+        </p:txBody>
+      </p:sp>
+      <p:sp>
+        <p:nvSpPr>
+          <p:cNvPr id="144" name="TextBox 143">
+            <a:extLst>
+              <a:ext uri="{FF2B5EF4-FFF2-40B4-BE49-F238E27FC236}">
+                <a16:creationId xmlns:a16="http://schemas.microsoft.com/office/drawing/2014/main" id="{65646C02-6F87-454C-9898-B856CE36A216}"/>
+              </a:ext>
+            </a:extLst>
+          </p:cNvPr>
+          <p:cNvSpPr txBox="1"/>
+          <p:nvPr/>
+        </p:nvSpPr>
+        <p:spPr>
+          <a:xfrm>
+            <a:off x="7318449" y="2001375"/>
+            <a:ext cx="475163" cy="369332"/>
+          </a:xfrm>
+          <a:prstGeom prst="rect">
+            <a:avLst/>
+          </a:prstGeom>
+          <a:noFill/>
+        </p:spPr>
+        <p:txBody>
+          <a:bodyPr wrap="square" rtlCol="0">
+            <a:spAutoFit/>
+          </a:bodyPr>
+          <a:lstStyle/>
+          <a:p>
+            <a:r>
+              <a:rPr lang="en-US" dirty="0">
+                <a:solidFill>
+                  <a:schemeClr val="accent6"/>
+                </a:solidFill>
+                <a:sym typeface="Wingdings" panose="05000000000000000000" pitchFamily="2" charset="2"/>
+              </a:rPr>
+              <a:t></a:t>
+            </a:r>
+            <a:endParaRPr lang="en-US" dirty="0">
+              <a:solidFill>
+                <a:schemeClr val="accent6"/>
+              </a:solidFill>
+            </a:endParaRPr>
+          </a:p>
+        </p:txBody>
+      </p:sp>
+      <p:sp>
+        <p:nvSpPr>
+          <p:cNvPr id="145" name="TextBox 144">
+            <a:extLst>
+              <a:ext uri="{FF2B5EF4-FFF2-40B4-BE49-F238E27FC236}">
+                <a16:creationId xmlns:a16="http://schemas.microsoft.com/office/drawing/2014/main" id="{A284AB2F-35EA-BC88-C3DF-ED7AF90EA35E}"/>
+              </a:ext>
+            </a:extLst>
+          </p:cNvPr>
+          <p:cNvSpPr txBox="1"/>
+          <p:nvPr/>
+        </p:nvSpPr>
+        <p:spPr>
+          <a:xfrm>
+            <a:off x="4252808" y="3463358"/>
+            <a:ext cx="475163" cy="369332"/>
+          </a:xfrm>
+          <a:prstGeom prst="rect">
+            <a:avLst/>
+          </a:prstGeom>
+          <a:noFill/>
+        </p:spPr>
+        <p:txBody>
+          <a:bodyPr wrap="square" rtlCol="0">
+            <a:spAutoFit/>
+          </a:bodyPr>
+          <a:lstStyle/>
+          <a:p>
+            <a:r>
+              <a:rPr lang="en-US" dirty="0">
+                <a:solidFill>
+                  <a:schemeClr val="accent6"/>
+                </a:solidFill>
+                <a:sym typeface="Wingdings" panose="05000000000000000000" pitchFamily="2" charset="2"/>
+              </a:rPr>
+              <a:t></a:t>
+            </a:r>
+            <a:endParaRPr lang="en-US" dirty="0">
+              <a:solidFill>
+                <a:schemeClr val="accent6"/>
+              </a:solidFill>
+            </a:endParaRPr>
+          </a:p>
+        </p:txBody>
+      </p:sp>
+      <p:sp>
+        <p:nvSpPr>
+          <p:cNvPr id="150" name="TextBox 149">
+            <a:extLst>
+              <a:ext uri="{FF2B5EF4-FFF2-40B4-BE49-F238E27FC236}">
+                <a16:creationId xmlns:a16="http://schemas.microsoft.com/office/drawing/2014/main" id="{7C01A188-BFDF-1018-3C40-A4901686F9A3}"/>
+              </a:ext>
+            </a:extLst>
+          </p:cNvPr>
+          <p:cNvSpPr txBox="1"/>
+          <p:nvPr/>
+        </p:nvSpPr>
+        <p:spPr>
+          <a:xfrm>
+            <a:off x="3167792" y="4870477"/>
+            <a:ext cx="475163" cy="369332"/>
+          </a:xfrm>
+          <a:prstGeom prst="rect">
+            <a:avLst/>
+          </a:prstGeom>
+          <a:noFill/>
+        </p:spPr>
+        <p:txBody>
+          <a:bodyPr wrap="square" rtlCol="0">
+            <a:spAutoFit/>
+          </a:bodyPr>
+          <a:lstStyle/>
+          <a:p>
+            <a:r>
+              <a:rPr lang="en-US" dirty="0">
+                <a:solidFill>
+                  <a:schemeClr val="accent6"/>
+                </a:solidFill>
+                <a:sym typeface="Wingdings" panose="05000000000000000000" pitchFamily="2" charset="2"/>
+              </a:rPr>
+              <a:t></a:t>
+            </a:r>
+            <a:endParaRPr lang="en-US" dirty="0">
+              <a:solidFill>
+                <a:schemeClr val="accent6"/>
+              </a:solidFill>
+            </a:endParaRPr>
+          </a:p>
+        </p:txBody>
+      </p:sp>
+      <p:cxnSp>
+        <p:nvCxnSpPr>
+          <p:cNvPr id="33" name="Straight Arrow Connector 169">
+            <a:extLst>
+              <a:ext uri="{FF2B5EF4-FFF2-40B4-BE49-F238E27FC236}">
+                <a16:creationId xmlns:a16="http://schemas.microsoft.com/office/drawing/2014/main" id="{1BD018A9-6DD0-0540-6E92-9DAB2700AAC7}"/>
+              </a:ext>
+            </a:extLst>
+          </p:cNvPr>
+          <p:cNvCxnSpPr>
+            <a:cxnSpLocks/>
+            <a:endCxn id="154" idx="3"/>
+          </p:cNvCxnSpPr>
+          <p:nvPr/>
+        </p:nvCxnSpPr>
+        <p:spPr>
+          <a:xfrm flipH="1">
+            <a:off x="10000774" y="6072820"/>
+            <a:ext cx="676162" cy="0"/>
+          </a:xfrm>
+          <a:prstGeom prst="straightConnector1">
+            <a:avLst/>
+          </a:prstGeom>
+          <a:ln>
+            <a:solidFill>
+              <a:schemeClr val="tx1">
+                <a:lumMod val="50000"/>
+                <a:lumOff val="50000"/>
+              </a:schemeClr>
+            </a:solidFill>
+            <a:tailEnd type="triangle"/>
+          </a:ln>
+        </p:spPr>
+        <p:style>
+          <a:lnRef idx="1">
+            <a:schemeClr val="accent1"/>
+          </a:lnRef>
+          <a:fillRef idx="0">
+            <a:schemeClr val="accent1"/>
+          </a:fillRef>
+          <a:effectRef idx="0">
+            <a:schemeClr val="accent1"/>
+          </a:effectRef>
+          <a:fontRef idx="minor">
+            <a:schemeClr val="tx1"/>
+          </a:fontRef>
+        </p:style>
+      </p:cxnSp>
+      <p:sp>
+        <p:nvSpPr>
+          <p:cNvPr id="152" name="Arrow: Right 151">
+            <a:extLst>
+              <a:ext uri="{FF2B5EF4-FFF2-40B4-BE49-F238E27FC236}">
+                <a16:creationId xmlns:a16="http://schemas.microsoft.com/office/drawing/2014/main" id="{13746A5F-C32A-DA2D-D6EB-90A3E9E6BE1F}"/>
+              </a:ext>
+            </a:extLst>
+          </p:cNvPr>
+          <p:cNvSpPr/>
+          <p:nvPr/>
+        </p:nvSpPr>
+        <p:spPr>
+          <a:xfrm>
+            <a:off x="5710439" y="2560440"/>
+            <a:ext cx="82583" cy="77170"/>
+          </a:xfrm>
+          <a:prstGeom prst="rightArrow">
+            <a:avLst/>
+          </a:prstGeom>
           <a:solidFill>
-            <a:schemeClr val="tx1">
-              <a:lumMod val="50000"/>
-              <a:lumOff val="50000"/>
+            <a:schemeClr val="bg2"/>
+          </a:solidFill>
+          <a:ln>
+            <a:solidFill>
+              <a:schemeClr val="tx1">
+                <a:lumMod val="50000"/>
+                <a:lumOff val="50000"/>
+              </a:schemeClr>
+            </a:solidFill>
+          </a:ln>
+        </p:spPr>
+        <p:style>
+          <a:lnRef idx="2">
+            <a:schemeClr val="accent1">
+              <a:shade val="50000"/>
             </a:schemeClr>
+          </a:lnRef>
+          <a:fillRef idx="1">
+            <a:schemeClr val="accent1"/>
+          </a:fillRef>
+          <a:effectRef idx="0">
+            <a:schemeClr val="accent1"/>
+          </a:effectRef>
+          <a:fontRef idx="minor">
+            <a:schemeClr val="lt1"/>
+          </a:fontRef>
+        </p:style>
+        <p:txBody>
+          <a:bodyPr rtlCol="0" anchor="ctr"/>
+          <a:lstStyle/>
+          <a:p>
+            <a:pPr algn="ctr"/>
+            <a:endParaRPr lang="en-US"/>
+          </a:p>
+        </p:txBody>
+      </p:sp>
+      <p:sp>
+        <p:nvSpPr>
+          <p:cNvPr id="153" name="Arrow: Right 152">
+            <a:extLst>
+              <a:ext uri="{FF2B5EF4-FFF2-40B4-BE49-F238E27FC236}">
+                <a16:creationId xmlns:a16="http://schemas.microsoft.com/office/drawing/2014/main" id="{D0240A4E-9805-8E69-6D3E-C4FE6883DB6B}"/>
+              </a:ext>
+            </a:extLst>
+          </p:cNvPr>
+          <p:cNvSpPr/>
+          <p:nvPr/>
+        </p:nvSpPr>
+        <p:spPr>
+          <a:xfrm>
+            <a:off x="5695122" y="1649288"/>
+            <a:ext cx="82583" cy="77170"/>
+          </a:xfrm>
+          <a:prstGeom prst="rightArrow">
+            <a:avLst/>
+          </a:prstGeom>
+          <a:solidFill>
+            <a:schemeClr val="bg2"/>
           </a:solidFill>
-        </p:grpSpPr>
-        <p:sp>
-          <p:nvSpPr>
-            <p:cNvPr id="116" name="Oval 115">
-              <a:extLst>
-                <a:ext uri="{FF2B5EF4-FFF2-40B4-BE49-F238E27FC236}">
-                  <a16:creationId xmlns:a16="http://schemas.microsoft.com/office/drawing/2014/main" id="{05CFB0B7-626E-F047-E875-360D89A9C296}"/>
-                </a:ext>
-              </a:extLst>
-            </p:cNvPr>
-            <p:cNvSpPr/>
-            <p:nvPr/>
-          </p:nvSpPr>
-          <p:spPr>
-            <a:xfrm>
-              <a:off x="1480458" y="3958033"/>
-              <a:ext cx="215736" cy="197717"/>
-            </a:xfrm>
-            <a:prstGeom prst="ellipse">
-              <a:avLst/>
-            </a:prstGeom>
-            <a:grpFill/>
-          </p:spPr>
-          <p:style>
-            <a:lnRef idx="2">
-              <a:schemeClr val="accent1">
-                <a:shade val="50000"/>
+          <a:ln>
+            <a:solidFill>
+              <a:schemeClr val="tx1">
+                <a:lumMod val="50000"/>
+                <a:lumOff val="50000"/>
               </a:schemeClr>
-            </a:lnRef>
-            <a:fillRef idx="1">
-              <a:schemeClr val="accent1"/>
-            </a:fillRef>
-            <a:effectRef idx="0">
-              <a:schemeClr val="accent1"/>
-            </a:effectRef>
-            <a:fontRef idx="minor">
-              <a:schemeClr val="lt1"/>
-            </a:fontRef>
-          </p:style>
-          <p:txBody>
-            <a:bodyPr rtlCol="0" anchor="ctr"/>
-            <a:lstStyle/>
-            <a:p>
-              <a:pPr algn="ctr"/>
-              <a:endParaRPr lang="en-US"/>
-            </a:p>
-          </p:txBody>
-        </p:sp>
-        <p:cxnSp>
-          <p:nvCxnSpPr>
-            <p:cNvPr id="117" name="Straight Connector 116">
-              <a:extLst>
-                <a:ext uri="{FF2B5EF4-FFF2-40B4-BE49-F238E27FC236}">
-                  <a16:creationId xmlns:a16="http://schemas.microsoft.com/office/drawing/2014/main" id="{6B693931-1EC3-DAAD-2D76-746A3823BDF6}"/>
-                </a:ext>
-              </a:extLst>
-            </p:cNvPr>
-            <p:cNvCxnSpPr>
-              <a:cxnSpLocks/>
-            </p:cNvCxnSpPr>
-            <p:nvPr/>
-          </p:nvCxnSpPr>
-          <p:spPr>
-            <a:xfrm>
-              <a:off x="1325182" y="4056892"/>
-              <a:ext cx="155276" cy="0"/>
-            </a:xfrm>
-            <a:prstGeom prst="line">
-              <a:avLst/>
-            </a:prstGeom>
-            <a:grpFill/>
-            <a:ln w="31750">
-              <a:solidFill>
-                <a:schemeClr val="tx1">
-                  <a:lumMod val="50000"/>
-                  <a:lumOff val="50000"/>
-                </a:schemeClr>
-              </a:solidFill>
-            </a:ln>
-          </p:spPr>
-          <p:style>
-            <a:lnRef idx="1">
-              <a:schemeClr val="accent5"/>
-            </a:lnRef>
-            <a:fillRef idx="0">
-              <a:schemeClr val="accent5"/>
-            </a:fillRef>
-            <a:effectRef idx="0">
-              <a:schemeClr val="accent5"/>
-            </a:effectRef>
-            <a:fontRef idx="minor">
-              <a:schemeClr val="tx1"/>
-            </a:fontRef>
-          </p:style>
-        </p:cxnSp>
-      </p:grpSp>
+            </a:solidFill>
+          </a:ln>
+        </p:spPr>
+        <p:style>
+          <a:lnRef idx="2">
+            <a:schemeClr val="accent1">
+              <a:shade val="50000"/>
+            </a:schemeClr>
+          </a:lnRef>
+          <a:fillRef idx="1">
+            <a:schemeClr val="accent1"/>
+          </a:fillRef>
+          <a:effectRef idx="0">
+            <a:schemeClr val="accent1"/>
+          </a:effectRef>
+          <a:fontRef idx="minor">
+            <a:schemeClr val="lt1"/>
+          </a:fontRef>
+        </p:style>
+        <p:txBody>
+          <a:bodyPr rtlCol="0" anchor="ctr"/>
+          <a:lstStyle/>
+          <a:p>
+            <a:pPr algn="ctr"/>
+            <a:endParaRPr lang="en-US"/>
+          </a:p>
+        </p:txBody>
+      </p:sp>
+      <p:sp>
+        <p:nvSpPr>
+          <p:cNvPr id="155" name="Arrow: Right 154">
+            <a:extLst>
+              <a:ext uri="{FF2B5EF4-FFF2-40B4-BE49-F238E27FC236}">
+                <a16:creationId xmlns:a16="http://schemas.microsoft.com/office/drawing/2014/main" id="{35EADD59-02A6-EFDD-3877-9F012DE8DA9E}"/>
+              </a:ext>
+            </a:extLst>
+          </p:cNvPr>
+          <p:cNvSpPr/>
+          <p:nvPr/>
+        </p:nvSpPr>
+        <p:spPr>
+          <a:xfrm rot="10800000">
+            <a:off x="5233884" y="1649348"/>
+            <a:ext cx="82583" cy="77170"/>
+          </a:xfrm>
+          <a:prstGeom prst="rightArrow">
+            <a:avLst/>
+          </a:prstGeom>
+          <a:solidFill>
+            <a:schemeClr val="bg2"/>
+          </a:solidFill>
+          <a:ln>
+            <a:solidFill>
+              <a:schemeClr val="tx1">
+                <a:lumMod val="50000"/>
+                <a:lumOff val="50000"/>
+              </a:schemeClr>
+            </a:solidFill>
+          </a:ln>
+        </p:spPr>
+        <p:style>
+          <a:lnRef idx="2">
+            <a:schemeClr val="accent1">
+              <a:shade val="50000"/>
+            </a:schemeClr>
+          </a:lnRef>
+          <a:fillRef idx="1">
+            <a:schemeClr val="accent1"/>
+          </a:fillRef>
+          <a:effectRef idx="0">
+            <a:schemeClr val="accent1"/>
+          </a:effectRef>
+          <a:fontRef idx="minor">
+            <a:schemeClr val="lt1"/>
+          </a:fontRef>
+        </p:style>
+        <p:txBody>
+          <a:bodyPr rtlCol="0" anchor="ctr"/>
+          <a:lstStyle/>
+          <a:p>
+            <a:pPr algn="ctr"/>
+            <a:endParaRPr lang="en-US"/>
+          </a:p>
+        </p:txBody>
+      </p:sp>
+      <p:sp>
+        <p:nvSpPr>
+          <p:cNvPr id="157" name="Arrow: Right 156">
+            <a:extLst>
+              <a:ext uri="{FF2B5EF4-FFF2-40B4-BE49-F238E27FC236}">
+                <a16:creationId xmlns:a16="http://schemas.microsoft.com/office/drawing/2014/main" id="{90C31612-300F-4590-7C2E-748B19D79A40}"/>
+              </a:ext>
+            </a:extLst>
+          </p:cNvPr>
+          <p:cNvSpPr/>
+          <p:nvPr/>
+        </p:nvSpPr>
+        <p:spPr>
+          <a:xfrm>
+            <a:off x="1919227" y="1904574"/>
+            <a:ext cx="82583" cy="77170"/>
+          </a:xfrm>
+          <a:prstGeom prst="rightArrow">
+            <a:avLst/>
+          </a:prstGeom>
+          <a:solidFill>
+            <a:schemeClr val="bg2"/>
+          </a:solidFill>
+          <a:ln>
+            <a:solidFill>
+              <a:schemeClr val="tx1">
+                <a:lumMod val="50000"/>
+                <a:lumOff val="50000"/>
+              </a:schemeClr>
+            </a:solidFill>
+          </a:ln>
+        </p:spPr>
+        <p:style>
+          <a:lnRef idx="2">
+            <a:schemeClr val="accent1">
+              <a:shade val="50000"/>
+            </a:schemeClr>
+          </a:lnRef>
+          <a:fillRef idx="1">
+            <a:schemeClr val="accent1"/>
+          </a:fillRef>
+          <a:effectRef idx="0">
+            <a:schemeClr val="accent1"/>
+          </a:effectRef>
+          <a:fontRef idx="minor">
+            <a:schemeClr val="lt1"/>
+          </a:fontRef>
+        </p:style>
+        <p:txBody>
+          <a:bodyPr rtlCol="0" anchor="ctr"/>
+          <a:lstStyle/>
+          <a:p>
+            <a:pPr algn="ctr"/>
+            <a:endParaRPr lang="en-US"/>
+          </a:p>
+        </p:txBody>
+      </p:sp>
+      <p:sp>
+        <p:nvSpPr>
+          <p:cNvPr id="158" name="Arrow: Right 157">
+            <a:extLst>
+              <a:ext uri="{FF2B5EF4-FFF2-40B4-BE49-F238E27FC236}">
+                <a16:creationId xmlns:a16="http://schemas.microsoft.com/office/drawing/2014/main" id="{6A4BB092-1D77-2CA1-3522-8EA878E9F5D9}"/>
+              </a:ext>
+            </a:extLst>
+          </p:cNvPr>
+          <p:cNvSpPr/>
+          <p:nvPr/>
+        </p:nvSpPr>
+        <p:spPr>
+          <a:xfrm>
+            <a:off x="1912839" y="4778202"/>
+            <a:ext cx="82583" cy="77170"/>
+          </a:xfrm>
+          <a:prstGeom prst="rightArrow">
+            <a:avLst/>
+          </a:prstGeom>
+          <a:solidFill>
+            <a:schemeClr val="bg2"/>
+          </a:solidFill>
+          <a:ln>
+            <a:solidFill>
+              <a:schemeClr val="tx1">
+                <a:lumMod val="50000"/>
+                <a:lumOff val="50000"/>
+              </a:schemeClr>
+            </a:solidFill>
+          </a:ln>
+        </p:spPr>
+        <p:style>
+          <a:lnRef idx="2">
+            <a:schemeClr val="accent1">
+              <a:shade val="50000"/>
+            </a:schemeClr>
+          </a:lnRef>
+          <a:fillRef idx="1">
+            <a:schemeClr val="accent1"/>
+          </a:fillRef>
+          <a:effectRef idx="0">
+            <a:schemeClr val="accent1"/>
+          </a:effectRef>
+          <a:fontRef idx="minor">
+            <a:schemeClr val="lt1"/>
+          </a:fontRef>
+        </p:style>
+        <p:txBody>
+          <a:bodyPr rtlCol="0" anchor="ctr"/>
+          <a:lstStyle/>
+          <a:p>
+            <a:pPr algn="ctr"/>
+            <a:endParaRPr lang="en-US"/>
+          </a:p>
+        </p:txBody>
+      </p:sp>
     </p:spTree>
     <p:extLst>
       <p:ext uri="{BB962C8B-B14F-4D97-AF65-F5344CB8AC3E}">

</xml_diff>